<commit_message>
stateful apps with deployments
</commit_message>
<xml_diff>
--- a/kubernetes/10_statefulset.pptx
+++ b/kubernetes/10_statefulset.pptx
@@ -5,21 +5,22 @@
     <p:sldMasterId id="2147483733" r:id="rId1"/>
   </p:sldMasterIdLst>
   <p:notesMasterIdLst>
-    <p:notesMasterId r:id="rId11"/>
+    <p:notesMasterId r:id="rId12"/>
   </p:notesMasterIdLst>
   <p:handoutMasterIdLst>
-    <p:handoutMasterId r:id="rId12"/>
+    <p:handoutMasterId r:id="rId13"/>
   </p:handoutMasterIdLst>
   <p:sldIdLst>
     <p:sldId id="433" r:id="rId2"/>
     <p:sldId id="448" r:id="rId3"/>
-    <p:sldId id="453" r:id="rId4"/>
-    <p:sldId id="454" r:id="rId5"/>
-    <p:sldId id="449" r:id="rId6"/>
-    <p:sldId id="450" r:id="rId7"/>
-    <p:sldId id="451" r:id="rId8"/>
-    <p:sldId id="452" r:id="rId9"/>
-    <p:sldId id="265" r:id="rId10"/>
+    <p:sldId id="455" r:id="rId4"/>
+    <p:sldId id="453" r:id="rId5"/>
+    <p:sldId id="454" r:id="rId6"/>
+    <p:sldId id="449" r:id="rId7"/>
+    <p:sldId id="450" r:id="rId8"/>
+    <p:sldId id="451" r:id="rId9"/>
+    <p:sldId id="452" r:id="rId10"/>
+    <p:sldId id="265" r:id="rId11"/>
   </p:sldIdLst>
   <p:sldSz cx="12195175" cy="6858000"/>
   <p:notesSz cx="6858000" cy="9144000"/>
@@ -3770,7 +3771,7 @@
           <a:p>
             <a:r>
               <a:rPr lang="en-US" dirty="0"/>
-              <a:t>With </a:t>
+              <a:t>Of course, it is possible to build a </a:t>
             </a:r>
             <a:r>
               <a:rPr lang="en-US" dirty="0" err="1"/>
@@ -3778,45 +3779,64 @@
             </a:r>
             <a:r>
               <a:rPr lang="en-US" dirty="0"/>
-              <a:t> apps the schema changes. Here it </a:t>
-            </a:r>
-            <a:r>
-              <a:rPr lang="en-US" b="1" dirty="0"/>
-              <a:t>does</a:t>
-            </a:r>
+              <a:t> application with deployments. But there are some drawbacks:</a:t>
+            </a:r>
+          </a:p>
+          <a:p>
+            <a:pPr marL="285750" indent="-285750">
+              <a:buFontTx/>
+              <a:buChar char="-"/>
+            </a:pPr>
             <a:r>
               <a:rPr lang="en-US" dirty="0"/>
-              <a:t> matter, to which individual instance we connect to. Every instance has a separate persistence for content and since it holds a state, you want to be able to connect to exactly the same instance again.</a:t>
-            </a:r>
-          </a:p>
-          <a:p>
+              <a:t>The deployment cannot scale beyond replica=1</a:t>
+            </a:r>
+          </a:p>
+          <a:p>
+            <a:pPr marL="285750" indent="-285750">
+              <a:buFontTx/>
+              <a:buChar char="-"/>
+            </a:pPr>
             <a:r>
               <a:rPr lang="en-US" dirty="0"/>
-              <a:t>Therefore the service in front of the replicas doesn’t have a separate IP address and thus cannot serve as connection endpoint (i.e. </a:t>
-            </a:r>
-            <a:r>
-              <a:rPr lang="en-US" dirty="0" err="1"/>
-              <a:t>loadbalancer</a:t>
-            </a:r>
+              <a:t>Manually created storage volumes</a:t>
+            </a:r>
+          </a:p>
+          <a:p>
+            <a:pPr marL="285750" indent="-285750">
+              <a:buFontTx/>
+              <a:buChar char="-"/>
+            </a:pPr>
             <a:r>
               <a:rPr lang="en-US" dirty="0"/>
-              <a:t>). Instead, the service only provides a collection of CNAME records allowing to route to an individual replica. Hence the service could be described as the </a:t>
-            </a:r>
-            <a:r>
-              <a:rPr lang="en-US" dirty="0" err="1"/>
-              <a:t>stateful</a:t>
-            </a:r>
+              <a:t>To scale a new set of deployment + storage volume has to be created</a:t>
+            </a:r>
+          </a:p>
+          <a:p>
+            <a:pPr marL="285750" indent="-285750">
+              <a:buFontTx/>
+              <a:buChar char="-"/>
+            </a:pPr>
             <a:r>
               <a:rPr lang="en-US" dirty="0"/>
-              <a:t> app’s domain administrator as well. In K8s, this type of service is called a “headless service” and is created by specifying the “</a:t>
-            </a:r>
-            <a:r>
-              <a:rPr lang="en-US" dirty="0" err="1"/>
-              <a:t>clusterIP</a:t>
-            </a:r>
+              <a:t>No guaranteed identity (pod name changes) =&gt; prone to split brain issues ( https://en.wikipedia.org/wiki/Split-brain_(computing) )</a:t>
+            </a:r>
+          </a:p>
+          <a:p>
+            <a:pPr marL="0" indent="0">
+              <a:buFontTx/>
+              <a:buNone/>
+            </a:pPr>
+            <a:endParaRPr lang="en-US" dirty="0"/>
+          </a:p>
+          <a:p>
+            <a:pPr marL="0" indent="0">
+              <a:buFontTx/>
+              <a:buNone/>
+            </a:pPr>
             <a:r>
               <a:rPr lang="en-US" dirty="0"/>
-              <a:t>” key with the value “None”.</a:t>
+              <a:t>Split brain issue: imagine you run a distributed database like Cassandra. You want to replicate content to all database nodes (pods) where the data is also persisted on an attached storage volume. If a pod dies and is re-created with a new name – how can the database know, the data was already replicated to that node?</a:t>
             </a:r>
           </a:p>
         </p:txBody>
@@ -3848,7 +3868,7 @@
     </p:spTree>
     <p:extLst>
       <p:ext uri="{BB962C8B-B14F-4D97-AF65-F5344CB8AC3E}">
-        <p14:creationId xmlns:p14="http://schemas.microsoft.com/office/powerpoint/2010/main" val="3371514742"/>
+        <p14:creationId xmlns:p14="http://schemas.microsoft.com/office/powerpoint/2010/main" val="4180883739"/>
       </p:ext>
     </p:extLst>
   </p:cSld>
@@ -3899,56 +3919,60 @@
         </p:nvSpPr>
         <p:spPr/>
         <p:txBody>
-          <a:bodyPr/>
+          <a:bodyPr>
+            <a:normAutofit/>
+          </a:bodyPr>
           <a:lstStyle/>
           <a:p>
             <a:r>
               <a:rPr lang="en-US" dirty="0"/>
-              <a:t>Possible uses cases:</a:t>
-            </a:r>
-          </a:p>
-          <a:p>
-            <a:pPr marL="285750" indent="-285750">
-              <a:buFontTx/>
-              <a:buChar char="-"/>
-            </a:pPr>
+              <a:t>With </a:t>
+            </a:r>
+            <a:r>
+              <a:rPr lang="en-US" dirty="0" err="1"/>
+              <a:t>stateful</a:t>
+            </a:r>
             <a:r>
               <a:rPr lang="en-US" dirty="0"/>
-              <a:t>Run a front end with a different language per instance</a:t>
-            </a:r>
-          </a:p>
-          <a:p>
-            <a:pPr marL="285750" indent="-285750">
-              <a:buFontTx/>
-              <a:buChar char="-"/>
-            </a:pPr>
+              <a:t> apps the schema changes. Here it </a:t>
+            </a:r>
+            <a:r>
+              <a:rPr lang="en-US" b="1" dirty="0"/>
+              <a:t>does</a:t>
+            </a:r>
             <a:r>
               <a:rPr lang="en-US" dirty="0"/>
-              <a:t>Run a single node DB -&gt; make use of the storage templating feature</a:t>
-            </a:r>
-          </a:p>
-          <a:p>
-            <a:pPr marL="285750" indent="-285750">
-              <a:buFontTx/>
-              <a:buChar char="-"/>
-            </a:pPr>
+              <a:t> matter, to which individual instance we connect to. Every instance has a separate persistence for content and since it holds a state, you want to be able to connect to exactly the same instance again.</a:t>
+            </a:r>
+          </a:p>
+          <a:p>
             <a:r>
               <a:rPr lang="en-US" dirty="0"/>
-              <a:t>Run a scalable database like </a:t>
+              <a:t>Therefore the service in front of the replicas doesn’t have a separate IP address and thus cannot serve as connection endpoint (i.e. </a:t>
             </a:r>
             <a:r>
               <a:rPr lang="en-US" dirty="0" err="1"/>
-              <a:t>cassandra</a:t>
-            </a:r>
-            <a:endParaRPr lang="en-US" dirty="0"/>
-          </a:p>
-          <a:p>
-            <a:endParaRPr lang="en-US" dirty="0"/>
-          </a:p>
-          <a:p>
+              <a:t>loadbalancer</a:t>
+            </a:r>
             <a:r>
               <a:rPr lang="en-US" dirty="0"/>
-              <a:t>https://kubernetes.io/docs/tutorials/stateful-application/cassandra/ </a:t>
+              <a:t>). Instead, the service only provides a collection of CNAME records allowing to route to an individual replica. Hence the service could be described as the </a:t>
+            </a:r>
+            <a:r>
+              <a:rPr lang="en-US" dirty="0" err="1"/>
+              <a:t>stateful</a:t>
+            </a:r>
+            <a:r>
+              <a:rPr lang="en-US" dirty="0"/>
+              <a:t> app’s domain administrator as well. In K8s, this type of service is called a “headless service” and is created by specifying the “</a:t>
+            </a:r>
+            <a:r>
+              <a:rPr lang="en-US" dirty="0" err="1"/>
+              <a:t>clusterIP</a:t>
+            </a:r>
+            <a:r>
+              <a:rPr lang="en-US" dirty="0"/>
+              <a:t>” key with the value “None”.</a:t>
             </a:r>
           </a:p>
         </p:txBody>
@@ -3980,7 +4004,7 @@
     </p:spTree>
     <p:extLst>
       <p:ext uri="{BB962C8B-B14F-4D97-AF65-F5344CB8AC3E}">
-        <p14:creationId xmlns:p14="http://schemas.microsoft.com/office/powerpoint/2010/main" val="3739870479"/>
+        <p14:creationId xmlns:p14="http://schemas.microsoft.com/office/powerpoint/2010/main" val="3371514742"/>
       </p:ext>
     </p:extLst>
   </p:cSld>
@@ -4036,21 +4060,57 @@
           <a:p>
             <a:r>
               <a:rPr lang="en-US" dirty="0"/>
-              <a:t>Similar to deployments, </a:t>
+              <a:t>Possible uses cases:</a:t>
+            </a:r>
+          </a:p>
+          <a:p>
+            <a:pPr marL="285750" indent="-285750">
+              <a:buFontTx/>
+              <a:buChar char="-"/>
+            </a:pPr>
+            <a:r>
+              <a:rPr lang="en-US" dirty="0"/>
+              <a:t>Run a front end with a different language per instance</a:t>
+            </a:r>
+          </a:p>
+          <a:p>
+            <a:pPr marL="285750" indent="-285750">
+              <a:buFontTx/>
+              <a:buChar char="-"/>
+            </a:pPr>
+            <a:r>
+              <a:rPr lang="en-US" dirty="0"/>
+              <a:t>Run a single node DB -&gt; make use of the storage templating feature</a:t>
+            </a:r>
+          </a:p>
+          <a:p>
+            <a:pPr marL="285750" indent="-285750">
+              <a:buFontTx/>
+              <a:buChar char="-"/>
+            </a:pPr>
+            <a:r>
+              <a:rPr lang="en-US" dirty="0"/>
+              <a:t>Run a scalable database like </a:t>
             </a:r>
             <a:r>
               <a:rPr lang="en-US" dirty="0" err="1"/>
-              <a:t>statefulsets</a:t>
-            </a:r>
+              <a:t>cassandra</a:t>
+            </a:r>
+            <a:endParaRPr lang="en-US" dirty="0"/>
+          </a:p>
+          <a:p>
+            <a:endParaRPr lang="en-US" dirty="0"/>
+          </a:p>
+          <a:p>
             <a:r>
               <a:rPr lang="en-US" dirty="0"/>
-              <a:t> manage pods by labels and corresponding selectors. </a:t>
+              <a:t>How does it solve issues like the split brain?</a:t>
             </a:r>
           </a:p>
           <a:p>
             <a:r>
               <a:rPr lang="en-US" dirty="0"/>
-              <a:t>Additionally you need to specify the service, which governs/manages the domain for the </a:t>
+              <a:t>When looking at the Cassandra use case, all pods have a stable and unique name. Since the </a:t>
             </a:r>
             <a:r>
               <a:rPr lang="en-US" dirty="0" err="1"/>
@@ -4058,55 +4118,29 @@
             </a:r>
             <a:r>
               <a:rPr lang="en-US" dirty="0"/>
-              <a:t>. Important: the service has to exist, before you create the </a:t>
-            </a:r>
-            <a:r>
-              <a:rPr lang="en-US" dirty="0" err="1"/>
-              <a:t>statefulset</a:t>
+              <a:t> guarantees these identities, it is possible to </a:t>
+            </a:r>
+            <a:r>
+              <a:rPr lang="en-US"/>
+              <a:t>rely on the </a:t>
             </a:r>
             <a:r>
               <a:rPr lang="en-US" dirty="0"/>
-              <a:t>.</a:t>
-            </a:r>
+              <a:t>hostnames/</a:t>
+            </a:r>
+            <a:r>
+              <a:rPr lang="en-US"/>
+              <a:t>pod names.  </a:t>
+            </a:r>
+            <a:endParaRPr lang="en-US" dirty="0"/>
+          </a:p>
+          <a:p>
+            <a:endParaRPr lang="en-US" dirty="0"/>
           </a:p>
           <a:p>
             <a:r>
               <a:rPr lang="en-US" dirty="0"/>
-              <a:t>In the </a:t>
-            </a:r>
-            <a:r>
-              <a:rPr lang="en-US" dirty="0" err="1"/>
-              <a:t>PodSpecTemplate</a:t>
-            </a:r>
-            <a:r>
-              <a:rPr lang="en-US" dirty="0"/>
-              <a:t> you can define the pod’s structure, mounts etc. as done for deployments.</a:t>
-            </a:r>
-          </a:p>
-          <a:p>
-            <a:r>
-              <a:rPr lang="en-US" dirty="0" err="1"/>
-              <a:t>VolumeClaimTemplate</a:t>
-            </a:r>
-            <a:r>
-              <a:rPr lang="en-US" dirty="0"/>
-              <a:t>: </a:t>
-            </a:r>
-            <a:r>
-              <a:rPr lang="en-US" dirty="0" err="1"/>
-              <a:t>acutally</a:t>
-            </a:r>
-            <a:r>
-              <a:rPr lang="en-US" dirty="0"/>
-              <a:t> a nice feature allowing to template PVCs which are created for each replica of the </a:t>
-            </a:r>
-            <a:r>
-              <a:rPr lang="en-US" dirty="0" err="1"/>
-              <a:t>stateful</a:t>
-            </a:r>
-            <a:r>
-              <a:rPr lang="en-US" dirty="0"/>
-              <a:t> set.</a:t>
+              <a:t>https://kubernetes.io/docs/tutorials/stateful-application/cassandra/ </a:t>
             </a:r>
           </a:p>
         </p:txBody>
@@ -4138,7 +4172,7 @@
     </p:spTree>
     <p:extLst>
       <p:ext uri="{BB962C8B-B14F-4D97-AF65-F5344CB8AC3E}">
-        <p14:creationId xmlns:p14="http://schemas.microsoft.com/office/powerpoint/2010/main" val="59364613"/>
+        <p14:creationId xmlns:p14="http://schemas.microsoft.com/office/powerpoint/2010/main" val="3739870479"/>
       </p:ext>
     </p:extLst>
   </p:cSld>
@@ -4192,26 +4226,71 @@
           <a:bodyPr/>
           <a:lstStyle/>
           <a:p>
-            <a:pPr marL="0" marR="0" lvl="0" indent="0" algn="l" defTabSz="1088776" rtl="0" eaLnBrk="1" fontAlgn="auto" latinLnBrk="0" hangingPunct="1">
-              <a:lnSpc>
-                <a:spcPct val="100000"/>
-              </a:lnSpc>
-              <a:spcBef>
-                <a:spcPts val="0"/>
-              </a:spcBef>
-              <a:spcAft>
-                <a:spcPts val="0"/>
-              </a:spcAft>
-              <a:buClrTx/>
-              <a:buSzTx/>
-              <a:buFontTx/>
-              <a:buNone/>
-              <a:tabLst/>
-              <a:defRPr/>
-            </a:pPr>
             <a:r>
               <a:rPr lang="en-US" dirty="0"/>
-              <a:t>In Kubernetes you can easily run </a:t>
+              <a:t>Similar to deployments, </a:t>
+            </a:r>
+            <a:r>
+              <a:rPr lang="en-US" dirty="0" err="1"/>
+              <a:t>statefulsets</a:t>
+            </a:r>
+            <a:r>
+              <a:rPr lang="en-US" dirty="0"/>
+              <a:t> manage pods by labels and corresponding selectors. </a:t>
+            </a:r>
+          </a:p>
+          <a:p>
+            <a:r>
+              <a:rPr lang="en-US" dirty="0"/>
+              <a:t>Additionally you need to specify the service, which governs/manages the domain for the </a:t>
+            </a:r>
+            <a:r>
+              <a:rPr lang="en-US" dirty="0" err="1"/>
+              <a:t>statefulset</a:t>
+            </a:r>
+            <a:r>
+              <a:rPr lang="en-US" dirty="0"/>
+              <a:t>. Important: the service has to exist, before you create the </a:t>
+            </a:r>
+            <a:r>
+              <a:rPr lang="en-US" dirty="0" err="1"/>
+              <a:t>statefulset</a:t>
+            </a:r>
+            <a:r>
+              <a:rPr lang="en-US" dirty="0"/>
+              <a:t>.</a:t>
+            </a:r>
+          </a:p>
+          <a:p>
+            <a:r>
+              <a:rPr lang="en-US" dirty="0"/>
+              <a:t>In the </a:t>
+            </a:r>
+            <a:r>
+              <a:rPr lang="en-US" dirty="0" err="1"/>
+              <a:t>PodSpecTemplate</a:t>
+            </a:r>
+            <a:r>
+              <a:rPr lang="en-US" dirty="0"/>
+              <a:t> you can define the pod’s structure, mounts etc. as done for deployments.</a:t>
+            </a:r>
+          </a:p>
+          <a:p>
+            <a:r>
+              <a:rPr lang="en-US" dirty="0" err="1"/>
+              <a:t>VolumeClaimTemplate</a:t>
+            </a:r>
+            <a:r>
+              <a:rPr lang="en-US" dirty="0"/>
+              <a:t>: </a:t>
+            </a:r>
+            <a:r>
+              <a:rPr lang="en-US" dirty="0" err="1"/>
+              <a:t>acutally</a:t>
+            </a:r>
+            <a:r>
+              <a:rPr lang="en-US" dirty="0"/>
+              <a:t> a nice feature allowing to template PVCs which are created for each replica of the </a:t>
             </a:r>
             <a:r>
               <a:rPr lang="en-US" dirty="0" err="1"/>
@@ -4219,157 +4298,7 @@
             </a:r>
             <a:r>
               <a:rPr lang="en-US" dirty="0"/>
-              <a:t> applications using the “</a:t>
-            </a:r>
-            <a:r>
-              <a:rPr lang="en-US" dirty="0" err="1"/>
-              <a:t>StatefulSet</a:t>
-            </a:r>
-            <a:r>
-              <a:rPr lang="en-US" dirty="0"/>
-              <a:t>” resource type. Though it has a few things in common with the “Deployment” resource, there are some key differentiators:</a:t>
-            </a:r>
-          </a:p>
-          <a:p>
-            <a:pPr marL="285750" marR="0" lvl="0" indent="-285750" algn="l" defTabSz="1088776" rtl="0" eaLnBrk="1" fontAlgn="auto" latinLnBrk="0" hangingPunct="1">
-              <a:lnSpc>
-                <a:spcPct val="100000"/>
-              </a:lnSpc>
-              <a:spcBef>
-                <a:spcPts val="0"/>
-              </a:spcBef>
-              <a:spcAft>
-                <a:spcPts val="0"/>
-              </a:spcAft>
-              <a:buClrTx/>
-              <a:buSzTx/>
-              <a:buFontTx/>
-              <a:buChar char="-"/>
-              <a:tabLst/>
-              <a:defRPr/>
-            </a:pPr>
-            <a:r>
-              <a:rPr lang="en-US" dirty="0"/>
-              <a:t>Stable network identifiers: pod names are predictable (no more generated UIDs) and remain stable</a:t>
-            </a:r>
-          </a:p>
-          <a:p>
-            <a:pPr marL="285750" marR="0" lvl="0" indent="-285750" algn="l" defTabSz="1088776" rtl="0" eaLnBrk="1" fontAlgn="auto" latinLnBrk="0" hangingPunct="1">
-              <a:lnSpc>
-                <a:spcPct val="100000"/>
-              </a:lnSpc>
-              <a:spcBef>
-                <a:spcPts val="0"/>
-              </a:spcBef>
-              <a:spcAft>
-                <a:spcPts val="0"/>
-              </a:spcAft>
-              <a:buClrTx/>
-              <a:buSzTx/>
-              <a:buFontTx/>
-              <a:buChar char="-"/>
-              <a:tabLst/>
-              <a:defRPr/>
-            </a:pPr>
-            <a:r>
-              <a:rPr lang="en-US" dirty="0"/>
-              <a:t>Stable storage: each pod has its own persistence, created upon first creation of the pod</a:t>
-            </a:r>
-          </a:p>
-          <a:p>
-            <a:pPr marL="285750" marR="0" lvl="0" indent="-285750" algn="l" defTabSz="1088776" rtl="0" eaLnBrk="1" fontAlgn="auto" latinLnBrk="0" hangingPunct="1">
-              <a:lnSpc>
-                <a:spcPct val="100000"/>
-              </a:lnSpc>
-              <a:spcBef>
-                <a:spcPts val="0"/>
-              </a:spcBef>
-              <a:spcAft>
-                <a:spcPts val="0"/>
-              </a:spcAft>
-              <a:buClrTx/>
-              <a:buSzTx/>
-              <a:buFontTx/>
-              <a:buChar char="-"/>
-              <a:tabLst/>
-              <a:defRPr/>
-            </a:pPr>
-            <a:r>
-              <a:rPr lang="en-US" dirty="0"/>
-              <a:t>Ordinal index: pod name schema is [</a:t>
-            </a:r>
-            <a:r>
-              <a:rPr lang="en-US" dirty="0" err="1"/>
-              <a:t>statefulset</a:t>
-            </a:r>
-            <a:r>
-              <a:rPr lang="en-US" dirty="0"/>
-              <a:t>-name]-[0..n] like nginx-0,nginx-1</a:t>
-            </a:r>
-          </a:p>
-          <a:p>
-            <a:pPr marL="285750" marR="0" lvl="0" indent="-285750" algn="l" defTabSz="1088776" rtl="0" eaLnBrk="1" fontAlgn="auto" latinLnBrk="0" hangingPunct="1">
-              <a:lnSpc>
-                <a:spcPct val="100000"/>
-              </a:lnSpc>
-              <a:spcBef>
-                <a:spcPts val="0"/>
-              </a:spcBef>
-              <a:spcAft>
-                <a:spcPts val="0"/>
-              </a:spcAft>
-              <a:buClrTx/>
-              <a:buSzTx/>
-              <a:buFontTx/>
-              <a:buChar char="-"/>
-              <a:tabLst/>
-              <a:defRPr/>
-            </a:pPr>
-            <a:r>
-              <a:rPr lang="en-US" dirty="0"/>
-              <a:t>Ordered: since pods have an ordinal index, they can be put in an order. This order is used for operations like scaling. When scaling down #3 is deleted before #2</a:t>
-            </a:r>
-          </a:p>
-          <a:p>
-            <a:pPr marL="285750" marR="0" lvl="0" indent="-285750" algn="l" defTabSz="1088776" rtl="0" eaLnBrk="1" fontAlgn="auto" latinLnBrk="0" hangingPunct="1">
-              <a:lnSpc>
-                <a:spcPct val="100000"/>
-              </a:lnSpc>
-              <a:spcBef>
-                <a:spcPts val="0"/>
-              </a:spcBef>
-              <a:spcAft>
-                <a:spcPts val="0"/>
-              </a:spcAft>
-              <a:buClrTx/>
-              <a:buSzTx/>
-              <a:buFontTx/>
-              <a:buChar char="-"/>
-              <a:tabLst/>
-              <a:defRPr/>
-            </a:pPr>
-            <a:r>
-              <a:rPr lang="en-US" dirty="0"/>
-              <a:t>Update strategy: </a:t>
-            </a:r>
-            <a:r>
-              <a:rPr lang="en-US" dirty="0" err="1"/>
-              <a:t>StatefulSets</a:t>
-            </a:r>
-            <a:r>
-              <a:rPr lang="en-US" dirty="0"/>
-              <a:t> support canary roll-out, phased roll-out, </a:t>
-            </a:r>
-            <a:r>
-              <a:rPr lang="en-US" dirty="0" err="1"/>
-              <a:t>etc</a:t>
-            </a:r>
-            <a:endParaRPr lang="en-US" dirty="0"/>
-          </a:p>
-          <a:p>
-            <a:r>
-              <a:rPr lang="en-US" dirty="0"/>
-              <a:t>Read more here: https://kubernetes.io/docs/tutorials/stateful-application/basic-stateful-set </a:t>
+              <a:t> set.</a:t>
             </a:r>
           </a:p>
         </p:txBody>
@@ -4401,7 +4330,7 @@
     </p:spTree>
     <p:extLst>
       <p:ext uri="{BB962C8B-B14F-4D97-AF65-F5344CB8AC3E}">
-        <p14:creationId xmlns:p14="http://schemas.microsoft.com/office/powerpoint/2010/main" val="2739024390"/>
+        <p14:creationId xmlns:p14="http://schemas.microsoft.com/office/powerpoint/2010/main" val="59364613"/>
       </p:ext>
     </p:extLst>
   </p:cSld>
@@ -4455,51 +4384,111 @@
           <a:bodyPr/>
           <a:lstStyle/>
           <a:p>
+            <a:pPr marL="0" marR="0" lvl="0" indent="0" algn="l" defTabSz="1088776" rtl="0" eaLnBrk="1" fontAlgn="auto" latinLnBrk="0" hangingPunct="1">
+              <a:lnSpc>
+                <a:spcPct val="100000"/>
+              </a:lnSpc>
+              <a:spcBef>
+                <a:spcPts val="0"/>
+              </a:spcBef>
+              <a:spcAft>
+                <a:spcPts val="0"/>
+              </a:spcAft>
+              <a:buClrTx/>
+              <a:buSzTx/>
+              <a:buFontTx/>
+              <a:buNone/>
+              <a:tabLst/>
+              <a:defRPr/>
+            </a:pPr>
             <a:r>
               <a:rPr lang="en-US" dirty="0"/>
-              <a:t>There is one more thing required to make </a:t>
+              <a:t>In Kubernetes you can easily run </a:t>
             </a:r>
             <a:r>
               <a:rPr lang="en-US" dirty="0" err="1"/>
-              <a:t>statefulsets</a:t>
+              <a:t>stateful</a:t>
             </a:r>
             <a:r>
               <a:rPr lang="en-US" dirty="0"/>
-              <a:t> work: a headless service</a:t>
-            </a:r>
-          </a:p>
-          <a:p>
+              <a:t> applications using the “</a:t>
+            </a:r>
+            <a:r>
+              <a:rPr lang="en-US" dirty="0" err="1"/>
+              <a:t>StatefulSet</a:t>
+            </a:r>
             <a:r>
               <a:rPr lang="en-US" dirty="0"/>
-              <a:t>It allows you to connect directly to a pod while using </a:t>
-            </a:r>
-            <a:r>
-              <a:rPr lang="en-US" dirty="0" err="1"/>
-              <a:t>dns</a:t>
-            </a:r>
+              <a:t>” resource type. Though it has a few things in common with the “Deployment” resource, there are some key differentiators:</a:t>
+            </a:r>
+          </a:p>
+          <a:p>
+            <a:pPr marL="285750" marR="0" lvl="0" indent="-285750" algn="l" defTabSz="1088776" rtl="0" eaLnBrk="1" fontAlgn="auto" latinLnBrk="0" hangingPunct="1">
+              <a:lnSpc>
+                <a:spcPct val="100000"/>
+              </a:lnSpc>
+              <a:spcBef>
+                <a:spcPts val="0"/>
+              </a:spcBef>
+              <a:spcAft>
+                <a:spcPts val="0"/>
+              </a:spcAft>
+              <a:buClrTx/>
+              <a:buSzTx/>
+              <a:buFontTx/>
+              <a:buChar char="-"/>
+              <a:tabLst/>
+              <a:defRPr/>
+            </a:pPr>
             <a:r>
               <a:rPr lang="en-US" dirty="0"/>
-              <a:t> names instead of IP addresses (remember – IP addresses in k8s are not stable)</a:t>
-            </a:r>
-          </a:p>
-          <a:p>
+              <a:t>Stable network identifiers: pod names are predictable (no more generated UIDs) and remain stable</a:t>
+            </a:r>
+          </a:p>
+          <a:p>
+            <a:pPr marL="285750" marR="0" lvl="0" indent="-285750" algn="l" defTabSz="1088776" rtl="0" eaLnBrk="1" fontAlgn="auto" latinLnBrk="0" hangingPunct="1">
+              <a:lnSpc>
+                <a:spcPct val="100000"/>
+              </a:lnSpc>
+              <a:spcBef>
+                <a:spcPts val="0"/>
+              </a:spcBef>
+              <a:spcAft>
+                <a:spcPts val="0"/>
+              </a:spcAft>
+              <a:buClrTx/>
+              <a:buSzTx/>
+              <a:buFontTx/>
+              <a:buChar char="-"/>
+              <a:tabLst/>
+              <a:defRPr/>
+            </a:pPr>
             <a:r>
               <a:rPr lang="en-US" dirty="0"/>
-              <a:t>A headless service is created, by specifying “None” as the value for “</a:t>
-            </a:r>
-            <a:r>
-              <a:rPr lang="en-US" dirty="0" err="1"/>
-              <a:t>ClusterIP</a:t>
-            </a:r>
+              <a:t>Stable storage: each pod has its own persistence, created upon first creation of the pod</a:t>
+            </a:r>
+          </a:p>
+          <a:p>
+            <a:pPr marL="285750" marR="0" lvl="0" indent="-285750" algn="l" defTabSz="1088776" rtl="0" eaLnBrk="1" fontAlgn="auto" latinLnBrk="0" hangingPunct="1">
+              <a:lnSpc>
+                <a:spcPct val="100000"/>
+              </a:lnSpc>
+              <a:spcBef>
+                <a:spcPts val="0"/>
+              </a:spcBef>
+              <a:spcAft>
+                <a:spcPts val="0"/>
+              </a:spcAft>
+              <a:buClrTx/>
+              <a:buSzTx/>
+              <a:buFontTx/>
+              <a:buChar char="-"/>
+              <a:tabLst/>
+              <a:defRPr/>
+            </a:pPr>
             <a:r>
               <a:rPr lang="en-US" dirty="0"/>
-              <a:t>”. This will stop the cluster from creating an endpoint object with an IP address. Instead the service will only serve as DNS domain/entry point for your pods.</a:t>
-            </a:r>
-          </a:p>
-          <a:p>
-            <a:r>
-              <a:rPr lang="en-US" dirty="0"/>
-              <a:t>To connect to a pod use the stable network identifier the </a:t>
+              <a:t>Ordinal index: pod name schema is [</a:t>
             </a:r>
             <a:r>
               <a:rPr lang="en-US" dirty="0" err="1"/>
@@ -4507,15 +4496,73 @@
             </a:r>
             <a:r>
               <a:rPr lang="en-US" dirty="0"/>
-              <a:t> provides + the service name </a:t>
-            </a:r>
-            <a:r>
-              <a:rPr lang="en-US" dirty="0">
-                <a:sym typeface="Wingdings" panose="05000000000000000000" pitchFamily="2" charset="2"/>
-              </a:rPr>
-              <a:t> nginx-0.nginx</a:t>
+              <a:t>-name]-[0..n] like nginx-0,nginx-1</a:t>
+            </a:r>
+          </a:p>
+          <a:p>
+            <a:pPr marL="285750" marR="0" lvl="0" indent="-285750" algn="l" defTabSz="1088776" rtl="0" eaLnBrk="1" fontAlgn="auto" latinLnBrk="0" hangingPunct="1">
+              <a:lnSpc>
+                <a:spcPct val="100000"/>
+              </a:lnSpc>
+              <a:spcBef>
+                <a:spcPts val="0"/>
+              </a:spcBef>
+              <a:spcAft>
+                <a:spcPts val="0"/>
+              </a:spcAft>
+              <a:buClrTx/>
+              <a:buSzTx/>
+              <a:buFontTx/>
+              <a:buChar char="-"/>
+              <a:tabLst/>
+              <a:defRPr/>
+            </a:pPr>
+            <a:r>
+              <a:rPr lang="en-US" dirty="0"/>
+              <a:t>Ordered: since pods have an ordinal index, they can be put in an order. This order is used for operations like scaling. When scaling down #3 is deleted before #2</a:t>
+            </a:r>
+          </a:p>
+          <a:p>
+            <a:pPr marL="285750" marR="0" lvl="0" indent="-285750" algn="l" defTabSz="1088776" rtl="0" eaLnBrk="1" fontAlgn="auto" latinLnBrk="0" hangingPunct="1">
+              <a:lnSpc>
+                <a:spcPct val="100000"/>
+              </a:lnSpc>
+              <a:spcBef>
+                <a:spcPts val="0"/>
+              </a:spcBef>
+              <a:spcAft>
+                <a:spcPts val="0"/>
+              </a:spcAft>
+              <a:buClrTx/>
+              <a:buSzTx/>
+              <a:buFontTx/>
+              <a:buChar char="-"/>
+              <a:tabLst/>
+              <a:defRPr/>
+            </a:pPr>
+            <a:r>
+              <a:rPr lang="en-US" dirty="0"/>
+              <a:t>Update strategy: </a:t>
+            </a:r>
+            <a:r>
+              <a:rPr lang="en-US" dirty="0" err="1"/>
+              <a:t>StatefulSets</a:t>
+            </a:r>
+            <a:r>
+              <a:rPr lang="en-US" dirty="0"/>
+              <a:t> support canary roll-out, phased roll-out, </a:t>
+            </a:r>
+            <a:r>
+              <a:rPr lang="en-US" dirty="0" err="1"/>
+              <a:t>etc</a:t>
             </a:r>
             <a:endParaRPr lang="en-US" dirty="0"/>
+          </a:p>
+          <a:p>
+            <a:r>
+              <a:rPr lang="en-US" dirty="0"/>
+              <a:t>Read more here: https://kubernetes.io/docs/tutorials/stateful-application/basic-stateful-set </a:t>
+            </a:r>
           </a:p>
         </p:txBody>
       </p:sp>
@@ -4546,6 +4593,151 @@
     </p:spTree>
     <p:extLst>
       <p:ext uri="{BB962C8B-B14F-4D97-AF65-F5344CB8AC3E}">
+        <p14:creationId xmlns:p14="http://schemas.microsoft.com/office/powerpoint/2010/main" val="2739024390"/>
+      </p:ext>
+    </p:extLst>
+  </p:cSld>
+  <p:clrMapOvr>
+    <a:masterClrMapping/>
+  </p:clrMapOvr>
+</p:notes>
+</file>
+
+<file path=ppt/notesSlides/notesSlide8.xml><?xml version="1.0" encoding="utf-8"?>
+<p:notes xmlns:a="http://schemas.openxmlformats.org/drawingml/2006/main" xmlns:r="http://schemas.openxmlformats.org/officeDocument/2006/relationships" xmlns:p="http://schemas.openxmlformats.org/presentationml/2006/main">
+  <p:cSld>
+    <p:spTree>
+      <p:nvGrpSpPr>
+        <p:cNvPr id="1" name=""/>
+        <p:cNvGrpSpPr/>
+        <p:nvPr/>
+      </p:nvGrpSpPr>
+      <p:grpSpPr>
+        <a:xfrm>
+          <a:off x="0" y="0"/>
+          <a:ext cx="0" cy="0"/>
+          <a:chOff x="0" y="0"/>
+          <a:chExt cx="0" cy="0"/>
+        </a:xfrm>
+      </p:grpSpPr>
+      <p:sp>
+        <p:nvSpPr>
+          <p:cNvPr id="2" name="Slide Image Placeholder 1"/>
+          <p:cNvSpPr>
+            <a:spLocks noGrp="1" noRot="1" noChangeAspect="1"/>
+          </p:cNvSpPr>
+          <p:nvPr>
+            <p:ph type="sldImg"/>
+          </p:nvPr>
+        </p:nvSpPr>
+        <p:spPr/>
+      </p:sp>
+      <p:sp>
+        <p:nvSpPr>
+          <p:cNvPr id="3" name="Notes Placeholder 2"/>
+          <p:cNvSpPr>
+            <a:spLocks noGrp="1"/>
+          </p:cNvSpPr>
+          <p:nvPr>
+            <p:ph type="body" idx="1"/>
+          </p:nvPr>
+        </p:nvSpPr>
+        <p:spPr/>
+        <p:txBody>
+          <a:bodyPr/>
+          <a:lstStyle/>
+          <a:p>
+            <a:r>
+              <a:rPr lang="en-US" dirty="0"/>
+              <a:t>There is one more thing required to make </a:t>
+            </a:r>
+            <a:r>
+              <a:rPr lang="en-US" dirty="0" err="1"/>
+              <a:t>statefulsets</a:t>
+            </a:r>
+            <a:r>
+              <a:rPr lang="en-US" dirty="0"/>
+              <a:t> work: a headless service</a:t>
+            </a:r>
+          </a:p>
+          <a:p>
+            <a:r>
+              <a:rPr lang="en-US" dirty="0"/>
+              <a:t>It allows you to connect directly to a pod while using </a:t>
+            </a:r>
+            <a:r>
+              <a:rPr lang="en-US" dirty="0" err="1"/>
+              <a:t>dns</a:t>
+            </a:r>
+            <a:r>
+              <a:rPr lang="en-US" dirty="0"/>
+              <a:t> names instead of IP addresses (remember – IP addresses in k8s are not stable)</a:t>
+            </a:r>
+          </a:p>
+          <a:p>
+            <a:r>
+              <a:rPr lang="en-US" dirty="0"/>
+              <a:t>A headless service is created, by specifying “None” as the value for “</a:t>
+            </a:r>
+            <a:r>
+              <a:rPr lang="en-US" dirty="0" err="1"/>
+              <a:t>ClusterIP</a:t>
+            </a:r>
+            <a:r>
+              <a:rPr lang="en-US" dirty="0"/>
+              <a:t>”. This will stop the cluster from creating an endpoint object with an IP address. Instead the service will only serve as DNS domain/entry point for your pods.</a:t>
+            </a:r>
+          </a:p>
+          <a:p>
+            <a:r>
+              <a:rPr lang="en-US" dirty="0"/>
+              <a:t>To connect to a pod use the stable network identifier the </a:t>
+            </a:r>
+            <a:r>
+              <a:rPr lang="en-US" dirty="0" err="1"/>
+              <a:t>statefulset</a:t>
+            </a:r>
+            <a:r>
+              <a:rPr lang="en-US" dirty="0"/>
+              <a:t> provides + the service name </a:t>
+            </a:r>
+            <a:r>
+              <a:rPr lang="en-US" dirty="0">
+                <a:sym typeface="Wingdings" panose="05000000000000000000" pitchFamily="2" charset="2"/>
+              </a:rPr>
+              <a:t> nginx-0.nginx</a:t>
+            </a:r>
+            <a:endParaRPr lang="en-US" dirty="0"/>
+          </a:p>
+        </p:txBody>
+      </p:sp>
+      <p:sp>
+        <p:nvSpPr>
+          <p:cNvPr id="4" name="Slide Number Placeholder 3"/>
+          <p:cNvSpPr>
+            <a:spLocks noGrp="1"/>
+          </p:cNvSpPr>
+          <p:nvPr>
+            <p:ph type="sldNum" sz="quarter" idx="10"/>
+          </p:nvPr>
+        </p:nvSpPr>
+        <p:spPr/>
+        <p:txBody>
+          <a:bodyPr/>
+          <a:lstStyle/>
+          <a:p>
+            <a:fld id="{7D8C2C35-2B8A-446E-BEC0-FD36716C29AC}" type="slidenum">
+              <a:rPr lang="de-DE" smtClean="0"/>
+              <a:pPr/>
+              <a:t>8</a:t>
+            </a:fld>
+            <a:endParaRPr lang="de-DE" dirty="0"/>
+          </a:p>
+        </p:txBody>
+      </p:sp>
+    </p:spTree>
+    <p:extLst>
+      <p:ext uri="{BB962C8B-B14F-4D97-AF65-F5344CB8AC3E}">
         <p14:creationId xmlns:p14="http://schemas.microsoft.com/office/powerpoint/2010/main" val="2082016458"/>
       </p:ext>
     </p:extLst>
@@ -4556,7 +4748,7 @@
 </p:notes>
 </file>
 
-<file path=ppt/notesSlides/notesSlide8.xml><?xml version="1.0" encoding="utf-8"?>
+<file path=ppt/notesSlides/notesSlide9.xml><?xml version="1.0" encoding="utf-8"?>
 <p:notes xmlns:a="http://schemas.openxmlformats.org/drawingml/2006/main" xmlns:r="http://schemas.openxmlformats.org/officeDocument/2006/relationships" xmlns:p="http://schemas.openxmlformats.org/presentationml/2006/main">
   <p:cSld>
     <p:spTree>
@@ -4591,7 +4783,7 @@
             <a:fld id="{7D8C2C35-2B8A-446E-BEC0-FD36716C29AC}" type="slidenum">
               <a:rPr lang="en-US" smtClean="0"/>
               <a:pPr/>
-              <a:t>9</a:t>
+              <a:t>10</a:t>
             </a:fld>
             <a:endParaRPr lang="en-US" dirty="0"/>
           </a:p>
@@ -18083,6 +18275,32 @@
 </p:sld>
 </file>
 
+<file path=ppt/slides/slide10.xml><?xml version="1.0" encoding="utf-8"?>
+<p:sld xmlns:a="http://schemas.openxmlformats.org/drawingml/2006/main" xmlns:r="http://schemas.openxmlformats.org/officeDocument/2006/relationships" xmlns:p="http://schemas.openxmlformats.org/presentationml/2006/main" show="0">
+  <p:cSld>
+    <p:spTree>
+      <p:nvGrpSpPr>
+        <p:cNvPr id="1" name=""/>
+        <p:cNvGrpSpPr/>
+        <p:nvPr/>
+      </p:nvGrpSpPr>
+      <p:grpSpPr>
+        <a:xfrm>
+          <a:off x="0" y="0"/>
+          <a:ext cx="0" cy="0"/>
+          <a:chOff x="0" y="0"/>
+          <a:chExt cx="0" cy="0"/>
+        </a:xfrm>
+      </p:grpSpPr>
+    </p:spTree>
+  </p:cSld>
+  <p:clrMapOvr>
+    <a:masterClrMapping/>
+  </p:clrMapOvr>
+  <p:transition spd="med"/>
+</p:sld>
+</file>
+
 <file path=ppt/slides/slide2.xml><?xml version="1.0" encoding="utf-8"?>
 <p:sld xmlns:a="http://schemas.openxmlformats.org/drawingml/2006/main" xmlns:r="http://schemas.openxmlformats.org/officeDocument/2006/relationships" xmlns:p="http://schemas.openxmlformats.org/presentationml/2006/main">
   <p:cSld>
@@ -18128,7 +18346,7 @@
           <a:p>
             <a:r>
               <a:rPr lang="en-US" dirty="0"/>
-              <a:t>Stateless Applications in K8s</a:t>
+              <a:t>Stateless Applications with Deployments</a:t>
             </a:r>
           </a:p>
         </p:txBody>
@@ -19039,8 +19257,1520 @@
             </a:r>
             <a:r>
               <a:rPr lang="en-US" dirty="0"/>
-              <a:t> Applications in K8s</a:t>
-            </a:r>
+              <a:t> Applications with Deployments</a:t>
+            </a:r>
+          </a:p>
+        </p:txBody>
+      </p:sp>
+      <p:grpSp>
+        <p:nvGrpSpPr>
+          <p:cNvPr id="8" name="Group 7">
+            <a:extLst>
+              <a:ext uri="{FF2B5EF4-FFF2-40B4-BE49-F238E27FC236}">
+                <a16:creationId xmlns:a16="http://schemas.microsoft.com/office/drawing/2014/main" id="{FE730751-0C23-4CBF-B622-7A5C2B17DDF7}"/>
+              </a:ext>
+            </a:extLst>
+          </p:cNvPr>
+          <p:cNvGrpSpPr/>
+          <p:nvPr/>
+        </p:nvGrpSpPr>
+        <p:grpSpPr>
+          <a:xfrm>
+            <a:off x="867648" y="3304032"/>
+            <a:ext cx="1522476" cy="1400556"/>
+            <a:chOff x="672085" y="3182112"/>
+            <a:chExt cx="1522476" cy="1400556"/>
+          </a:xfrm>
+        </p:grpSpPr>
+        <p:sp>
+          <p:nvSpPr>
+            <p:cNvPr id="4" name="Rectangle: Rounded Corners 3">
+              <a:extLst>
+                <a:ext uri="{FF2B5EF4-FFF2-40B4-BE49-F238E27FC236}">
+                  <a16:creationId xmlns:a16="http://schemas.microsoft.com/office/drawing/2014/main" id="{28A3E723-65F2-455C-885A-4D0AF9CED74E}"/>
+                </a:ext>
+              </a:extLst>
+            </p:cNvPr>
+            <p:cNvSpPr/>
+            <p:nvPr/>
+          </p:nvSpPr>
+          <p:spPr bwMode="gray">
+            <a:xfrm>
+              <a:off x="672085" y="3182112"/>
+              <a:ext cx="1522476" cy="1400556"/>
+            </a:xfrm>
+            <a:prstGeom prst="roundRect">
+              <a:avLst/>
+            </a:prstGeom>
+            <a:ln>
+              <a:headEnd/>
+              <a:tailEnd/>
+            </a:ln>
+          </p:spPr>
+          <p:style>
+            <a:lnRef idx="1">
+              <a:schemeClr val="accent2"/>
+            </a:lnRef>
+            <a:fillRef idx="2">
+              <a:schemeClr val="accent2"/>
+            </a:fillRef>
+            <a:effectRef idx="1">
+              <a:schemeClr val="accent2"/>
+            </a:effectRef>
+            <a:fontRef idx="minor">
+              <a:schemeClr val="dk1"/>
+            </a:fontRef>
+          </p:style>
+          <p:txBody>
+            <a:bodyPr lIns="90000" tIns="72000" rIns="90000" bIns="72000" rtlCol="0" anchor="ctr"/>
+            <a:lstStyle/>
+            <a:p>
+              <a:pPr marR="0" algn="ctr" defTabSz="914400" eaLnBrk="1" fontAlgn="base" latinLnBrk="0" hangingPunct="1">
+                <a:lnSpc>
+                  <a:spcPct val="100000"/>
+                </a:lnSpc>
+                <a:spcBef>
+                  <a:spcPct val="50000"/>
+                </a:spcBef>
+                <a:spcAft>
+                  <a:spcPct val="0"/>
+                </a:spcAft>
+                <a:buClr>
+                  <a:srgbClr val="F0AB00"/>
+                </a:buClr>
+                <a:buSzPct val="80000"/>
+                <a:tabLst/>
+              </a:pPr>
+              <a:endParaRPr kumimoji="0" lang="en-US" sz="1800" b="0" i="0" u="none" strike="noStrike" kern="0" cap="none" spc="0" normalizeH="0" baseline="0" noProof="0" dirty="0" err="1">
+                <a:ln>
+                  <a:noFill/>
+                </a:ln>
+                <a:effectLst/>
+                <a:uLnTx/>
+                <a:uFillTx/>
+                <a:ea typeface="Arial Unicode MS" pitchFamily="34" charset="-128"/>
+                <a:cs typeface="Arial Unicode MS" pitchFamily="34" charset="-128"/>
+              </a:endParaRPr>
+            </a:p>
+          </p:txBody>
+        </p:sp>
+        <p:sp>
+          <p:nvSpPr>
+            <p:cNvPr id="5" name="Rectangle 4">
+              <a:extLst>
+                <a:ext uri="{FF2B5EF4-FFF2-40B4-BE49-F238E27FC236}">
+                  <a16:creationId xmlns:a16="http://schemas.microsoft.com/office/drawing/2014/main" id="{75E739AC-B9F4-4716-8B8C-DBFF32BDF802}"/>
+                </a:ext>
+              </a:extLst>
+            </p:cNvPr>
+            <p:cNvSpPr/>
+            <p:nvPr/>
+          </p:nvSpPr>
+          <p:spPr bwMode="gray">
+            <a:xfrm>
+              <a:off x="872647" y="3472458"/>
+              <a:ext cx="1117498" cy="795956"/>
+            </a:xfrm>
+            <a:prstGeom prst="rect">
+              <a:avLst/>
+            </a:prstGeom>
+            <a:ln>
+              <a:headEnd/>
+              <a:tailEnd/>
+            </a:ln>
+          </p:spPr>
+          <p:style>
+            <a:lnRef idx="1">
+              <a:schemeClr val="accent1"/>
+            </a:lnRef>
+            <a:fillRef idx="2">
+              <a:schemeClr val="accent1"/>
+            </a:fillRef>
+            <a:effectRef idx="1">
+              <a:schemeClr val="accent1"/>
+            </a:effectRef>
+            <a:fontRef idx="minor">
+              <a:schemeClr val="dk1"/>
+            </a:fontRef>
+          </p:style>
+          <p:txBody>
+            <a:bodyPr lIns="90000" tIns="72000" rIns="90000" bIns="72000" rtlCol="0" anchor="ctr"/>
+            <a:lstStyle/>
+            <a:p>
+              <a:pPr marR="0" algn="ctr" defTabSz="914400" eaLnBrk="1" fontAlgn="base" latinLnBrk="0" hangingPunct="1">
+                <a:lnSpc>
+                  <a:spcPct val="100000"/>
+                </a:lnSpc>
+                <a:spcBef>
+                  <a:spcPct val="50000"/>
+                </a:spcBef>
+                <a:spcAft>
+                  <a:spcPct val="0"/>
+                </a:spcAft>
+                <a:buClr>
+                  <a:srgbClr val="F0AB00"/>
+                </a:buClr>
+                <a:buSzPct val="80000"/>
+                <a:tabLst/>
+              </a:pPr>
+              <a:r>
+                <a:rPr lang="de-DE" sz="1800" kern="0" dirty="0" err="1">
+                  <a:ea typeface="Arial Unicode MS" pitchFamily="34" charset="-128"/>
+                  <a:cs typeface="Arial Unicode MS" pitchFamily="34" charset="-128"/>
+                </a:rPr>
+                <a:t>nginx</a:t>
+              </a:r>
+              <a:endParaRPr kumimoji="0" lang="de-DE" sz="1800" b="0" i="0" u="none" strike="noStrike" kern="0" cap="none" spc="0" normalizeH="0" baseline="0" noProof="0" dirty="0">
+                <a:ln>
+                  <a:noFill/>
+                </a:ln>
+                <a:effectLst/>
+                <a:uLnTx/>
+                <a:uFillTx/>
+                <a:ea typeface="Arial Unicode MS" pitchFamily="34" charset="-128"/>
+                <a:cs typeface="Arial Unicode MS" pitchFamily="34" charset="-128"/>
+              </a:endParaRPr>
+            </a:p>
+          </p:txBody>
+        </p:sp>
+      </p:grpSp>
+      <p:sp>
+        <p:nvSpPr>
+          <p:cNvPr id="13" name="Arrow: Up-Down 12">
+            <a:extLst>
+              <a:ext uri="{FF2B5EF4-FFF2-40B4-BE49-F238E27FC236}">
+                <a16:creationId xmlns:a16="http://schemas.microsoft.com/office/drawing/2014/main" id="{1D991BED-152D-40E8-8DBE-BAD29B91FA53}"/>
+              </a:ext>
+            </a:extLst>
+          </p:cNvPr>
+          <p:cNvSpPr/>
+          <p:nvPr/>
+        </p:nvSpPr>
+        <p:spPr bwMode="gray">
+          <a:xfrm rot="1741646">
+            <a:off x="2494842" y="2332028"/>
+            <a:ext cx="222219" cy="845820"/>
+          </a:xfrm>
+          <a:prstGeom prst="upDownArrow">
+            <a:avLst/>
+          </a:prstGeom>
+          <a:ln>
+            <a:headEnd/>
+            <a:tailEnd/>
+          </a:ln>
+        </p:spPr>
+        <p:style>
+          <a:lnRef idx="1">
+            <a:schemeClr val="accent2"/>
+          </a:lnRef>
+          <a:fillRef idx="2">
+            <a:schemeClr val="accent2"/>
+          </a:fillRef>
+          <a:effectRef idx="1">
+            <a:schemeClr val="accent2"/>
+          </a:effectRef>
+          <a:fontRef idx="minor">
+            <a:schemeClr val="dk1"/>
+          </a:fontRef>
+        </p:style>
+        <p:txBody>
+          <a:bodyPr lIns="90000" tIns="72000" rIns="90000" bIns="72000" rtlCol="0" anchor="ctr"/>
+          <a:lstStyle/>
+          <a:p>
+            <a:pPr algn="ctr" defTabSz="914400" fontAlgn="base">
+              <a:spcBef>
+                <a:spcPct val="50000"/>
+              </a:spcBef>
+              <a:spcAft>
+                <a:spcPct val="0"/>
+              </a:spcAft>
+              <a:buClr>
+                <a:srgbClr val="F0AB00"/>
+              </a:buClr>
+              <a:buSzPct val="80000"/>
+            </a:pPr>
+            <a:endParaRPr lang="en-US" sz="1800" kern="0" dirty="0" err="1">
+              <a:solidFill>
+                <a:schemeClr val="dk1"/>
+              </a:solidFill>
+              <a:latin typeface="+mn-lt"/>
+              <a:ea typeface="Arial Unicode MS" pitchFamily="34" charset="-128"/>
+            </a:endParaRPr>
+          </a:p>
+        </p:txBody>
+      </p:sp>
+      <p:sp>
+        <p:nvSpPr>
+          <p:cNvPr id="28" name="Cylinder 27">
+            <a:extLst>
+              <a:ext uri="{FF2B5EF4-FFF2-40B4-BE49-F238E27FC236}">
+                <a16:creationId xmlns:a16="http://schemas.microsoft.com/office/drawing/2014/main" id="{B4A5B1C2-DB0D-44AE-B330-B6BD669C69C3}"/>
+              </a:ext>
+            </a:extLst>
+          </p:cNvPr>
+          <p:cNvSpPr/>
+          <p:nvPr/>
+        </p:nvSpPr>
+        <p:spPr bwMode="gray">
+          <a:xfrm>
+            <a:off x="1129776" y="5492023"/>
+            <a:ext cx="998220" cy="1004248"/>
+          </a:xfrm>
+          <a:prstGeom prst="can">
+            <a:avLst/>
+          </a:prstGeom>
+          <a:ln>
+            <a:headEnd/>
+            <a:tailEnd/>
+          </a:ln>
+        </p:spPr>
+        <p:style>
+          <a:lnRef idx="1">
+            <a:schemeClr val="accent2"/>
+          </a:lnRef>
+          <a:fillRef idx="2">
+            <a:schemeClr val="accent2"/>
+          </a:fillRef>
+          <a:effectRef idx="1">
+            <a:schemeClr val="accent2"/>
+          </a:effectRef>
+          <a:fontRef idx="minor">
+            <a:schemeClr val="dk1"/>
+          </a:fontRef>
+        </p:style>
+        <p:txBody>
+          <a:bodyPr lIns="90000" tIns="72000" rIns="90000" bIns="72000" rtlCol="0" anchor="ctr"/>
+          <a:lstStyle/>
+          <a:p>
+            <a:pPr algn="ctr" defTabSz="914400" fontAlgn="base">
+              <a:spcBef>
+                <a:spcPct val="50000"/>
+              </a:spcBef>
+              <a:spcAft>
+                <a:spcPct val="0"/>
+              </a:spcAft>
+              <a:buClr>
+                <a:srgbClr val="F0AB00"/>
+              </a:buClr>
+              <a:buSzPct val="80000"/>
+            </a:pPr>
+            <a:r>
+              <a:rPr lang="de-DE" sz="1800" kern="0" dirty="0" err="1">
+                <a:ea typeface="Arial Unicode MS" pitchFamily="34" charset="-128"/>
+              </a:rPr>
+              <a:t>content</a:t>
+            </a:r>
+            <a:endParaRPr lang="de-DE" sz="1800" kern="0" dirty="0">
+              <a:ea typeface="Arial Unicode MS" pitchFamily="34" charset="-128"/>
+            </a:endParaRPr>
+          </a:p>
+        </p:txBody>
+      </p:sp>
+      <p:sp>
+        <p:nvSpPr>
+          <p:cNvPr id="29" name="Arrow: Up-Down 28">
+            <a:extLst>
+              <a:ext uri="{FF2B5EF4-FFF2-40B4-BE49-F238E27FC236}">
+                <a16:creationId xmlns:a16="http://schemas.microsoft.com/office/drawing/2014/main" id="{1566EADF-ABBB-4026-968C-D82415201052}"/>
+              </a:ext>
+            </a:extLst>
+          </p:cNvPr>
+          <p:cNvSpPr/>
+          <p:nvPr/>
+        </p:nvSpPr>
+        <p:spPr bwMode="gray">
+          <a:xfrm>
+            <a:off x="1517777" y="4820805"/>
+            <a:ext cx="222219" cy="555001"/>
+          </a:xfrm>
+          <a:prstGeom prst="upDownArrow">
+            <a:avLst/>
+          </a:prstGeom>
+          <a:ln>
+            <a:headEnd/>
+            <a:tailEnd/>
+          </a:ln>
+        </p:spPr>
+        <p:style>
+          <a:lnRef idx="1">
+            <a:schemeClr val="accent2"/>
+          </a:lnRef>
+          <a:fillRef idx="2">
+            <a:schemeClr val="accent2"/>
+          </a:fillRef>
+          <a:effectRef idx="1">
+            <a:schemeClr val="accent2"/>
+          </a:effectRef>
+          <a:fontRef idx="minor">
+            <a:schemeClr val="dk1"/>
+          </a:fontRef>
+        </p:style>
+        <p:txBody>
+          <a:bodyPr lIns="90000" tIns="72000" rIns="90000" bIns="72000" rtlCol="0" anchor="ctr"/>
+          <a:lstStyle/>
+          <a:p>
+            <a:pPr algn="ctr" defTabSz="914400" fontAlgn="base">
+              <a:spcBef>
+                <a:spcPct val="50000"/>
+              </a:spcBef>
+              <a:spcAft>
+                <a:spcPct val="0"/>
+              </a:spcAft>
+              <a:buClr>
+                <a:srgbClr val="F0AB00"/>
+              </a:buClr>
+              <a:buSzPct val="80000"/>
+            </a:pPr>
+            <a:endParaRPr lang="en-US" sz="1800" kern="0" dirty="0" err="1">
+              <a:solidFill>
+                <a:schemeClr val="dk1"/>
+              </a:solidFill>
+              <a:latin typeface="+mn-lt"/>
+              <a:ea typeface="Arial Unicode MS" pitchFamily="34" charset="-128"/>
+            </a:endParaRPr>
+          </a:p>
+        </p:txBody>
+      </p:sp>
+      <p:sp>
+        <p:nvSpPr>
+          <p:cNvPr id="36" name="Speech Bubble: Rectangle 35">
+            <a:extLst>
+              <a:ext uri="{FF2B5EF4-FFF2-40B4-BE49-F238E27FC236}">
+                <a16:creationId xmlns:a16="http://schemas.microsoft.com/office/drawing/2014/main" id="{F600065E-738E-4ECD-A842-9CB540B0A625}"/>
+              </a:ext>
+            </a:extLst>
+          </p:cNvPr>
+          <p:cNvSpPr/>
+          <p:nvPr/>
+        </p:nvSpPr>
+        <p:spPr bwMode="gray">
+          <a:xfrm>
+            <a:off x="7189848" y="1080313"/>
+            <a:ext cx="4101737" cy="712107"/>
+          </a:xfrm>
+          <a:prstGeom prst="wedgeRectCallout">
+            <a:avLst>
+              <a:gd name="adj1" fmla="val -71257"/>
+              <a:gd name="adj2" fmla="val 169481"/>
+            </a:avLst>
+          </a:prstGeom>
+          <a:ln>
+            <a:headEnd/>
+            <a:tailEnd/>
+          </a:ln>
+        </p:spPr>
+        <p:style>
+          <a:lnRef idx="2">
+            <a:schemeClr val="accent5"/>
+          </a:lnRef>
+          <a:fillRef idx="1">
+            <a:schemeClr val="lt1"/>
+          </a:fillRef>
+          <a:effectRef idx="0">
+            <a:schemeClr val="accent5"/>
+          </a:effectRef>
+          <a:fontRef idx="minor">
+            <a:schemeClr val="dk1"/>
+          </a:fontRef>
+        </p:style>
+        <p:txBody>
+          <a:bodyPr lIns="90000" tIns="72000" rIns="90000" bIns="72000" rtlCol="0" anchor="ctr"/>
+          <a:lstStyle/>
+          <a:p>
+            <a:pPr marR="0" algn="ctr" defTabSz="914400" eaLnBrk="1" fontAlgn="base" latinLnBrk="0" hangingPunct="1">
+              <a:lnSpc>
+                <a:spcPct val="100000"/>
+              </a:lnSpc>
+              <a:spcBef>
+                <a:spcPct val="50000"/>
+              </a:spcBef>
+              <a:spcAft>
+                <a:spcPct val="0"/>
+              </a:spcAft>
+              <a:buClr>
+                <a:srgbClr val="F0AB00"/>
+              </a:buClr>
+              <a:buSzPct val="80000"/>
+              <a:tabLst/>
+            </a:pPr>
+            <a:r>
+              <a:rPr kumimoji="0" lang="en-US" sz="1800" b="0" i="0" u="none" strike="noStrike" kern="0" cap="none" spc="0" normalizeH="0" baseline="0" noProof="0" dirty="0">
+                <a:ln>
+                  <a:noFill/>
+                </a:ln>
+                <a:effectLst/>
+                <a:uLnTx/>
+                <a:uFillTx/>
+                <a:ea typeface="Arial Unicode MS" pitchFamily="34" charset="-128"/>
+                <a:cs typeface="Arial Unicode MS" pitchFamily="34" charset="-128"/>
+              </a:rPr>
+              <a:t>Each deployment is expose via a separate service</a:t>
+            </a:r>
+          </a:p>
+        </p:txBody>
+      </p:sp>
+      <p:sp>
+        <p:nvSpPr>
+          <p:cNvPr id="37" name="Speech Bubble: Rectangle 36">
+            <a:extLst>
+              <a:ext uri="{FF2B5EF4-FFF2-40B4-BE49-F238E27FC236}">
+                <a16:creationId xmlns:a16="http://schemas.microsoft.com/office/drawing/2014/main" id="{168300E2-1254-40B8-9F28-2041B6D7AD71}"/>
+              </a:ext>
+            </a:extLst>
+          </p:cNvPr>
+          <p:cNvSpPr/>
+          <p:nvPr/>
+        </p:nvSpPr>
+        <p:spPr bwMode="gray">
+          <a:xfrm>
+            <a:off x="8425596" y="2917595"/>
+            <a:ext cx="3096637" cy="1093951"/>
+          </a:xfrm>
+          <a:prstGeom prst="wedgeRectCallout">
+            <a:avLst>
+              <a:gd name="adj1" fmla="val -75408"/>
+              <a:gd name="adj2" fmla="val 39243"/>
+            </a:avLst>
+          </a:prstGeom>
+          <a:ln>
+            <a:headEnd/>
+            <a:tailEnd/>
+          </a:ln>
+        </p:spPr>
+        <p:style>
+          <a:lnRef idx="2">
+            <a:schemeClr val="accent5"/>
+          </a:lnRef>
+          <a:fillRef idx="1">
+            <a:schemeClr val="lt1"/>
+          </a:fillRef>
+          <a:effectRef idx="0">
+            <a:schemeClr val="accent5"/>
+          </a:effectRef>
+          <a:fontRef idx="minor">
+            <a:schemeClr val="dk1"/>
+          </a:fontRef>
+        </p:style>
+        <p:txBody>
+          <a:bodyPr lIns="90000" tIns="72000" rIns="90000" bIns="72000" rtlCol="0" anchor="ctr"/>
+          <a:lstStyle/>
+          <a:p>
+            <a:pPr marR="0" algn="ctr" defTabSz="914400" eaLnBrk="1" fontAlgn="base" latinLnBrk="0" hangingPunct="1">
+              <a:lnSpc>
+                <a:spcPct val="100000"/>
+              </a:lnSpc>
+              <a:spcBef>
+                <a:spcPct val="50000"/>
+              </a:spcBef>
+              <a:spcAft>
+                <a:spcPct val="0"/>
+              </a:spcAft>
+              <a:buClr>
+                <a:srgbClr val="F0AB00"/>
+              </a:buClr>
+              <a:buSzPct val="80000"/>
+              <a:tabLst/>
+            </a:pPr>
+            <a:r>
+              <a:rPr kumimoji="0" lang="en-US" sz="1800" b="0" i="0" u="none" strike="noStrike" kern="0" cap="none" spc="0" normalizeH="0" baseline="0" noProof="0" dirty="0">
+                <a:ln>
+                  <a:noFill/>
+                </a:ln>
+                <a:effectLst/>
+                <a:uLnTx/>
+                <a:uFillTx/>
+                <a:ea typeface="Arial Unicode MS" pitchFamily="34" charset="-128"/>
+                <a:cs typeface="Arial Unicode MS" pitchFamily="34" charset="-128"/>
+              </a:rPr>
+              <a:t>1 new deployment per required replica, deployment cannot scale itself</a:t>
+            </a:r>
+          </a:p>
+        </p:txBody>
+      </p:sp>
+      <p:sp>
+        <p:nvSpPr>
+          <p:cNvPr id="38" name="Speech Bubble: Rectangle 37">
+            <a:extLst>
+              <a:ext uri="{FF2B5EF4-FFF2-40B4-BE49-F238E27FC236}">
+                <a16:creationId xmlns:a16="http://schemas.microsoft.com/office/drawing/2014/main" id="{002EB181-E32C-493A-83B7-088FD04CCE0E}"/>
+              </a:ext>
+            </a:extLst>
+          </p:cNvPr>
+          <p:cNvSpPr/>
+          <p:nvPr/>
+        </p:nvSpPr>
+        <p:spPr bwMode="gray">
+          <a:xfrm>
+            <a:off x="8395256" y="5672346"/>
+            <a:ext cx="3055644" cy="643601"/>
+          </a:xfrm>
+          <a:prstGeom prst="wedgeRectCallout">
+            <a:avLst>
+              <a:gd name="adj1" fmla="val -84125"/>
+              <a:gd name="adj2" fmla="val 2221"/>
+            </a:avLst>
+          </a:prstGeom>
+          <a:ln>
+            <a:headEnd/>
+            <a:tailEnd/>
+          </a:ln>
+        </p:spPr>
+        <p:style>
+          <a:lnRef idx="2">
+            <a:schemeClr val="accent5"/>
+          </a:lnRef>
+          <a:fillRef idx="1">
+            <a:schemeClr val="lt1"/>
+          </a:fillRef>
+          <a:effectRef idx="0">
+            <a:schemeClr val="accent5"/>
+          </a:effectRef>
+          <a:fontRef idx="minor">
+            <a:schemeClr val="dk1"/>
+          </a:fontRef>
+        </p:style>
+        <p:txBody>
+          <a:bodyPr lIns="90000" tIns="72000" rIns="90000" bIns="72000" rtlCol="0" anchor="ctr"/>
+          <a:lstStyle/>
+          <a:p>
+            <a:pPr marR="0" algn="ctr" defTabSz="914400" eaLnBrk="1" fontAlgn="base" latinLnBrk="0" hangingPunct="1">
+              <a:lnSpc>
+                <a:spcPct val="100000"/>
+              </a:lnSpc>
+              <a:spcBef>
+                <a:spcPct val="50000"/>
+              </a:spcBef>
+              <a:spcAft>
+                <a:spcPct val="0"/>
+              </a:spcAft>
+              <a:buClr>
+                <a:srgbClr val="F0AB00"/>
+              </a:buClr>
+              <a:buSzPct val="80000"/>
+              <a:tabLst/>
+            </a:pPr>
+            <a:r>
+              <a:rPr kumimoji="0" lang="en-US" sz="1800" b="0" i="0" u="none" strike="noStrike" kern="0" cap="none" spc="0" normalizeH="0" baseline="0" noProof="0" dirty="0">
+                <a:ln>
+                  <a:noFill/>
+                </a:ln>
+                <a:effectLst/>
+                <a:uLnTx/>
+                <a:uFillTx/>
+                <a:ea typeface="Arial Unicode MS" pitchFamily="34" charset="-128"/>
+                <a:cs typeface="Arial Unicode MS" pitchFamily="34" charset="-128"/>
+              </a:rPr>
+              <a:t>Manually created &amp; assigned storage required</a:t>
+            </a:r>
+          </a:p>
+        </p:txBody>
+      </p:sp>
+      <p:grpSp>
+        <p:nvGrpSpPr>
+          <p:cNvPr id="17" name="Group 16">
+            <a:extLst>
+              <a:ext uri="{FF2B5EF4-FFF2-40B4-BE49-F238E27FC236}">
+                <a16:creationId xmlns:a16="http://schemas.microsoft.com/office/drawing/2014/main" id="{C4932C4C-2F4B-4794-870E-382937401C86}"/>
+              </a:ext>
+            </a:extLst>
+          </p:cNvPr>
+          <p:cNvGrpSpPr/>
+          <p:nvPr/>
+        </p:nvGrpSpPr>
+        <p:grpSpPr>
+          <a:xfrm>
+            <a:off x="3317980" y="3304032"/>
+            <a:ext cx="1522476" cy="1400556"/>
+            <a:chOff x="672085" y="3182112"/>
+            <a:chExt cx="1522476" cy="1400556"/>
+          </a:xfrm>
+        </p:grpSpPr>
+        <p:sp>
+          <p:nvSpPr>
+            <p:cNvPr id="18" name="Rectangle: Rounded Corners 17">
+              <a:extLst>
+                <a:ext uri="{FF2B5EF4-FFF2-40B4-BE49-F238E27FC236}">
+                  <a16:creationId xmlns:a16="http://schemas.microsoft.com/office/drawing/2014/main" id="{D1D3B9FF-9EE8-451A-A17C-DD78B2399451}"/>
+                </a:ext>
+              </a:extLst>
+            </p:cNvPr>
+            <p:cNvSpPr/>
+            <p:nvPr/>
+          </p:nvSpPr>
+          <p:spPr bwMode="gray">
+            <a:xfrm>
+              <a:off x="672085" y="3182112"/>
+              <a:ext cx="1522476" cy="1400556"/>
+            </a:xfrm>
+            <a:prstGeom prst="roundRect">
+              <a:avLst/>
+            </a:prstGeom>
+            <a:ln>
+              <a:headEnd/>
+              <a:tailEnd/>
+            </a:ln>
+          </p:spPr>
+          <p:style>
+            <a:lnRef idx="1">
+              <a:schemeClr val="accent2"/>
+            </a:lnRef>
+            <a:fillRef idx="2">
+              <a:schemeClr val="accent2"/>
+            </a:fillRef>
+            <a:effectRef idx="1">
+              <a:schemeClr val="accent2"/>
+            </a:effectRef>
+            <a:fontRef idx="minor">
+              <a:schemeClr val="dk1"/>
+            </a:fontRef>
+          </p:style>
+          <p:txBody>
+            <a:bodyPr lIns="90000" tIns="72000" rIns="90000" bIns="72000" rtlCol="0" anchor="ctr"/>
+            <a:lstStyle/>
+            <a:p>
+              <a:pPr marR="0" algn="ctr" defTabSz="914400" eaLnBrk="1" fontAlgn="base" latinLnBrk="0" hangingPunct="1">
+                <a:lnSpc>
+                  <a:spcPct val="100000"/>
+                </a:lnSpc>
+                <a:spcBef>
+                  <a:spcPct val="50000"/>
+                </a:spcBef>
+                <a:spcAft>
+                  <a:spcPct val="0"/>
+                </a:spcAft>
+                <a:buClr>
+                  <a:srgbClr val="F0AB00"/>
+                </a:buClr>
+                <a:buSzPct val="80000"/>
+                <a:tabLst/>
+              </a:pPr>
+              <a:endParaRPr kumimoji="0" lang="en-US" sz="1800" b="0" i="0" u="none" strike="noStrike" kern="0" cap="none" spc="0" normalizeH="0" baseline="0" noProof="0" dirty="0" err="1">
+                <a:ln>
+                  <a:noFill/>
+                </a:ln>
+                <a:effectLst/>
+                <a:uLnTx/>
+                <a:uFillTx/>
+                <a:ea typeface="Arial Unicode MS" pitchFamily="34" charset="-128"/>
+                <a:cs typeface="Arial Unicode MS" pitchFamily="34" charset="-128"/>
+              </a:endParaRPr>
+            </a:p>
+          </p:txBody>
+        </p:sp>
+        <p:sp>
+          <p:nvSpPr>
+            <p:cNvPr id="19" name="Rectangle 18">
+              <a:extLst>
+                <a:ext uri="{FF2B5EF4-FFF2-40B4-BE49-F238E27FC236}">
+                  <a16:creationId xmlns:a16="http://schemas.microsoft.com/office/drawing/2014/main" id="{E37F92BB-8EDE-42AD-BB0C-8ABF245DF183}"/>
+                </a:ext>
+              </a:extLst>
+            </p:cNvPr>
+            <p:cNvSpPr/>
+            <p:nvPr/>
+          </p:nvSpPr>
+          <p:spPr bwMode="gray">
+            <a:xfrm>
+              <a:off x="872647" y="3472458"/>
+              <a:ext cx="1117498" cy="795956"/>
+            </a:xfrm>
+            <a:prstGeom prst="rect">
+              <a:avLst/>
+            </a:prstGeom>
+            <a:ln>
+              <a:headEnd/>
+              <a:tailEnd/>
+            </a:ln>
+          </p:spPr>
+          <p:style>
+            <a:lnRef idx="1">
+              <a:schemeClr val="accent1"/>
+            </a:lnRef>
+            <a:fillRef idx="2">
+              <a:schemeClr val="accent1"/>
+            </a:fillRef>
+            <a:effectRef idx="1">
+              <a:schemeClr val="accent1"/>
+            </a:effectRef>
+            <a:fontRef idx="minor">
+              <a:schemeClr val="dk1"/>
+            </a:fontRef>
+          </p:style>
+          <p:txBody>
+            <a:bodyPr lIns="90000" tIns="72000" rIns="90000" bIns="72000" rtlCol="0" anchor="ctr"/>
+            <a:lstStyle/>
+            <a:p>
+              <a:pPr marR="0" algn="ctr" defTabSz="914400" eaLnBrk="1" fontAlgn="base" latinLnBrk="0" hangingPunct="1">
+                <a:lnSpc>
+                  <a:spcPct val="100000"/>
+                </a:lnSpc>
+                <a:spcBef>
+                  <a:spcPct val="50000"/>
+                </a:spcBef>
+                <a:spcAft>
+                  <a:spcPct val="0"/>
+                </a:spcAft>
+                <a:buClr>
+                  <a:srgbClr val="F0AB00"/>
+                </a:buClr>
+                <a:buSzPct val="80000"/>
+                <a:tabLst/>
+              </a:pPr>
+              <a:r>
+                <a:rPr lang="de-DE" sz="1800" kern="0" dirty="0" err="1">
+                  <a:ea typeface="Arial Unicode MS" pitchFamily="34" charset="-128"/>
+                  <a:cs typeface="Arial Unicode MS" pitchFamily="34" charset="-128"/>
+                </a:rPr>
+                <a:t>nginx</a:t>
+              </a:r>
+              <a:endParaRPr kumimoji="0" lang="de-DE" sz="1800" b="0" i="0" u="none" strike="noStrike" kern="0" cap="none" spc="0" normalizeH="0" baseline="0" noProof="0" dirty="0">
+                <a:ln>
+                  <a:noFill/>
+                </a:ln>
+                <a:effectLst/>
+                <a:uLnTx/>
+                <a:uFillTx/>
+                <a:ea typeface="Arial Unicode MS" pitchFamily="34" charset="-128"/>
+                <a:cs typeface="Arial Unicode MS" pitchFamily="34" charset="-128"/>
+              </a:endParaRPr>
+            </a:p>
+          </p:txBody>
+        </p:sp>
+      </p:grpSp>
+      <p:sp>
+        <p:nvSpPr>
+          <p:cNvPr id="20" name="Cloud 19">
+            <a:extLst>
+              <a:ext uri="{FF2B5EF4-FFF2-40B4-BE49-F238E27FC236}">
+                <a16:creationId xmlns:a16="http://schemas.microsoft.com/office/drawing/2014/main" id="{F338E976-B50E-498B-8392-8F48022CCE39}"/>
+              </a:ext>
+            </a:extLst>
+          </p:cNvPr>
+          <p:cNvSpPr/>
+          <p:nvPr/>
+        </p:nvSpPr>
+        <p:spPr bwMode="gray">
+          <a:xfrm>
+            <a:off x="2954333" y="1135031"/>
+            <a:ext cx="2249770" cy="1106406"/>
+          </a:xfrm>
+          <a:prstGeom prst="cloud">
+            <a:avLst/>
+          </a:prstGeom>
+          <a:solidFill>
+            <a:schemeClr val="accent1"/>
+          </a:solidFill>
+          <a:ln w="6350" algn="ctr">
+            <a:noFill/>
+            <a:miter lim="800000"/>
+            <a:headEnd/>
+            <a:tailEnd/>
+          </a:ln>
+        </p:spPr>
+        <p:txBody>
+          <a:bodyPr lIns="90000" tIns="72000" rIns="90000" bIns="72000" rtlCol="0" anchor="ctr"/>
+          <a:lstStyle/>
+          <a:p>
+            <a:pPr marR="0" algn="ctr" defTabSz="914400" eaLnBrk="1" fontAlgn="base" latinLnBrk="0" hangingPunct="1">
+              <a:lnSpc>
+                <a:spcPct val="100000"/>
+              </a:lnSpc>
+              <a:spcBef>
+                <a:spcPct val="50000"/>
+              </a:spcBef>
+              <a:spcAft>
+                <a:spcPct val="0"/>
+              </a:spcAft>
+              <a:buClr>
+                <a:srgbClr val="F0AB00"/>
+              </a:buClr>
+              <a:buSzPct val="80000"/>
+              <a:tabLst/>
+            </a:pPr>
+            <a:endParaRPr kumimoji="0" lang="en-US" sz="1800" b="0" i="0" u="none" strike="noStrike" kern="0" cap="none" spc="0" normalizeH="0" baseline="0" noProof="0" dirty="0" err="1">
+              <a:ln>
+                <a:noFill/>
+              </a:ln>
+              <a:effectLst/>
+              <a:uLnTx/>
+              <a:uFillTx/>
+              <a:ea typeface="Arial Unicode MS" pitchFamily="34" charset="-128"/>
+              <a:cs typeface="Arial Unicode MS" pitchFamily="34" charset="-128"/>
+            </a:endParaRPr>
+          </a:p>
+        </p:txBody>
+      </p:sp>
+      <p:sp>
+        <p:nvSpPr>
+          <p:cNvPr id="21" name="Arrow: Up-Down 20">
+            <a:extLst>
+              <a:ext uri="{FF2B5EF4-FFF2-40B4-BE49-F238E27FC236}">
+                <a16:creationId xmlns:a16="http://schemas.microsoft.com/office/drawing/2014/main" id="{B4666458-79BF-4922-95C7-CEA2FB8943E0}"/>
+              </a:ext>
+            </a:extLst>
+          </p:cNvPr>
+          <p:cNvSpPr/>
+          <p:nvPr/>
+        </p:nvSpPr>
+        <p:spPr bwMode="gray">
+          <a:xfrm>
+            <a:off x="3968109" y="2337423"/>
+            <a:ext cx="222219" cy="845820"/>
+          </a:xfrm>
+          <a:prstGeom prst="upDownArrow">
+            <a:avLst/>
+          </a:prstGeom>
+          <a:ln>
+            <a:headEnd/>
+            <a:tailEnd/>
+          </a:ln>
+        </p:spPr>
+        <p:style>
+          <a:lnRef idx="1">
+            <a:schemeClr val="accent2"/>
+          </a:lnRef>
+          <a:fillRef idx="2">
+            <a:schemeClr val="accent2"/>
+          </a:fillRef>
+          <a:effectRef idx="1">
+            <a:schemeClr val="accent2"/>
+          </a:effectRef>
+          <a:fontRef idx="minor">
+            <a:schemeClr val="dk1"/>
+          </a:fontRef>
+        </p:style>
+        <p:txBody>
+          <a:bodyPr lIns="90000" tIns="72000" rIns="90000" bIns="72000" rtlCol="0" anchor="ctr"/>
+          <a:lstStyle/>
+          <a:p>
+            <a:pPr algn="ctr" defTabSz="914400" fontAlgn="base">
+              <a:spcBef>
+                <a:spcPct val="50000"/>
+              </a:spcBef>
+              <a:spcAft>
+                <a:spcPct val="0"/>
+              </a:spcAft>
+              <a:buClr>
+                <a:srgbClr val="F0AB00"/>
+              </a:buClr>
+              <a:buSzPct val="80000"/>
+            </a:pPr>
+            <a:endParaRPr lang="en-US" sz="1800" kern="0" dirty="0" err="1">
+              <a:solidFill>
+                <a:schemeClr val="dk1"/>
+              </a:solidFill>
+              <a:latin typeface="+mn-lt"/>
+              <a:ea typeface="Arial Unicode MS" pitchFamily="34" charset="-128"/>
+            </a:endParaRPr>
+          </a:p>
+        </p:txBody>
+      </p:sp>
+      <p:pic>
+        <p:nvPicPr>
+          <p:cNvPr id="22" name="Graphic 21" descr="User">
+            <a:extLst>
+              <a:ext uri="{FF2B5EF4-FFF2-40B4-BE49-F238E27FC236}">
+                <a16:creationId xmlns:a16="http://schemas.microsoft.com/office/drawing/2014/main" id="{41EAE213-E974-4715-AD27-084B3817A7D1}"/>
+              </a:ext>
+            </a:extLst>
+          </p:cNvPr>
+          <p:cNvPicPr>
+            <a:picLocks noChangeAspect="1"/>
+          </p:cNvPicPr>
+          <p:nvPr/>
+        </p:nvPicPr>
+        <p:blipFill>
+          <a:blip r:embed="rId3">
+            <a:extLst>
+              <a:ext uri="{96DAC541-7B7A-43D3-8B79-37D633B846F1}">
+                <asvg:svgBlip xmlns:asvg="http://schemas.microsoft.com/office/drawing/2016/SVG/main" r:embed="rId4"/>
+              </a:ext>
+            </a:extLst>
+          </a:blip>
+          <a:stretch>
+            <a:fillRect/>
+          </a:stretch>
+        </p:blipFill>
+        <p:spPr>
+          <a:xfrm>
+            <a:off x="3622018" y="1250445"/>
+            <a:ext cx="914400" cy="914400"/>
+          </a:xfrm>
+          <a:prstGeom prst="rect">
+            <a:avLst/>
+          </a:prstGeom>
+        </p:spPr>
+      </p:pic>
+      <p:sp>
+        <p:nvSpPr>
+          <p:cNvPr id="23" name="Cylinder 22">
+            <a:extLst>
+              <a:ext uri="{FF2B5EF4-FFF2-40B4-BE49-F238E27FC236}">
+                <a16:creationId xmlns:a16="http://schemas.microsoft.com/office/drawing/2014/main" id="{AF09027E-988A-44DE-8160-FE0BF9949F1F}"/>
+              </a:ext>
+            </a:extLst>
+          </p:cNvPr>
+          <p:cNvSpPr/>
+          <p:nvPr/>
+        </p:nvSpPr>
+        <p:spPr bwMode="gray">
+          <a:xfrm>
+            <a:off x="3580108" y="5492023"/>
+            <a:ext cx="998220" cy="1004248"/>
+          </a:xfrm>
+          <a:prstGeom prst="can">
+            <a:avLst/>
+          </a:prstGeom>
+          <a:ln>
+            <a:headEnd/>
+            <a:tailEnd/>
+          </a:ln>
+        </p:spPr>
+        <p:style>
+          <a:lnRef idx="1">
+            <a:schemeClr val="accent2"/>
+          </a:lnRef>
+          <a:fillRef idx="2">
+            <a:schemeClr val="accent2"/>
+          </a:fillRef>
+          <a:effectRef idx="1">
+            <a:schemeClr val="accent2"/>
+          </a:effectRef>
+          <a:fontRef idx="minor">
+            <a:schemeClr val="dk1"/>
+          </a:fontRef>
+        </p:style>
+        <p:txBody>
+          <a:bodyPr lIns="90000" tIns="72000" rIns="90000" bIns="72000" rtlCol="0" anchor="ctr"/>
+          <a:lstStyle/>
+          <a:p>
+            <a:pPr algn="ctr" defTabSz="914400" fontAlgn="base">
+              <a:spcBef>
+                <a:spcPct val="50000"/>
+              </a:spcBef>
+              <a:spcAft>
+                <a:spcPct val="0"/>
+              </a:spcAft>
+              <a:buClr>
+                <a:srgbClr val="F0AB00"/>
+              </a:buClr>
+              <a:buSzPct val="80000"/>
+            </a:pPr>
+            <a:r>
+              <a:rPr lang="de-DE" sz="1800" kern="0" dirty="0" err="1">
+                <a:ea typeface="Arial Unicode MS" pitchFamily="34" charset="-128"/>
+              </a:rPr>
+              <a:t>content</a:t>
+            </a:r>
+            <a:endParaRPr lang="de-DE" sz="1800" kern="0" dirty="0">
+              <a:ea typeface="Arial Unicode MS" pitchFamily="34" charset="-128"/>
+            </a:endParaRPr>
+          </a:p>
+        </p:txBody>
+      </p:sp>
+      <p:sp>
+        <p:nvSpPr>
+          <p:cNvPr id="24" name="Arrow: Up-Down 23">
+            <a:extLst>
+              <a:ext uri="{FF2B5EF4-FFF2-40B4-BE49-F238E27FC236}">
+                <a16:creationId xmlns:a16="http://schemas.microsoft.com/office/drawing/2014/main" id="{49821A11-078B-4F78-B0C4-1797083F164B}"/>
+              </a:ext>
+            </a:extLst>
+          </p:cNvPr>
+          <p:cNvSpPr/>
+          <p:nvPr/>
+        </p:nvSpPr>
+        <p:spPr bwMode="gray">
+          <a:xfrm>
+            <a:off x="3968109" y="4820805"/>
+            <a:ext cx="222219" cy="555001"/>
+          </a:xfrm>
+          <a:prstGeom prst="upDownArrow">
+            <a:avLst/>
+          </a:prstGeom>
+          <a:ln>
+            <a:headEnd/>
+            <a:tailEnd/>
+          </a:ln>
+        </p:spPr>
+        <p:style>
+          <a:lnRef idx="1">
+            <a:schemeClr val="accent2"/>
+          </a:lnRef>
+          <a:fillRef idx="2">
+            <a:schemeClr val="accent2"/>
+          </a:fillRef>
+          <a:effectRef idx="1">
+            <a:schemeClr val="accent2"/>
+          </a:effectRef>
+          <a:fontRef idx="minor">
+            <a:schemeClr val="dk1"/>
+          </a:fontRef>
+        </p:style>
+        <p:txBody>
+          <a:bodyPr lIns="90000" tIns="72000" rIns="90000" bIns="72000" rtlCol="0" anchor="ctr"/>
+          <a:lstStyle/>
+          <a:p>
+            <a:pPr algn="ctr" defTabSz="914400" fontAlgn="base">
+              <a:spcBef>
+                <a:spcPct val="50000"/>
+              </a:spcBef>
+              <a:spcAft>
+                <a:spcPct val="0"/>
+              </a:spcAft>
+              <a:buClr>
+                <a:srgbClr val="F0AB00"/>
+              </a:buClr>
+              <a:buSzPct val="80000"/>
+            </a:pPr>
+            <a:endParaRPr lang="en-US" sz="1800" kern="0" dirty="0" err="1">
+              <a:solidFill>
+                <a:schemeClr val="dk1"/>
+              </a:solidFill>
+              <a:latin typeface="+mn-lt"/>
+              <a:ea typeface="Arial Unicode MS" pitchFamily="34" charset="-128"/>
+            </a:endParaRPr>
+          </a:p>
+        </p:txBody>
+      </p:sp>
+      <p:grpSp>
+        <p:nvGrpSpPr>
+          <p:cNvPr id="25" name="Group 24">
+            <a:extLst>
+              <a:ext uri="{FF2B5EF4-FFF2-40B4-BE49-F238E27FC236}">
+                <a16:creationId xmlns:a16="http://schemas.microsoft.com/office/drawing/2014/main" id="{11640D66-16CE-4ECF-A881-0D04A0F0978F}"/>
+              </a:ext>
+            </a:extLst>
+          </p:cNvPr>
+          <p:cNvGrpSpPr/>
+          <p:nvPr/>
+        </p:nvGrpSpPr>
+        <p:grpSpPr>
+          <a:xfrm>
+            <a:off x="5871788" y="3304032"/>
+            <a:ext cx="1522476" cy="1400556"/>
+            <a:chOff x="672085" y="3182112"/>
+            <a:chExt cx="1522476" cy="1400556"/>
+          </a:xfrm>
+        </p:grpSpPr>
+        <p:sp>
+          <p:nvSpPr>
+            <p:cNvPr id="26" name="Rectangle: Rounded Corners 25">
+              <a:extLst>
+                <a:ext uri="{FF2B5EF4-FFF2-40B4-BE49-F238E27FC236}">
+                  <a16:creationId xmlns:a16="http://schemas.microsoft.com/office/drawing/2014/main" id="{0AB8D07A-0076-48D7-9FE6-614B01C1C964}"/>
+                </a:ext>
+              </a:extLst>
+            </p:cNvPr>
+            <p:cNvSpPr/>
+            <p:nvPr/>
+          </p:nvSpPr>
+          <p:spPr bwMode="gray">
+            <a:xfrm>
+              <a:off x="672085" y="3182112"/>
+              <a:ext cx="1522476" cy="1400556"/>
+            </a:xfrm>
+            <a:prstGeom prst="roundRect">
+              <a:avLst/>
+            </a:prstGeom>
+            <a:ln>
+              <a:headEnd/>
+              <a:tailEnd/>
+            </a:ln>
+          </p:spPr>
+          <p:style>
+            <a:lnRef idx="1">
+              <a:schemeClr val="accent2"/>
+            </a:lnRef>
+            <a:fillRef idx="2">
+              <a:schemeClr val="accent2"/>
+            </a:fillRef>
+            <a:effectRef idx="1">
+              <a:schemeClr val="accent2"/>
+            </a:effectRef>
+            <a:fontRef idx="minor">
+              <a:schemeClr val="dk1"/>
+            </a:fontRef>
+          </p:style>
+          <p:txBody>
+            <a:bodyPr lIns="90000" tIns="72000" rIns="90000" bIns="72000" rtlCol="0" anchor="ctr"/>
+            <a:lstStyle/>
+            <a:p>
+              <a:pPr marR="0" algn="ctr" defTabSz="914400" eaLnBrk="1" fontAlgn="base" latinLnBrk="0" hangingPunct="1">
+                <a:lnSpc>
+                  <a:spcPct val="100000"/>
+                </a:lnSpc>
+                <a:spcBef>
+                  <a:spcPct val="50000"/>
+                </a:spcBef>
+                <a:spcAft>
+                  <a:spcPct val="0"/>
+                </a:spcAft>
+                <a:buClr>
+                  <a:srgbClr val="F0AB00"/>
+                </a:buClr>
+                <a:buSzPct val="80000"/>
+                <a:tabLst/>
+              </a:pPr>
+              <a:endParaRPr kumimoji="0" lang="en-US" sz="1800" b="0" i="0" u="none" strike="noStrike" kern="0" cap="none" spc="0" normalizeH="0" baseline="0" noProof="0" dirty="0" err="1">
+                <a:ln>
+                  <a:noFill/>
+                </a:ln>
+                <a:effectLst/>
+                <a:uLnTx/>
+                <a:uFillTx/>
+                <a:ea typeface="Arial Unicode MS" pitchFamily="34" charset="-128"/>
+                <a:cs typeface="Arial Unicode MS" pitchFamily="34" charset="-128"/>
+              </a:endParaRPr>
+            </a:p>
+          </p:txBody>
+        </p:sp>
+        <p:sp>
+          <p:nvSpPr>
+            <p:cNvPr id="27" name="Rectangle 26">
+              <a:extLst>
+                <a:ext uri="{FF2B5EF4-FFF2-40B4-BE49-F238E27FC236}">
+                  <a16:creationId xmlns:a16="http://schemas.microsoft.com/office/drawing/2014/main" id="{A65C3866-D4EC-4F0F-B806-33E128863C5D}"/>
+                </a:ext>
+              </a:extLst>
+            </p:cNvPr>
+            <p:cNvSpPr/>
+            <p:nvPr/>
+          </p:nvSpPr>
+          <p:spPr bwMode="gray">
+            <a:xfrm>
+              <a:off x="872647" y="3472458"/>
+              <a:ext cx="1117498" cy="795956"/>
+            </a:xfrm>
+            <a:prstGeom prst="rect">
+              <a:avLst/>
+            </a:prstGeom>
+            <a:ln>
+              <a:headEnd/>
+              <a:tailEnd/>
+            </a:ln>
+          </p:spPr>
+          <p:style>
+            <a:lnRef idx="1">
+              <a:schemeClr val="accent1"/>
+            </a:lnRef>
+            <a:fillRef idx="2">
+              <a:schemeClr val="accent1"/>
+            </a:fillRef>
+            <a:effectRef idx="1">
+              <a:schemeClr val="accent1"/>
+            </a:effectRef>
+            <a:fontRef idx="minor">
+              <a:schemeClr val="dk1"/>
+            </a:fontRef>
+          </p:style>
+          <p:txBody>
+            <a:bodyPr lIns="90000" tIns="72000" rIns="90000" bIns="72000" rtlCol="0" anchor="ctr"/>
+            <a:lstStyle/>
+            <a:p>
+              <a:pPr marR="0" algn="ctr" defTabSz="914400" eaLnBrk="1" fontAlgn="base" latinLnBrk="0" hangingPunct="1">
+                <a:lnSpc>
+                  <a:spcPct val="100000"/>
+                </a:lnSpc>
+                <a:spcBef>
+                  <a:spcPct val="50000"/>
+                </a:spcBef>
+                <a:spcAft>
+                  <a:spcPct val="0"/>
+                </a:spcAft>
+                <a:buClr>
+                  <a:srgbClr val="F0AB00"/>
+                </a:buClr>
+                <a:buSzPct val="80000"/>
+                <a:tabLst/>
+              </a:pPr>
+              <a:r>
+                <a:rPr lang="de-DE" sz="1800" kern="0" dirty="0" err="1">
+                  <a:ea typeface="Arial Unicode MS" pitchFamily="34" charset="-128"/>
+                  <a:cs typeface="Arial Unicode MS" pitchFamily="34" charset="-128"/>
+                </a:rPr>
+                <a:t>nginx</a:t>
+              </a:r>
+              <a:endParaRPr kumimoji="0" lang="de-DE" sz="1800" b="0" i="0" u="none" strike="noStrike" kern="0" cap="none" spc="0" normalizeH="0" baseline="0" noProof="0" dirty="0">
+                <a:ln>
+                  <a:noFill/>
+                </a:ln>
+                <a:effectLst/>
+                <a:uLnTx/>
+                <a:uFillTx/>
+                <a:ea typeface="Arial Unicode MS" pitchFamily="34" charset="-128"/>
+                <a:cs typeface="Arial Unicode MS" pitchFamily="34" charset="-128"/>
+              </a:endParaRPr>
+            </a:p>
+          </p:txBody>
+        </p:sp>
+      </p:grpSp>
+      <p:sp>
+        <p:nvSpPr>
+          <p:cNvPr id="31" name="Arrow: Up-Down 30">
+            <a:extLst>
+              <a:ext uri="{FF2B5EF4-FFF2-40B4-BE49-F238E27FC236}">
+                <a16:creationId xmlns:a16="http://schemas.microsoft.com/office/drawing/2014/main" id="{91032015-F539-4499-9BF8-A011A7056AB4}"/>
+              </a:ext>
+            </a:extLst>
+          </p:cNvPr>
+          <p:cNvSpPr/>
+          <p:nvPr/>
+        </p:nvSpPr>
+        <p:spPr bwMode="gray">
+          <a:xfrm rot="19764941">
+            <a:off x="5449847" y="2335120"/>
+            <a:ext cx="222219" cy="845820"/>
+          </a:xfrm>
+          <a:prstGeom prst="upDownArrow">
+            <a:avLst/>
+          </a:prstGeom>
+          <a:ln>
+            <a:headEnd/>
+            <a:tailEnd/>
+          </a:ln>
+        </p:spPr>
+        <p:style>
+          <a:lnRef idx="1">
+            <a:schemeClr val="accent2"/>
+          </a:lnRef>
+          <a:fillRef idx="2">
+            <a:schemeClr val="accent2"/>
+          </a:fillRef>
+          <a:effectRef idx="1">
+            <a:schemeClr val="accent2"/>
+          </a:effectRef>
+          <a:fontRef idx="minor">
+            <a:schemeClr val="dk1"/>
+          </a:fontRef>
+        </p:style>
+        <p:txBody>
+          <a:bodyPr lIns="90000" tIns="72000" rIns="90000" bIns="72000" rtlCol="0" anchor="ctr"/>
+          <a:lstStyle/>
+          <a:p>
+            <a:pPr algn="ctr" defTabSz="914400" fontAlgn="base">
+              <a:spcBef>
+                <a:spcPct val="50000"/>
+              </a:spcBef>
+              <a:spcAft>
+                <a:spcPct val="0"/>
+              </a:spcAft>
+              <a:buClr>
+                <a:srgbClr val="F0AB00"/>
+              </a:buClr>
+              <a:buSzPct val="80000"/>
+            </a:pPr>
+            <a:endParaRPr lang="en-US" sz="1800" kern="0" dirty="0" err="1">
+              <a:solidFill>
+                <a:schemeClr val="dk1"/>
+              </a:solidFill>
+              <a:latin typeface="+mn-lt"/>
+              <a:ea typeface="Arial Unicode MS" pitchFamily="34" charset="-128"/>
+            </a:endParaRPr>
+          </a:p>
+        </p:txBody>
+      </p:sp>
+      <p:sp>
+        <p:nvSpPr>
+          <p:cNvPr id="33" name="Cylinder 32">
+            <a:extLst>
+              <a:ext uri="{FF2B5EF4-FFF2-40B4-BE49-F238E27FC236}">
+                <a16:creationId xmlns:a16="http://schemas.microsoft.com/office/drawing/2014/main" id="{C96FAE24-B415-498D-8A1B-BEEC6F878499}"/>
+              </a:ext>
+            </a:extLst>
+          </p:cNvPr>
+          <p:cNvSpPr/>
+          <p:nvPr/>
+        </p:nvSpPr>
+        <p:spPr bwMode="gray">
+          <a:xfrm>
+            <a:off x="6133916" y="5492023"/>
+            <a:ext cx="998220" cy="1004248"/>
+          </a:xfrm>
+          <a:prstGeom prst="can">
+            <a:avLst/>
+          </a:prstGeom>
+          <a:ln>
+            <a:headEnd/>
+            <a:tailEnd/>
+          </a:ln>
+        </p:spPr>
+        <p:style>
+          <a:lnRef idx="1">
+            <a:schemeClr val="accent2"/>
+          </a:lnRef>
+          <a:fillRef idx="2">
+            <a:schemeClr val="accent2"/>
+          </a:fillRef>
+          <a:effectRef idx="1">
+            <a:schemeClr val="accent2"/>
+          </a:effectRef>
+          <a:fontRef idx="minor">
+            <a:schemeClr val="dk1"/>
+          </a:fontRef>
+        </p:style>
+        <p:txBody>
+          <a:bodyPr lIns="90000" tIns="72000" rIns="90000" bIns="72000" rtlCol="0" anchor="ctr"/>
+          <a:lstStyle/>
+          <a:p>
+            <a:pPr algn="ctr" defTabSz="914400" fontAlgn="base">
+              <a:spcBef>
+                <a:spcPct val="50000"/>
+              </a:spcBef>
+              <a:spcAft>
+                <a:spcPct val="0"/>
+              </a:spcAft>
+              <a:buClr>
+                <a:srgbClr val="F0AB00"/>
+              </a:buClr>
+              <a:buSzPct val="80000"/>
+            </a:pPr>
+            <a:r>
+              <a:rPr lang="de-DE" sz="1800" kern="0" dirty="0" err="1">
+                <a:ea typeface="Arial Unicode MS" pitchFamily="34" charset="-128"/>
+              </a:rPr>
+              <a:t>content</a:t>
+            </a:r>
+            <a:endParaRPr lang="de-DE" sz="1800" kern="0" dirty="0">
+              <a:ea typeface="Arial Unicode MS" pitchFamily="34" charset="-128"/>
+            </a:endParaRPr>
+          </a:p>
+        </p:txBody>
+      </p:sp>
+      <p:sp>
+        <p:nvSpPr>
+          <p:cNvPr id="34" name="Arrow: Up-Down 33">
+            <a:extLst>
+              <a:ext uri="{FF2B5EF4-FFF2-40B4-BE49-F238E27FC236}">
+                <a16:creationId xmlns:a16="http://schemas.microsoft.com/office/drawing/2014/main" id="{F8295AF2-E268-48FA-814A-501B6D56F94B}"/>
+              </a:ext>
+            </a:extLst>
+          </p:cNvPr>
+          <p:cNvSpPr/>
+          <p:nvPr/>
+        </p:nvSpPr>
+        <p:spPr bwMode="gray">
+          <a:xfrm>
+            <a:off x="6521917" y="4820805"/>
+            <a:ext cx="222219" cy="555001"/>
+          </a:xfrm>
+          <a:prstGeom prst="upDownArrow">
+            <a:avLst/>
+          </a:prstGeom>
+          <a:ln>
+            <a:headEnd/>
+            <a:tailEnd/>
+          </a:ln>
+        </p:spPr>
+        <p:style>
+          <a:lnRef idx="1">
+            <a:schemeClr val="accent2"/>
+          </a:lnRef>
+          <a:fillRef idx="2">
+            <a:schemeClr val="accent2"/>
+          </a:fillRef>
+          <a:effectRef idx="1">
+            <a:schemeClr val="accent2"/>
+          </a:effectRef>
+          <a:fontRef idx="minor">
+            <a:schemeClr val="dk1"/>
+          </a:fontRef>
+        </p:style>
+        <p:txBody>
+          <a:bodyPr lIns="90000" tIns="72000" rIns="90000" bIns="72000" rtlCol="0" anchor="ctr"/>
+          <a:lstStyle/>
+          <a:p>
+            <a:pPr algn="ctr" defTabSz="914400" fontAlgn="base">
+              <a:spcBef>
+                <a:spcPct val="50000"/>
+              </a:spcBef>
+              <a:spcAft>
+                <a:spcPct val="0"/>
+              </a:spcAft>
+              <a:buClr>
+                <a:srgbClr val="F0AB00"/>
+              </a:buClr>
+              <a:buSzPct val="80000"/>
+            </a:pPr>
+            <a:endParaRPr lang="en-US" sz="1800" kern="0" dirty="0" err="1">
+              <a:solidFill>
+                <a:schemeClr val="dk1"/>
+              </a:solidFill>
+              <a:latin typeface="+mn-lt"/>
+              <a:ea typeface="Arial Unicode MS" pitchFamily="34" charset="-128"/>
+            </a:endParaRPr>
+          </a:p>
+        </p:txBody>
+      </p:sp>
+    </p:spTree>
+    <p:extLst>
+      <p:ext uri="{BB962C8B-B14F-4D97-AF65-F5344CB8AC3E}">
+        <p14:creationId xmlns:p14="http://schemas.microsoft.com/office/powerpoint/2010/main" val="1341300380"/>
+      </p:ext>
+    </p:extLst>
+  </p:cSld>
+  <p:clrMapOvr>
+    <a:masterClrMapping/>
+  </p:clrMapOvr>
+</p:sld>
+</file>
+
+<file path=ppt/slides/slide4.xml><?xml version="1.0" encoding="utf-8"?>
+<p:sld xmlns:a="http://schemas.openxmlformats.org/drawingml/2006/main" xmlns:r="http://schemas.openxmlformats.org/officeDocument/2006/relationships" xmlns:p="http://schemas.openxmlformats.org/presentationml/2006/main">
+  <p:cSld>
+    <p:spTree>
+      <p:nvGrpSpPr>
+        <p:cNvPr id="1" name=""/>
+        <p:cNvGrpSpPr/>
+        <p:nvPr/>
+      </p:nvGrpSpPr>
+      <p:grpSpPr>
+        <a:xfrm>
+          <a:off x="0" y="0"/>
+          <a:ext cx="0" cy="0"/>
+          <a:chOff x="0" y="0"/>
+          <a:chExt cx="0" cy="0"/>
+        </a:xfrm>
+      </p:grpSpPr>
+      <p:sp>
+        <p:nvSpPr>
+          <p:cNvPr id="2" name="Title 1">
+            <a:extLst>
+              <a:ext uri="{FF2B5EF4-FFF2-40B4-BE49-F238E27FC236}">
+                <a16:creationId xmlns:a16="http://schemas.microsoft.com/office/drawing/2014/main" id="{741BD154-4E07-4CEE-8B51-9FFB4B1D195C}"/>
+              </a:ext>
+            </a:extLst>
+          </p:cNvPr>
+          <p:cNvSpPr>
+            <a:spLocks noGrp="1"/>
+          </p:cNvSpPr>
+          <p:nvPr>
+            <p:ph type="title"/>
+          </p:nvPr>
+        </p:nvSpPr>
+        <p:spPr>
+          <a:xfrm>
+            <a:off x="504001" y="504000"/>
+            <a:ext cx="11186476" cy="369332"/>
+          </a:xfrm>
+        </p:spPr>
+        <p:txBody>
+          <a:bodyPr/>
+          <a:lstStyle/>
+          <a:p>
+            <a:r>
+              <a:rPr lang="en-US" dirty="0" err="1"/>
+              <a:t>Stateful</a:t>
+            </a:r>
+            <a:r>
+              <a:rPr lang="en-US" dirty="0"/>
+              <a:t> Applications with </a:t>
+            </a:r>
+            <a:r>
+              <a:rPr lang="en-US" dirty="0" err="1"/>
+              <a:t>StatefulSets</a:t>
+            </a:r>
+            <a:endParaRPr lang="en-US" dirty="0"/>
           </a:p>
         </p:txBody>
       </p:sp>
@@ -20166,12 +21896,12 @@
         <p:spPr bwMode="gray">
           <a:xfrm>
             <a:off x="5765378" y="4746064"/>
-            <a:ext cx="4384462" cy="469551"/>
+            <a:ext cx="4384462" cy="758624"/>
           </a:xfrm>
           <a:prstGeom prst="wedgeRectCallout">
             <a:avLst>
-              <a:gd name="adj1" fmla="val -71257"/>
-              <a:gd name="adj2" fmla="val 169481"/>
+              <a:gd name="adj1" fmla="val -71674"/>
+              <a:gd name="adj2" fmla="val 68232"/>
             </a:avLst>
           </a:prstGeom>
           <a:ln>
@@ -20218,7 +21948,7 @@
                 <a:ea typeface="Arial Unicode MS" pitchFamily="34" charset="-128"/>
                 <a:cs typeface="Arial Unicode MS" pitchFamily="34" charset="-128"/>
               </a:rPr>
-              <a:t>Separate storage for each new instance</a:t>
+              <a:t>Automatically generated &amp; separate storage for each new instance</a:t>
             </a:r>
             <a:endParaRPr kumimoji="0" lang="en-US" sz="1800" b="0" i="0" u="none" strike="noStrike" kern="0" cap="none" spc="0" normalizeH="0" baseline="0" noProof="0" dirty="0">
               <a:ln>
@@ -20246,7 +21976,7 @@
 </p:sld>
 </file>
 
-<file path=ppt/slides/slide4.xml><?xml version="1.0" encoding="utf-8"?>
+<file path=ppt/slides/slide5.xml><?xml version="1.0" encoding="utf-8"?>
 <p:sld xmlns:a="http://schemas.openxmlformats.org/drawingml/2006/main" xmlns:r="http://schemas.openxmlformats.org/officeDocument/2006/relationships" xmlns:p="http://schemas.openxmlformats.org/presentationml/2006/main">
   <p:cSld>
     <p:spTree>
@@ -21668,7 +23398,7 @@
 </p:sld>
 </file>
 
-<file path=ppt/slides/slide5.xml><?xml version="1.0" encoding="utf-8"?>
+<file path=ppt/slides/slide6.xml><?xml version="1.0" encoding="utf-8"?>
 <p:sld xmlns:a="http://schemas.openxmlformats.org/drawingml/2006/main" xmlns:r="http://schemas.openxmlformats.org/officeDocument/2006/relationships" xmlns:p="http://schemas.openxmlformats.org/presentationml/2006/main">
   <p:cSld>
     <p:spTree>
@@ -23070,7 +24800,7 @@
 </p:sld>
 </file>
 
-<file path=ppt/slides/slide6.xml><?xml version="1.0" encoding="utf-8"?>
+<file path=ppt/slides/slide7.xml><?xml version="1.0" encoding="utf-8"?>
 <p:sld xmlns:a="http://schemas.openxmlformats.org/drawingml/2006/main" xmlns:r="http://schemas.openxmlformats.org/officeDocument/2006/relationships" xmlns:p="http://schemas.openxmlformats.org/presentationml/2006/main">
   <p:cSld>
     <p:spTree>
@@ -23445,7 +25175,7 @@
 </p:sld>
 </file>
 
-<file path=ppt/slides/slide7.xml><?xml version="1.0" encoding="utf-8"?>
+<file path=ppt/slides/slide8.xml><?xml version="1.0" encoding="utf-8"?>
 <p:sld xmlns:a="http://schemas.openxmlformats.org/drawingml/2006/main" xmlns:r="http://schemas.openxmlformats.org/officeDocument/2006/relationships" xmlns:p="http://schemas.openxmlformats.org/presentationml/2006/main">
   <p:cSld>
     <p:spTree>
@@ -24335,7 +26065,7 @@
 </p:sld>
 </file>
 
-<file path=ppt/slides/slide8.xml><?xml version="1.0" encoding="utf-8"?>
+<file path=ppt/slides/slide9.xml><?xml version="1.0" encoding="utf-8"?>
 <p:sld xmlns:a="http://schemas.openxmlformats.org/drawingml/2006/main" xmlns:r="http://schemas.openxmlformats.org/officeDocument/2006/relationships" xmlns:p="http://schemas.openxmlformats.org/presentationml/2006/main" show="0">
   <p:cSld>
     <p:spTree>
@@ -24775,32 +26505,6 @@
   <p:clrMapOvr>
     <a:masterClrMapping/>
   </p:clrMapOvr>
-</p:sld>
-</file>
-
-<file path=ppt/slides/slide9.xml><?xml version="1.0" encoding="utf-8"?>
-<p:sld xmlns:a="http://schemas.openxmlformats.org/drawingml/2006/main" xmlns:r="http://schemas.openxmlformats.org/officeDocument/2006/relationships" xmlns:p="http://schemas.openxmlformats.org/presentationml/2006/main" show="0">
-  <p:cSld>
-    <p:spTree>
-      <p:nvGrpSpPr>
-        <p:cNvPr id="1" name=""/>
-        <p:cNvGrpSpPr/>
-        <p:nvPr/>
-      </p:nvGrpSpPr>
-      <p:grpSpPr>
-        <a:xfrm>
-          <a:off x="0" y="0"/>
-          <a:ext cx="0" cy="0"/>
-          <a:chOff x="0" y="0"/>
-          <a:chExt cx="0" cy="0"/>
-        </a:xfrm>
-      </p:grpSpPr>
-    </p:spTree>
-  </p:cSld>
-  <p:clrMapOvr>
-    <a:masterClrMapping/>
-  </p:clrMapOvr>
-  <p:transition spd="med"/>
 </p:sld>
 </file>
 

</xml_diff>

<commit_message>
demo script with alpine:3.8 & marker for demo & exercise
</commit_message>
<xml_diff>
--- a/kubernetes/10_statefulset.pptx
+++ b/kubernetes/10_statefulset.pptx
@@ -5,10 +5,10 @@
     <p:sldMasterId id="2147483733" r:id="rId1"/>
   </p:sldMasterIdLst>
   <p:notesMasterIdLst>
-    <p:notesMasterId r:id="rId12"/>
+    <p:notesMasterId r:id="rId13"/>
   </p:notesMasterIdLst>
   <p:handoutMasterIdLst>
-    <p:handoutMasterId r:id="rId13"/>
+    <p:handoutMasterId r:id="rId14"/>
   </p:handoutMasterIdLst>
   <p:sldIdLst>
     <p:sldId id="433" r:id="rId2"/>
@@ -20,7 +20,8 @@
     <p:sldId id="450" r:id="rId8"/>
     <p:sldId id="451" r:id="rId9"/>
     <p:sldId id="452" r:id="rId10"/>
-    <p:sldId id="265" r:id="rId11"/>
+    <p:sldId id="456" r:id="rId11"/>
+    <p:sldId id="265" r:id="rId12"/>
   </p:sldIdLst>
   <p:sldSz cx="12195175" cy="6858000"/>
   <p:notesSz cx="6858000" cy="9144000"/>
@@ -194,10 +195,6 @@
     </p:ext>
   </p:extLst>
 </p:presentation>
-</file>
-
-<file path=ppt/revisionInfo.xml><?xml version="1.0" encoding="utf-8"?>
-<p1510:revInfo xmlns:a="http://schemas.openxmlformats.org/drawingml/2006/main" xmlns:r="http://schemas.openxmlformats.org/officeDocument/2006/relationships" xmlns:p1510="http://schemas.microsoft.com/office/powerpoint/2015/10/main"/>
 </file>
 
 <file path=ppt/diagrams/colors1.xml><?xml version="1.0" encoding="utf-8"?>
@@ -3572,6 +3569,98 @@
 </p:notes>
 </file>
 
+<file path=ppt/notesSlides/notesSlide10.xml><?xml version="1.0" encoding="utf-8"?>
+<p:notes xmlns:a="http://schemas.openxmlformats.org/drawingml/2006/main" xmlns:r="http://schemas.openxmlformats.org/officeDocument/2006/relationships" xmlns:p="http://schemas.openxmlformats.org/presentationml/2006/main">
+  <p:cSld>
+    <p:spTree>
+      <p:nvGrpSpPr>
+        <p:cNvPr id="1" name=""/>
+        <p:cNvGrpSpPr/>
+        <p:nvPr/>
+      </p:nvGrpSpPr>
+      <p:grpSpPr>
+        <a:xfrm>
+          <a:off x="0" y="0"/>
+          <a:ext cx="0" cy="0"/>
+          <a:chOff x="0" y="0"/>
+          <a:chExt cx="0" cy="0"/>
+        </a:xfrm>
+      </p:grpSpPr>
+      <p:sp>
+        <p:nvSpPr>
+          <p:cNvPr id="4" name="Slide Number Placeholder 3"/>
+          <p:cNvSpPr>
+            <a:spLocks noGrp="1"/>
+          </p:cNvSpPr>
+          <p:nvPr>
+            <p:ph type="sldNum" sz="quarter" idx="10"/>
+          </p:nvPr>
+        </p:nvSpPr>
+        <p:spPr/>
+        <p:txBody>
+          <a:bodyPr/>
+          <a:lstStyle/>
+          <a:p>
+            <a:fld id="{7D8C2C35-2B8A-446E-BEC0-FD36716C29AC}" type="slidenum">
+              <a:rPr lang="en-US" smtClean="0"/>
+              <a:pPr/>
+              <a:t>11</a:t>
+            </a:fld>
+            <a:endParaRPr lang="en-US" dirty="0"/>
+          </a:p>
+        </p:txBody>
+      </p:sp>
+      <p:sp>
+        <p:nvSpPr>
+          <p:cNvPr id="6" name="Slide Image Placeholder 5"/>
+          <p:cNvSpPr>
+            <a:spLocks noGrp="1" noRot="1" noChangeAspect="1"/>
+          </p:cNvSpPr>
+          <p:nvPr>
+            <p:ph type="sldImg"/>
+          </p:nvPr>
+        </p:nvSpPr>
+        <p:spPr>
+          <a:xfrm>
+            <a:off x="547688" y="612775"/>
+            <a:ext cx="5762625" cy="3241675"/>
+          </a:xfrm>
+        </p:spPr>
+      </p:sp>
+      <p:sp>
+        <p:nvSpPr>
+          <p:cNvPr id="7" name="Notes Placeholder 6"/>
+          <p:cNvSpPr>
+            <a:spLocks noGrp="1"/>
+          </p:cNvSpPr>
+          <p:nvPr>
+            <p:ph type="body" idx="1"/>
+          </p:nvPr>
+        </p:nvSpPr>
+        <p:spPr/>
+        <p:txBody>
+          <a:bodyPr>
+            <a:normAutofit/>
+          </a:bodyPr>
+          <a:lstStyle/>
+          <a:p>
+            <a:endParaRPr lang="en-US" dirty="0"/>
+          </a:p>
+        </p:txBody>
+      </p:sp>
+    </p:spTree>
+    <p:extLst>
+      <p:ext uri="{BB962C8B-B14F-4D97-AF65-F5344CB8AC3E}">
+        <p14:creationId xmlns:p14="http://schemas.microsoft.com/office/powerpoint/2010/main" val="2544264309"/>
+      </p:ext>
+    </p:extLst>
+  </p:cSld>
+  <p:clrMapOvr>
+    <a:masterClrMapping/>
+  </p:clrMapOvr>
+</p:notes>
+</file>
+
 <file path=ppt/notesSlides/notesSlide2.xml><?xml version="1.0" encoding="utf-8"?>
 <p:notes xmlns:a="http://schemas.openxmlformats.org/drawingml/2006/main" xmlns:r="http://schemas.openxmlformats.org/officeDocument/2006/relationships" xmlns:p="http://schemas.openxmlformats.org/presentationml/2006/main">
   <p:cSld>
@@ -4767,6 +4856,381 @@
       </p:grpSpPr>
       <p:sp>
         <p:nvSpPr>
+          <p:cNvPr id="2" name="Slide Image Placeholder 1"/>
+          <p:cNvSpPr>
+            <a:spLocks noGrp="1" noRot="1" noChangeAspect="1"/>
+          </p:cNvSpPr>
+          <p:nvPr>
+            <p:ph type="sldImg"/>
+          </p:nvPr>
+        </p:nvSpPr>
+        <p:spPr/>
+      </p:sp>
+      <p:sp>
+        <p:nvSpPr>
+          <p:cNvPr id="3" name="Notes Placeholder 2"/>
+          <p:cNvSpPr>
+            <a:spLocks noGrp="1"/>
+          </p:cNvSpPr>
+          <p:nvPr>
+            <p:ph type="body" idx="1"/>
+          </p:nvPr>
+        </p:nvSpPr>
+        <p:spPr/>
+        <p:txBody>
+          <a:bodyPr>
+            <a:normAutofit fontScale="92500" lnSpcReduction="20000"/>
+          </a:bodyPr>
+          <a:lstStyle/>
+          <a:p>
+            <a:pPr marL="342900" indent="-342900">
+              <a:buFont typeface="Arial" panose="020B0604020202020204" pitchFamily="34" charset="0"/>
+              <a:buChar char="•"/>
+            </a:pPr>
+            <a:r>
+              <a:rPr lang="en-US" sz="1800" dirty="0"/>
+              <a:t>Use the “</a:t>
+            </a:r>
+            <a:r>
+              <a:rPr lang="en-US" sz="1800" dirty="0" err="1"/>
+              <a:t>statefulset_with_svc.yaml</a:t>
+            </a:r>
+            <a:r>
+              <a:rPr lang="en-US" sz="1800" dirty="0"/>
+              <a:t>” file to deploy a </a:t>
+            </a:r>
+            <a:r>
+              <a:rPr lang="en-US" sz="1800" dirty="0" err="1"/>
+              <a:t>statefulset</a:t>
+            </a:r>
+            <a:r>
+              <a:rPr lang="en-US" sz="1800" dirty="0"/>
+              <a:t> + a corresponding headless service</a:t>
+            </a:r>
+          </a:p>
+          <a:p>
+            <a:pPr marL="342900" indent="-342900">
+              <a:buFont typeface="Arial" panose="020B0604020202020204" pitchFamily="34" charset="0"/>
+              <a:buChar char="•"/>
+            </a:pPr>
+            <a:r>
+              <a:rPr lang="en-US" sz="1800" dirty="0"/>
+              <a:t>The example is based on an </a:t>
+            </a:r>
+            <a:r>
+              <a:rPr lang="en-US" sz="1800" dirty="0" err="1"/>
+              <a:t>nginx</a:t>
+            </a:r>
+            <a:r>
+              <a:rPr lang="en-US" sz="1800" dirty="0"/>
+              <a:t> webserver and includes a </a:t>
+            </a:r>
+            <a:r>
+              <a:rPr lang="en-US" sz="1800" dirty="0" err="1"/>
+              <a:t>pvc</a:t>
+            </a:r>
+            <a:r>
+              <a:rPr lang="en-US" sz="1800" dirty="0"/>
+              <a:t> template</a:t>
+            </a:r>
+          </a:p>
+          <a:p>
+            <a:pPr marL="342900" indent="-342900">
+              <a:buFont typeface="Arial" panose="020B0604020202020204" pitchFamily="34" charset="0"/>
+              <a:buChar char="•"/>
+            </a:pPr>
+            <a:r>
+              <a:rPr lang="en-US" sz="1800" dirty="0"/>
+              <a:t>Show the </a:t>
+            </a:r>
+            <a:r>
+              <a:rPr lang="en-US" sz="1800" dirty="0" err="1"/>
+              <a:t>yaml</a:t>
+            </a:r>
+            <a:r>
+              <a:rPr lang="en-US" sz="1800" dirty="0"/>
+              <a:t> file, point out the “</a:t>
+            </a:r>
+            <a:r>
+              <a:rPr lang="en-US" sz="1800" dirty="0" err="1"/>
+              <a:t>clusterIP</a:t>
+            </a:r>
+            <a:r>
+              <a:rPr lang="en-US" sz="1800" dirty="0"/>
+              <a:t>: None” etc.</a:t>
+            </a:r>
+          </a:p>
+          <a:p>
+            <a:pPr marL="342900" indent="-342900">
+              <a:buFont typeface="Arial" panose="020B0604020202020204" pitchFamily="34" charset="0"/>
+              <a:buChar char="•"/>
+            </a:pPr>
+            <a:r>
+              <a:rPr lang="en-US" sz="1800" dirty="0"/>
+              <a:t>Show the ordinal index &amp; ordered creation of pods when scaling</a:t>
+            </a:r>
+          </a:p>
+          <a:p>
+            <a:pPr marL="342900" indent="-342900">
+              <a:buFont typeface="Arial" panose="020B0604020202020204" pitchFamily="34" charset="0"/>
+              <a:buChar char="•"/>
+            </a:pPr>
+            <a:r>
+              <a:rPr lang="en-US" sz="1800" dirty="0"/>
+              <a:t>Show the created PVCs</a:t>
+            </a:r>
+          </a:p>
+          <a:p>
+            <a:pPr marL="342900" indent="-342900">
+              <a:buFont typeface="Arial" panose="020B0604020202020204" pitchFamily="34" charset="0"/>
+              <a:buChar char="•"/>
+            </a:pPr>
+            <a:r>
+              <a:rPr lang="en-US" sz="1800" dirty="0"/>
+              <a:t>Write content to storage &amp; check it (</a:t>
+            </a:r>
+            <a:r>
+              <a:rPr lang="en-US" sz="1800" dirty="0" err="1"/>
+              <a:t>wget</a:t>
+            </a:r>
+            <a:r>
+              <a:rPr lang="en-US" sz="1800" dirty="0"/>
+              <a:t> localhost for index.html); adapt loop to number of replicas: </a:t>
+            </a:r>
+          </a:p>
+          <a:p>
+            <a:pPr marL="522864" lvl="1" indent="-342900">
+              <a:buFont typeface="Arial" panose="020B0604020202020204" pitchFamily="34" charset="0"/>
+              <a:buChar char="•"/>
+            </a:pPr>
+            <a:r>
+              <a:rPr lang="en-US" sz="1400" dirty="0"/>
+              <a:t>for </a:t>
+            </a:r>
+            <a:r>
+              <a:rPr lang="en-US" sz="1400" dirty="0" err="1"/>
+              <a:t>i</a:t>
+            </a:r>
+            <a:r>
+              <a:rPr lang="en-US" sz="1400" dirty="0"/>
+              <a:t> in 0 1; do </a:t>
+            </a:r>
+            <a:r>
+              <a:rPr lang="en-US" sz="1400" dirty="0" err="1"/>
+              <a:t>kubectl</a:t>
+            </a:r>
+            <a:r>
+              <a:rPr lang="en-US" sz="1400" dirty="0"/>
+              <a:t> exec web-$</a:t>
+            </a:r>
+            <a:r>
+              <a:rPr lang="en-US" sz="1400" dirty="0" err="1"/>
+              <a:t>i</a:t>
+            </a:r>
+            <a:r>
+              <a:rPr lang="en-US" sz="1400" dirty="0"/>
+              <a:t> -- </a:t>
+            </a:r>
+            <a:r>
+              <a:rPr lang="en-US" sz="1400" dirty="0" err="1"/>
+              <a:t>sh</a:t>
+            </a:r>
+            <a:r>
+              <a:rPr lang="en-US" sz="1400" dirty="0"/>
+              <a:t> -c 'echo $(hostname) &gt; /</a:t>
+            </a:r>
+            <a:r>
+              <a:rPr lang="en-US" sz="1400" dirty="0" err="1"/>
+              <a:t>usr</a:t>
+            </a:r>
+            <a:r>
+              <a:rPr lang="en-US" sz="1400" dirty="0"/>
+              <a:t>/share/</a:t>
+            </a:r>
+            <a:r>
+              <a:rPr lang="en-US" sz="1400" dirty="0" err="1"/>
+              <a:t>nginx</a:t>
+            </a:r>
+            <a:r>
+              <a:rPr lang="en-US" sz="1400" dirty="0"/>
+              <a:t>/html/index.html'; done</a:t>
+            </a:r>
+          </a:p>
+          <a:p>
+            <a:pPr marL="522864" lvl="1" indent="-342900">
+              <a:buFont typeface="Arial" panose="020B0604020202020204" pitchFamily="34" charset="0"/>
+              <a:buChar char="•"/>
+            </a:pPr>
+            <a:r>
+              <a:rPr lang="en-US" sz="1400" dirty="0"/>
+              <a:t>for </a:t>
+            </a:r>
+            <a:r>
+              <a:rPr lang="en-US" sz="1400" dirty="0" err="1"/>
+              <a:t>i</a:t>
+            </a:r>
+            <a:r>
+              <a:rPr lang="en-US" sz="1400" dirty="0"/>
+              <a:t> in 0 1; do </a:t>
+            </a:r>
+            <a:r>
+              <a:rPr lang="en-US" sz="1400" dirty="0" err="1"/>
+              <a:t>kubectl</a:t>
+            </a:r>
+            <a:r>
+              <a:rPr lang="en-US" sz="1400" dirty="0"/>
+              <a:t> exec -it web-$</a:t>
+            </a:r>
+            <a:r>
+              <a:rPr lang="en-US" sz="1400" dirty="0" err="1"/>
+              <a:t>i</a:t>
+            </a:r>
+            <a:r>
+              <a:rPr lang="en-US" sz="1400" dirty="0"/>
+              <a:t> -- cat /</a:t>
+            </a:r>
+            <a:r>
+              <a:rPr lang="en-US" sz="1400" dirty="0" err="1"/>
+              <a:t>usr</a:t>
+            </a:r>
+            <a:r>
+              <a:rPr lang="en-US" sz="1400" dirty="0"/>
+              <a:t>/share/</a:t>
+            </a:r>
+            <a:r>
+              <a:rPr lang="en-US" sz="1400" dirty="0" err="1"/>
+              <a:t>nginx</a:t>
+            </a:r>
+            <a:r>
+              <a:rPr lang="en-US" sz="1400" dirty="0"/>
+              <a:t>/html/index.html; done</a:t>
+            </a:r>
+          </a:p>
+          <a:p>
+            <a:pPr marL="522864" lvl="1" indent="-342900">
+              <a:buFont typeface="Arial" panose="020B0604020202020204" pitchFamily="34" charset="0"/>
+              <a:buChar char="•"/>
+            </a:pPr>
+            <a:r>
+              <a:rPr lang="en-US" sz="1400" dirty="0"/>
+              <a:t>Delete pods, wait for them to be re-created and curl again =&gt; output should not differ</a:t>
+            </a:r>
+          </a:p>
+          <a:p>
+            <a:pPr marL="342900" indent="-342900">
+              <a:buFont typeface="Arial" panose="020B0604020202020204" pitchFamily="34" charset="0"/>
+              <a:buChar char="•"/>
+            </a:pPr>
+            <a:r>
+              <a:rPr lang="en-US" sz="1800" dirty="0"/>
+              <a:t>Run a </a:t>
+            </a:r>
+            <a:r>
+              <a:rPr lang="en-US" sz="1800" dirty="0" err="1"/>
+              <a:t>tmp</a:t>
+            </a:r>
+            <a:r>
+              <a:rPr lang="en-US" sz="1800" dirty="0"/>
+              <a:t> alpine pod and use it for some </a:t>
+            </a:r>
+            <a:r>
+              <a:rPr lang="en-US" sz="1800" dirty="0" err="1"/>
+              <a:t>nslookup</a:t>
+            </a:r>
+            <a:r>
+              <a:rPr lang="en-US" sz="1800" dirty="0"/>
+              <a:t> commands. Show the internal addresses and how to access them</a:t>
+            </a:r>
+          </a:p>
+          <a:p>
+            <a:pPr marL="522864" lvl="1" indent="-342900">
+              <a:buFont typeface="Arial" panose="020B0604020202020204" pitchFamily="34" charset="0"/>
+              <a:buChar char="•"/>
+            </a:pPr>
+            <a:r>
+              <a:rPr lang="en-US" sz="1600" dirty="0" err="1"/>
+              <a:t>kubectl</a:t>
+            </a:r>
+            <a:r>
+              <a:rPr lang="en-US" sz="1600" dirty="0"/>
+              <a:t> run </a:t>
+            </a:r>
+            <a:r>
+              <a:rPr lang="en-US" sz="1600" dirty="0" err="1"/>
+              <a:t>dns</a:t>
+            </a:r>
+            <a:r>
+              <a:rPr lang="en-US" sz="1600" dirty="0"/>
+              <a:t>-test -</a:t>
+            </a:r>
+            <a:r>
+              <a:rPr lang="en-US" sz="1600" dirty="0" err="1"/>
+              <a:t>i</a:t>
+            </a:r>
+            <a:r>
+              <a:rPr lang="en-US" sz="1600" dirty="0"/>
+              <a:t> --</a:t>
+            </a:r>
+            <a:r>
+              <a:rPr lang="en-US" sz="1600" dirty="0" err="1"/>
+              <a:t>tty</a:t>
+            </a:r>
+            <a:r>
+              <a:rPr lang="en-US" sz="1600" dirty="0"/>
+              <a:t> --image alpine:3.8 --restart=Never --</a:t>
+            </a:r>
+            <a:r>
+              <a:rPr lang="en-US" sz="1600" dirty="0" err="1"/>
+              <a:t>rm</a:t>
+            </a:r>
+            <a:r>
+              <a:rPr lang="en-US" sz="1600" dirty="0"/>
+              <a:t> /bin/</a:t>
+            </a:r>
+            <a:r>
+              <a:rPr lang="en-US" sz="1600" dirty="0" err="1"/>
+              <a:t>sh</a:t>
+            </a:r>
+            <a:r>
+              <a:rPr lang="en-US" sz="1600" dirty="0"/>
+              <a:t> </a:t>
+            </a:r>
+          </a:p>
+          <a:p>
+            <a:pPr marL="522864" lvl="1" indent="-342900">
+              <a:buFont typeface="Arial" panose="020B0604020202020204" pitchFamily="34" charset="0"/>
+              <a:buChar char="•"/>
+            </a:pPr>
+            <a:r>
+              <a:rPr lang="en-US" sz="1600" dirty="0" err="1"/>
+              <a:t>nslookup</a:t>
+            </a:r>
+            <a:r>
+              <a:rPr lang="en-US" sz="1600" dirty="0"/>
+              <a:t> web-0.nginx</a:t>
+            </a:r>
+          </a:p>
+          <a:p>
+            <a:pPr marL="522864" lvl="1" indent="-342900">
+              <a:buFont typeface="Arial" panose="020B0604020202020204" pitchFamily="34" charset="0"/>
+              <a:buChar char="•"/>
+            </a:pPr>
+            <a:r>
+              <a:rPr lang="en-US" sz="1600" dirty="0" err="1"/>
+              <a:t>nslookup</a:t>
+            </a:r>
+            <a:r>
+              <a:rPr lang="en-US" sz="1600" dirty="0"/>
+              <a:t> web-1.nginx</a:t>
+            </a:r>
+          </a:p>
+          <a:p>
+            <a:endParaRPr lang="en-US" dirty="0"/>
+          </a:p>
+        </p:txBody>
+      </p:sp>
+      <p:sp>
+        <p:nvSpPr>
           <p:cNvPr id="4" name="Slide Number Placeholder 3"/>
           <p:cNvSpPr>
             <a:spLocks noGrp="1"/>
@@ -4781,56 +5245,18 @@
           <a:lstStyle/>
           <a:p>
             <a:fld id="{7D8C2C35-2B8A-446E-BEC0-FD36716C29AC}" type="slidenum">
-              <a:rPr lang="en-US" smtClean="0"/>
+              <a:rPr lang="de-DE" smtClean="0"/>
               <a:pPr/>
-              <a:t>10</a:t>
+              <a:t>9</a:t>
             </a:fld>
-            <a:endParaRPr lang="en-US" dirty="0"/>
-          </a:p>
-        </p:txBody>
-      </p:sp>
-      <p:sp>
-        <p:nvSpPr>
-          <p:cNvPr id="6" name="Slide Image Placeholder 5"/>
-          <p:cNvSpPr>
-            <a:spLocks noGrp="1" noRot="1" noChangeAspect="1"/>
-          </p:cNvSpPr>
-          <p:nvPr>
-            <p:ph type="sldImg"/>
-          </p:nvPr>
-        </p:nvSpPr>
-        <p:spPr>
-          <a:xfrm>
-            <a:off x="547688" y="612775"/>
-            <a:ext cx="5762625" cy="3241675"/>
-          </a:xfrm>
-        </p:spPr>
-      </p:sp>
-      <p:sp>
-        <p:nvSpPr>
-          <p:cNvPr id="7" name="Notes Placeholder 6"/>
-          <p:cNvSpPr>
-            <a:spLocks noGrp="1"/>
-          </p:cNvSpPr>
-          <p:nvPr>
-            <p:ph type="body" idx="1"/>
-          </p:nvPr>
-        </p:nvSpPr>
-        <p:spPr/>
-        <p:txBody>
-          <a:bodyPr>
-            <a:normAutofit/>
-          </a:bodyPr>
-          <a:lstStyle/>
-          <a:p>
-            <a:endParaRPr lang="en-US" dirty="0"/>
+            <a:endParaRPr lang="de-DE" dirty="0"/>
           </a:p>
         </p:txBody>
       </p:sp>
     </p:spTree>
     <p:extLst>
       <p:ext uri="{BB962C8B-B14F-4D97-AF65-F5344CB8AC3E}">
-        <p14:creationId xmlns:p14="http://schemas.microsoft.com/office/powerpoint/2010/main" val="2544264309"/>
+        <p14:creationId xmlns:p14="http://schemas.microsoft.com/office/powerpoint/2010/main" val="3785034902"/>
       </p:ext>
     </p:extLst>
   </p:cSld>
@@ -18276,6 +18702,94 @@
 </file>
 
 <file path=ppt/slides/slide10.xml><?xml version="1.0" encoding="utf-8"?>
+<p:sld xmlns:a="http://schemas.openxmlformats.org/drawingml/2006/main" xmlns:r="http://schemas.openxmlformats.org/officeDocument/2006/relationships" xmlns:p="http://schemas.openxmlformats.org/presentationml/2006/main">
+  <p:cSld>
+    <p:spTree>
+      <p:nvGrpSpPr>
+        <p:cNvPr id="1" name=""/>
+        <p:cNvGrpSpPr/>
+        <p:nvPr/>
+      </p:nvGrpSpPr>
+      <p:grpSpPr>
+        <a:xfrm>
+          <a:off x="0" y="0"/>
+          <a:ext cx="0" cy="0"/>
+          <a:chOff x="0" y="0"/>
+          <a:chExt cx="0" cy="0"/>
+        </a:xfrm>
+      </p:grpSpPr>
+      <p:sp>
+        <p:nvSpPr>
+          <p:cNvPr id="3" name="Title 2">
+            <a:extLst>
+              <a:ext uri="{FF2B5EF4-FFF2-40B4-BE49-F238E27FC236}">
+                <a16:creationId xmlns:a16="http://schemas.microsoft.com/office/drawing/2014/main" id="{B4B6938A-7A0C-4712-A9B8-41F25B66C8A4}"/>
+              </a:ext>
+            </a:extLst>
+          </p:cNvPr>
+          <p:cNvSpPr>
+            <a:spLocks noGrp="1"/>
+          </p:cNvSpPr>
+          <p:nvPr>
+            <p:ph type="title"/>
+          </p:nvPr>
+        </p:nvSpPr>
+        <p:spPr/>
+        <p:txBody>
+          <a:bodyPr/>
+          <a:lstStyle/>
+          <a:p>
+            <a:r>
+              <a:rPr lang="en-US" dirty="0"/>
+              <a:t>Exercise 07</a:t>
+            </a:r>
+          </a:p>
+        </p:txBody>
+      </p:sp>
+      <p:pic>
+        <p:nvPicPr>
+          <p:cNvPr id="6" name="Picture 5">
+            <a:extLst>
+              <a:ext uri="{FF2B5EF4-FFF2-40B4-BE49-F238E27FC236}">
+                <a16:creationId xmlns:a16="http://schemas.microsoft.com/office/drawing/2014/main" id="{6449D282-DC4E-4479-991B-68509FF3A710}"/>
+              </a:ext>
+            </a:extLst>
+          </p:cNvPr>
+          <p:cNvPicPr>
+            <a:picLocks noChangeAspect="1"/>
+          </p:cNvPicPr>
+          <p:nvPr/>
+        </p:nvPicPr>
+        <p:blipFill>
+          <a:blip r:embed="rId2"/>
+          <a:stretch>
+            <a:fillRect/>
+          </a:stretch>
+        </p:blipFill>
+        <p:spPr>
+          <a:xfrm>
+            <a:off x="4261672" y="1181180"/>
+            <a:ext cx="3773347" cy="3773347"/>
+          </a:xfrm>
+          <a:prstGeom prst="rect">
+            <a:avLst/>
+          </a:prstGeom>
+        </p:spPr>
+      </p:pic>
+    </p:spTree>
+    <p:extLst>
+      <p:ext uri="{BB962C8B-B14F-4D97-AF65-F5344CB8AC3E}">
+        <p14:creationId xmlns:p14="http://schemas.microsoft.com/office/powerpoint/2010/main" val="2757824260"/>
+      </p:ext>
+    </p:extLst>
+  </p:cSld>
+  <p:clrMapOvr>
+    <a:masterClrMapping/>
+  </p:clrMapOvr>
+</p:sld>
+</file>
+
+<file path=ppt/slides/slide11.xml><?xml version="1.0" encoding="utf-8"?>
 <p:sld xmlns:a="http://schemas.openxmlformats.org/drawingml/2006/main" xmlns:r="http://schemas.openxmlformats.org/officeDocument/2006/relationships" xmlns:p="http://schemas.openxmlformats.org/presentationml/2006/main" show="0">
   <p:cSld>
     <p:spTree>
@@ -26066,7 +26580,7 @@
 </file>
 
 <file path=ppt/slides/slide9.xml><?xml version="1.0" encoding="utf-8"?>
-<p:sld xmlns:a="http://schemas.openxmlformats.org/drawingml/2006/main" xmlns:r="http://schemas.openxmlformats.org/officeDocument/2006/relationships" xmlns:p="http://schemas.openxmlformats.org/presentationml/2006/main" show="0">
+<p:sld xmlns:a="http://schemas.openxmlformats.org/drawingml/2006/main" xmlns:r="http://schemas.openxmlformats.org/officeDocument/2006/relationships" xmlns:p="http://schemas.openxmlformats.org/presentationml/2006/main">
   <p:cSld>
     <p:spTree>
       <p:nvGrpSpPr>
@@ -26082,391 +26596,6 @@
           <a:chExt cx="0" cy="0"/>
         </a:xfrm>
       </p:grpSpPr>
-      <p:sp>
-        <p:nvSpPr>
-          <p:cNvPr id="3" name="Text Placeholder 2">
-            <a:extLst>
-              <a:ext uri="{FF2B5EF4-FFF2-40B4-BE49-F238E27FC236}">
-                <a16:creationId xmlns:a16="http://schemas.microsoft.com/office/drawing/2014/main" id="{18897664-A95A-4460-8731-2456441E0305}"/>
-              </a:ext>
-            </a:extLst>
-          </p:cNvPr>
-          <p:cNvSpPr>
-            <a:spLocks noGrp="1"/>
-          </p:cNvSpPr>
-          <p:nvPr>
-            <p:ph type="body" sz="quarter" idx="10"/>
-          </p:nvPr>
-        </p:nvSpPr>
-        <p:spPr>
-          <a:xfrm>
-            <a:off x="503999" y="1042416"/>
-            <a:ext cx="11186477" cy="5001768"/>
-          </a:xfrm>
-        </p:spPr>
-        <p:txBody>
-          <a:bodyPr/>
-          <a:lstStyle/>
-          <a:p>
-            <a:pPr marL="342900" indent="-342900">
-              <a:buFont typeface="Arial" panose="020B0604020202020204" pitchFamily="34" charset="0"/>
-              <a:buChar char="•"/>
-            </a:pPr>
-            <a:r>
-              <a:rPr lang="en-US" sz="1800" dirty="0"/>
-              <a:t>Use the “</a:t>
-            </a:r>
-            <a:r>
-              <a:rPr lang="en-US" sz="1800" dirty="0" err="1"/>
-              <a:t>statefulset_with_svc.yaml</a:t>
-            </a:r>
-            <a:r>
-              <a:rPr lang="en-US" sz="1800" dirty="0"/>
-              <a:t>” file to deploy a </a:t>
-            </a:r>
-            <a:r>
-              <a:rPr lang="en-US" sz="1800" dirty="0" err="1"/>
-              <a:t>statefulset</a:t>
-            </a:r>
-            <a:r>
-              <a:rPr lang="en-US" sz="1800" dirty="0"/>
-              <a:t> + a corresponding headless service</a:t>
-            </a:r>
-          </a:p>
-          <a:p>
-            <a:pPr marL="342900" indent="-342900">
-              <a:buFont typeface="Arial" panose="020B0604020202020204" pitchFamily="34" charset="0"/>
-              <a:buChar char="•"/>
-            </a:pPr>
-            <a:r>
-              <a:rPr lang="en-US" sz="1800" dirty="0"/>
-              <a:t>The example is based on an </a:t>
-            </a:r>
-            <a:r>
-              <a:rPr lang="en-US" sz="1800" dirty="0" err="1"/>
-              <a:t>nginx</a:t>
-            </a:r>
-            <a:r>
-              <a:rPr lang="en-US" sz="1800" dirty="0"/>
-              <a:t> webserver and includes a </a:t>
-            </a:r>
-            <a:r>
-              <a:rPr lang="en-US" sz="1800" dirty="0" err="1"/>
-              <a:t>pvc</a:t>
-            </a:r>
-            <a:r>
-              <a:rPr lang="en-US" sz="1800" dirty="0"/>
-              <a:t> template</a:t>
-            </a:r>
-          </a:p>
-          <a:p>
-            <a:pPr marL="342900" indent="-342900">
-              <a:buFont typeface="Arial" panose="020B0604020202020204" pitchFamily="34" charset="0"/>
-              <a:buChar char="•"/>
-            </a:pPr>
-            <a:r>
-              <a:rPr lang="en-US" sz="1800" dirty="0"/>
-              <a:t>Show the </a:t>
-            </a:r>
-            <a:r>
-              <a:rPr lang="en-US" sz="1800" dirty="0" err="1"/>
-              <a:t>yaml</a:t>
-            </a:r>
-            <a:r>
-              <a:rPr lang="en-US" sz="1800" dirty="0"/>
-              <a:t> file, point out the “</a:t>
-            </a:r>
-            <a:r>
-              <a:rPr lang="en-US" sz="1800" dirty="0" err="1"/>
-              <a:t>clusterIP</a:t>
-            </a:r>
-            <a:r>
-              <a:rPr lang="en-US" sz="1800" dirty="0"/>
-              <a:t>: None” etc.</a:t>
-            </a:r>
-          </a:p>
-          <a:p>
-            <a:pPr marL="342900" indent="-342900">
-              <a:buFont typeface="Arial" panose="020B0604020202020204" pitchFamily="34" charset="0"/>
-              <a:buChar char="•"/>
-            </a:pPr>
-            <a:r>
-              <a:rPr lang="en-US" sz="1800" dirty="0"/>
-              <a:t>Show the ordinal index &amp; ordered creation of pods when scaling</a:t>
-            </a:r>
-          </a:p>
-          <a:p>
-            <a:pPr marL="342900" indent="-342900">
-              <a:buFont typeface="Arial" panose="020B0604020202020204" pitchFamily="34" charset="0"/>
-              <a:buChar char="•"/>
-            </a:pPr>
-            <a:r>
-              <a:rPr lang="en-US" sz="1800" dirty="0"/>
-              <a:t>Show the created PVCs</a:t>
-            </a:r>
-          </a:p>
-          <a:p>
-            <a:pPr marL="342900" indent="-342900">
-              <a:buFont typeface="Arial" panose="020B0604020202020204" pitchFamily="34" charset="0"/>
-              <a:buChar char="•"/>
-            </a:pPr>
-            <a:r>
-              <a:rPr lang="en-US" sz="1800" dirty="0"/>
-              <a:t>Write content to storage &amp; check it (</a:t>
-            </a:r>
-            <a:r>
-              <a:rPr lang="en-US" sz="1800" dirty="0" err="1"/>
-              <a:t>wget</a:t>
-            </a:r>
-            <a:r>
-              <a:rPr lang="en-US" sz="1800" dirty="0"/>
-              <a:t> localhost for index.html); adapt loop to number of replicas: </a:t>
-            </a:r>
-          </a:p>
-          <a:p>
-            <a:pPr marL="522864" lvl="1" indent="-342900">
-              <a:buFont typeface="Arial" panose="020B0604020202020204" pitchFamily="34" charset="0"/>
-              <a:buChar char="•"/>
-            </a:pPr>
-            <a:r>
-              <a:rPr lang="en-US" sz="1400" dirty="0"/>
-              <a:t>for </a:t>
-            </a:r>
-            <a:r>
-              <a:rPr lang="en-US" sz="1400" dirty="0" err="1"/>
-              <a:t>i</a:t>
-            </a:r>
-            <a:r>
-              <a:rPr lang="en-US" sz="1400" dirty="0"/>
-              <a:t> in 0 1; do </a:t>
-            </a:r>
-            <a:r>
-              <a:rPr lang="en-US" sz="1400" dirty="0" err="1"/>
-              <a:t>kubectl</a:t>
-            </a:r>
-            <a:r>
-              <a:rPr lang="en-US" sz="1400" dirty="0"/>
-              <a:t> exec web-$</a:t>
-            </a:r>
-            <a:r>
-              <a:rPr lang="en-US" sz="1400" dirty="0" err="1"/>
-              <a:t>i</a:t>
-            </a:r>
-            <a:r>
-              <a:rPr lang="en-US" sz="1400" dirty="0"/>
-              <a:t> -- </a:t>
-            </a:r>
-            <a:r>
-              <a:rPr lang="en-US" sz="1400" dirty="0" err="1"/>
-              <a:t>sh</a:t>
-            </a:r>
-            <a:r>
-              <a:rPr lang="en-US" sz="1400" dirty="0"/>
-              <a:t> -c 'echo $(hostname) &gt; /</a:t>
-            </a:r>
-            <a:r>
-              <a:rPr lang="en-US" sz="1400" dirty="0" err="1"/>
-              <a:t>usr</a:t>
-            </a:r>
-            <a:r>
-              <a:rPr lang="en-US" sz="1400" dirty="0"/>
-              <a:t>/share/</a:t>
-            </a:r>
-            <a:r>
-              <a:rPr lang="en-US" sz="1400" dirty="0" err="1"/>
-              <a:t>nginx</a:t>
-            </a:r>
-            <a:r>
-              <a:rPr lang="en-US" sz="1400" dirty="0"/>
-              <a:t>/html/index.html'; done</a:t>
-            </a:r>
-          </a:p>
-          <a:p>
-            <a:pPr marL="522864" lvl="1" indent="-342900">
-              <a:buFont typeface="Arial" panose="020B0604020202020204" pitchFamily="34" charset="0"/>
-              <a:buChar char="•"/>
-            </a:pPr>
-            <a:r>
-              <a:rPr lang="en-US" sz="1400" dirty="0"/>
-              <a:t>for </a:t>
-            </a:r>
-            <a:r>
-              <a:rPr lang="en-US" sz="1400" dirty="0" err="1"/>
-              <a:t>i</a:t>
-            </a:r>
-            <a:r>
-              <a:rPr lang="en-US" sz="1400" dirty="0"/>
-              <a:t> in 0 1; do </a:t>
-            </a:r>
-            <a:r>
-              <a:rPr lang="en-US" sz="1400" dirty="0" err="1"/>
-              <a:t>kubectl</a:t>
-            </a:r>
-            <a:r>
-              <a:rPr lang="en-US" sz="1400" dirty="0"/>
-              <a:t> exec -it web-$</a:t>
-            </a:r>
-            <a:r>
-              <a:rPr lang="en-US" sz="1400" dirty="0" err="1"/>
-              <a:t>i</a:t>
-            </a:r>
-            <a:r>
-              <a:rPr lang="en-US" sz="1400" dirty="0"/>
-              <a:t> -- cat /</a:t>
-            </a:r>
-            <a:r>
-              <a:rPr lang="en-US" sz="1400" dirty="0" err="1"/>
-              <a:t>usr</a:t>
-            </a:r>
-            <a:r>
-              <a:rPr lang="en-US" sz="1400" dirty="0"/>
-              <a:t>/share/</a:t>
-            </a:r>
-            <a:r>
-              <a:rPr lang="en-US" sz="1400" dirty="0" err="1"/>
-              <a:t>nginx</a:t>
-            </a:r>
-            <a:r>
-              <a:rPr lang="en-US" sz="1400" dirty="0"/>
-              <a:t>/html/index.html; done</a:t>
-            </a:r>
-          </a:p>
-          <a:p>
-            <a:pPr marL="522864" lvl="1" indent="-342900">
-              <a:buFont typeface="Arial" panose="020B0604020202020204" pitchFamily="34" charset="0"/>
-              <a:buChar char="•"/>
-            </a:pPr>
-            <a:r>
-              <a:rPr lang="en-US" sz="1400" dirty="0"/>
-              <a:t>Delete pods, wait for them to be re-created and curl again =&gt; output should not differ</a:t>
-            </a:r>
-          </a:p>
-          <a:p>
-            <a:pPr marL="342900" indent="-342900">
-              <a:buFont typeface="Arial" panose="020B0604020202020204" pitchFamily="34" charset="0"/>
-              <a:buChar char="•"/>
-            </a:pPr>
-            <a:r>
-              <a:rPr lang="en-US" sz="1800" dirty="0"/>
-              <a:t>Run a </a:t>
-            </a:r>
-            <a:r>
-              <a:rPr lang="en-US" sz="1800" dirty="0" err="1"/>
-              <a:t>tmp</a:t>
-            </a:r>
-            <a:r>
-              <a:rPr lang="en-US" sz="1800" dirty="0"/>
-              <a:t> </a:t>
-            </a:r>
-            <a:r>
-              <a:rPr lang="en-US" sz="1800" dirty="0" err="1"/>
-              <a:t>busybox</a:t>
-            </a:r>
-            <a:r>
-              <a:rPr lang="en-US" sz="1800" dirty="0"/>
-              <a:t> pod and use it for some </a:t>
-            </a:r>
-            <a:r>
-              <a:rPr lang="en-US" sz="1800" dirty="0" err="1"/>
-              <a:t>nslookup</a:t>
-            </a:r>
-            <a:r>
-              <a:rPr lang="en-US" sz="1800" dirty="0"/>
-              <a:t> commands. Show the internal addresses and how to access them</a:t>
-            </a:r>
-          </a:p>
-          <a:p>
-            <a:pPr marL="522864" lvl="1" indent="-342900">
-              <a:buFont typeface="Arial" panose="020B0604020202020204" pitchFamily="34" charset="0"/>
-              <a:buChar char="•"/>
-            </a:pPr>
-            <a:r>
-              <a:rPr lang="en-US" sz="1600" dirty="0" err="1"/>
-              <a:t>kubectl</a:t>
-            </a:r>
-            <a:r>
-              <a:rPr lang="en-US" sz="1600" dirty="0"/>
-              <a:t> run -</a:t>
-            </a:r>
-            <a:r>
-              <a:rPr lang="en-US" sz="1600" dirty="0" err="1"/>
-              <a:t>i</a:t>
-            </a:r>
-            <a:r>
-              <a:rPr lang="en-US" sz="1600" dirty="0"/>
-              <a:t> --</a:t>
-            </a:r>
-            <a:r>
-              <a:rPr lang="en-US" sz="1600" dirty="0" err="1"/>
-              <a:t>tty</a:t>
-            </a:r>
-            <a:r>
-              <a:rPr lang="en-US" sz="1600" dirty="0"/>
-              <a:t> --image </a:t>
-            </a:r>
-            <a:r>
-              <a:rPr lang="en-US" sz="1600" dirty="0" err="1"/>
-              <a:t>busybox</a:t>
-            </a:r>
-            <a:r>
-              <a:rPr lang="en-US" sz="1600" dirty="0"/>
-              <a:t> </a:t>
-            </a:r>
-            <a:r>
-              <a:rPr lang="en-US" sz="1600" dirty="0" err="1"/>
-              <a:t>dns</a:t>
-            </a:r>
-            <a:r>
-              <a:rPr lang="en-US" sz="1600" dirty="0"/>
-              <a:t>-test --restart=Never --</a:t>
-            </a:r>
-            <a:r>
-              <a:rPr lang="en-US" sz="1600" dirty="0" err="1"/>
-              <a:t>rm</a:t>
-            </a:r>
-            <a:r>
-              <a:rPr lang="en-US" sz="1600" dirty="0"/>
-              <a:t> /bin/</a:t>
-            </a:r>
-            <a:r>
-              <a:rPr lang="en-US" sz="1600" dirty="0" err="1"/>
-              <a:t>sh</a:t>
-            </a:r>
-            <a:r>
-              <a:rPr lang="en-US" sz="1600" dirty="0"/>
-              <a:t> </a:t>
-            </a:r>
-          </a:p>
-          <a:p>
-            <a:pPr marL="522864" lvl="1" indent="-342900">
-              <a:buFont typeface="Arial" panose="020B0604020202020204" pitchFamily="34" charset="0"/>
-              <a:buChar char="•"/>
-            </a:pPr>
-            <a:r>
-              <a:rPr lang="en-US" sz="1600" dirty="0" err="1"/>
-              <a:t>nslookup</a:t>
-            </a:r>
-            <a:r>
-              <a:rPr lang="en-US" sz="1600" dirty="0"/>
-              <a:t> web-0.nginx</a:t>
-            </a:r>
-          </a:p>
-          <a:p>
-            <a:pPr marL="522864" lvl="1" indent="-342900">
-              <a:buFont typeface="Arial" panose="020B0604020202020204" pitchFamily="34" charset="0"/>
-              <a:buChar char="•"/>
-            </a:pPr>
-            <a:r>
-              <a:rPr lang="en-US" sz="1600" dirty="0" err="1"/>
-              <a:t>nslookup</a:t>
-            </a:r>
-            <a:r>
-              <a:rPr lang="en-US" sz="1600" dirty="0"/>
-              <a:t> web-1.nginx</a:t>
-            </a:r>
-          </a:p>
-        </p:txBody>
-      </p:sp>
       <p:sp>
         <p:nvSpPr>
           <p:cNvPr id="2" name="Title 1">
@@ -26490,11 +26619,41 @@
           <a:p>
             <a:r>
               <a:rPr lang="en-US" dirty="0"/>
-              <a:t>Demo Script</a:t>
+              <a:t>Demo</a:t>
             </a:r>
           </a:p>
         </p:txBody>
       </p:sp>
+      <p:pic>
+        <p:nvPicPr>
+          <p:cNvPr id="18" name="Picture 17">
+            <a:extLst>
+              <a:ext uri="{FF2B5EF4-FFF2-40B4-BE49-F238E27FC236}">
+                <a16:creationId xmlns:a16="http://schemas.microsoft.com/office/drawing/2014/main" id="{FC355B51-9D60-4DBB-9EF1-08294FF8959E}"/>
+              </a:ext>
+            </a:extLst>
+          </p:cNvPr>
+          <p:cNvPicPr>
+            <a:picLocks noChangeAspect="1"/>
+          </p:cNvPicPr>
+          <p:nvPr/>
+        </p:nvPicPr>
+        <p:blipFill>
+          <a:blip r:embed="rId3"/>
+          <a:stretch>
+            <a:fillRect/>
+          </a:stretch>
+        </p:blipFill>
+        <p:spPr>
+          <a:xfrm>
+            <a:off x="3849419" y="1181180"/>
+            <a:ext cx="4495640" cy="4495640"/>
+          </a:xfrm>
+          <a:prstGeom prst="rect">
+            <a:avLst/>
+          </a:prstGeom>
+        </p:spPr>
+      </p:pic>
     </p:spTree>
     <p:extLst>
       <p:ext uri="{BB962C8B-B14F-4D97-AF65-F5344CB8AC3E}">

</xml_diff>

<commit_message>
statefulset uses initcontainer now
</commit_message>
<xml_diff>
--- a/kubernetes/10_statefulset.pptx
+++ b/kubernetes/10_statefulset.pptx
@@ -5,10 +5,10 @@
     <p:sldMasterId id="2147483733" r:id="rId1"/>
   </p:sldMasterIdLst>
   <p:notesMasterIdLst>
-    <p:notesMasterId r:id="rId13"/>
+    <p:notesMasterId r:id="rId14"/>
   </p:notesMasterIdLst>
   <p:handoutMasterIdLst>
-    <p:handoutMasterId r:id="rId14"/>
+    <p:handoutMasterId r:id="rId15"/>
   </p:handoutMasterIdLst>
   <p:sldIdLst>
     <p:sldId id="433" r:id="rId2"/>
@@ -20,8 +20,9 @@
     <p:sldId id="450" r:id="rId8"/>
     <p:sldId id="451" r:id="rId9"/>
     <p:sldId id="452" r:id="rId10"/>
-    <p:sldId id="456" r:id="rId11"/>
-    <p:sldId id="265" r:id="rId12"/>
+    <p:sldId id="457" r:id="rId11"/>
+    <p:sldId id="456" r:id="rId12"/>
+    <p:sldId id="265" r:id="rId13"/>
   </p:sldIdLst>
   <p:sldSz cx="12195175" cy="6858000"/>
   <p:notesSz cx="6858000" cy="9144000"/>
@@ -3588,6 +3589,193 @@
       </p:grpSpPr>
       <p:sp>
         <p:nvSpPr>
+          <p:cNvPr id="2" name="Slide Image Placeholder 1"/>
+          <p:cNvSpPr>
+            <a:spLocks noGrp="1" noRot="1" noChangeAspect="1"/>
+          </p:cNvSpPr>
+          <p:nvPr>
+            <p:ph type="sldImg"/>
+          </p:nvPr>
+        </p:nvSpPr>
+        <p:spPr/>
+      </p:sp>
+      <p:sp>
+        <p:nvSpPr>
+          <p:cNvPr id="3" name="Notes Placeholder 2"/>
+          <p:cNvSpPr>
+            <a:spLocks noGrp="1"/>
+          </p:cNvSpPr>
+          <p:nvPr>
+            <p:ph type="body" idx="1"/>
+          </p:nvPr>
+        </p:nvSpPr>
+        <p:spPr/>
+        <p:txBody>
+          <a:bodyPr/>
+          <a:lstStyle/>
+          <a:p>
+            <a:r>
+              <a:rPr lang="en-US" dirty="0"/>
+              <a:t>If not explained in detail already , it is time to talk about </a:t>
+            </a:r>
+            <a:r>
+              <a:rPr lang="en-US" dirty="0" err="1"/>
+              <a:t>initContainers</a:t>
+            </a:r>
+            <a:r>
+              <a:rPr lang="en-US" dirty="0"/>
+              <a:t>.</a:t>
+            </a:r>
+          </a:p>
+          <a:p>
+            <a:endParaRPr lang="en-US" dirty="0"/>
+          </a:p>
+          <a:p>
+            <a:r>
+              <a:rPr lang="en-US" dirty="0"/>
+              <a:t>They are part of the pod spec and have more or less the same structure as any “regular” container. There can be one to many </a:t>
+            </a:r>
+            <a:r>
+              <a:rPr lang="en-US" dirty="0" err="1"/>
+              <a:t>initContainers</a:t>
+            </a:r>
+            <a:r>
+              <a:rPr lang="en-US" dirty="0"/>
+              <a:t> defined on a single pod.</a:t>
+            </a:r>
+          </a:p>
+          <a:p>
+            <a:endParaRPr lang="en-US" dirty="0"/>
+          </a:p>
+          <a:p>
+            <a:pPr marL="0" marR="0" lvl="0" indent="0" algn="l" defTabSz="1088776" rtl="0" eaLnBrk="1" fontAlgn="auto" latinLnBrk="0" hangingPunct="1">
+              <a:lnSpc>
+                <a:spcPct val="100000"/>
+              </a:lnSpc>
+              <a:spcBef>
+                <a:spcPts val="0"/>
+              </a:spcBef>
+              <a:spcAft>
+                <a:spcPts val="0"/>
+              </a:spcAft>
+              <a:buClrTx/>
+              <a:buSzTx/>
+              <a:buFontTx/>
+              <a:buNone/>
+              <a:tabLst/>
+              <a:defRPr/>
+            </a:pPr>
+            <a:r>
+              <a:rPr lang="en-US" dirty="0"/>
+              <a:t>As the name indicates, they are supposed to run before the start of the regular container within the pod. To access the logs of an </a:t>
+            </a:r>
+            <a:r>
+              <a:rPr lang="en-US" dirty="0" err="1"/>
+              <a:t>initContainer</a:t>
+            </a:r>
+            <a:r>
+              <a:rPr lang="en-US" dirty="0"/>
+              <a:t>, you can use the normal syntax for multi-container pods: “</a:t>
+            </a:r>
+            <a:r>
+              <a:rPr lang="en-US" dirty="0" err="1"/>
+              <a:t>kubectl</a:t>
+            </a:r>
+            <a:r>
+              <a:rPr lang="en-US" dirty="0"/>
+              <a:t> logs &lt;pod-</a:t>
+            </a:r>
+            <a:r>
+              <a:rPr lang="en-US" dirty="0" err="1"/>
+              <a:t>nam</a:t>
+            </a:r>
+            <a:r>
+              <a:rPr lang="en-US" dirty="0"/>
+              <a:t>&gt; -c &lt;container-name&gt;”</a:t>
+            </a:r>
+          </a:p>
+          <a:p>
+            <a:pPr marL="0" marR="0" lvl="0" indent="0" algn="l" defTabSz="1088776" rtl="0" eaLnBrk="1" fontAlgn="auto" latinLnBrk="0" hangingPunct="1">
+              <a:lnSpc>
+                <a:spcPct val="100000"/>
+              </a:lnSpc>
+              <a:spcBef>
+                <a:spcPts val="0"/>
+              </a:spcBef>
+              <a:spcAft>
+                <a:spcPts val="0"/>
+              </a:spcAft>
+              <a:buClrTx/>
+              <a:buSzTx/>
+              <a:buFontTx/>
+              <a:buNone/>
+              <a:tabLst/>
+              <a:defRPr/>
+            </a:pPr>
+            <a:r>
+              <a:rPr lang="en-US" dirty="0"/>
+              <a:t>Important: </a:t>
+            </a:r>
+            <a:r>
+              <a:rPr lang="en-US" dirty="0" err="1"/>
+              <a:t>initContainer</a:t>
+            </a:r>
+            <a:r>
+              <a:rPr lang="en-US" dirty="0"/>
+              <a:t> have full access to all volumes defined in the </a:t>
+            </a:r>
+            <a:r>
+              <a:rPr lang="en-US" dirty="0" err="1"/>
+              <a:t>podSpec</a:t>
+            </a:r>
+            <a:r>
+              <a:rPr lang="en-US" dirty="0"/>
+              <a:t>. </a:t>
+            </a:r>
+          </a:p>
+          <a:p>
+            <a:endParaRPr lang="en-US" dirty="0"/>
+          </a:p>
+          <a:p>
+            <a:r>
+              <a:rPr lang="en-US" dirty="0"/>
+              <a:t>Use them for preprocessing tasks – like writing the current host name to a file on a PVC as we did in our demo example.</a:t>
+            </a:r>
+          </a:p>
+          <a:p>
+            <a:endParaRPr lang="en-US" dirty="0"/>
+          </a:p>
+          <a:p>
+            <a:r>
+              <a:rPr lang="en-US" dirty="0"/>
+              <a:t>You can show the </a:t>
+            </a:r>
+            <a:r>
+              <a:rPr lang="en-US" dirty="0" err="1"/>
+              <a:t>init</a:t>
+            </a:r>
+            <a:r>
+              <a:rPr lang="en-US" dirty="0"/>
+              <a:t> container in the </a:t>
+            </a:r>
+            <a:r>
+              <a:rPr lang="en-US" dirty="0" err="1"/>
+              <a:t>statefuleset</a:t>
+            </a:r>
+            <a:r>
+              <a:rPr lang="en-US" dirty="0"/>
+              <a:t> spec as an example or use </a:t>
+            </a:r>
+            <a:r>
+              <a:rPr lang="en-US"/>
+              <a:t>the ingress demo.</a:t>
+            </a:r>
+            <a:endParaRPr lang="en-US" dirty="0"/>
+          </a:p>
+        </p:txBody>
+      </p:sp>
+      <p:sp>
+        <p:nvSpPr>
           <p:cNvPr id="4" name="Slide Number Placeholder 3"/>
           <p:cNvSpPr>
             <a:spLocks noGrp="1"/>
@@ -3602,9 +3790,63 @@
           <a:lstStyle/>
           <a:p>
             <a:fld id="{7D8C2C35-2B8A-446E-BEC0-FD36716C29AC}" type="slidenum">
+              <a:rPr lang="de-DE" smtClean="0"/>
+              <a:pPr/>
+              <a:t>10</a:t>
+            </a:fld>
+            <a:endParaRPr lang="de-DE" dirty="0"/>
+          </a:p>
+        </p:txBody>
+      </p:sp>
+    </p:spTree>
+    <p:extLst>
+      <p:ext uri="{BB962C8B-B14F-4D97-AF65-F5344CB8AC3E}">
+        <p14:creationId xmlns:p14="http://schemas.microsoft.com/office/powerpoint/2010/main" val="2720099807"/>
+      </p:ext>
+    </p:extLst>
+  </p:cSld>
+  <p:clrMapOvr>
+    <a:masterClrMapping/>
+  </p:clrMapOvr>
+</p:notes>
+</file>
+
+<file path=ppt/notesSlides/notesSlide11.xml><?xml version="1.0" encoding="utf-8"?>
+<p:notes xmlns:a="http://schemas.openxmlformats.org/drawingml/2006/main" xmlns:r="http://schemas.openxmlformats.org/officeDocument/2006/relationships" xmlns:p="http://schemas.openxmlformats.org/presentationml/2006/main">
+  <p:cSld>
+    <p:spTree>
+      <p:nvGrpSpPr>
+        <p:cNvPr id="1" name=""/>
+        <p:cNvGrpSpPr/>
+        <p:nvPr/>
+      </p:nvGrpSpPr>
+      <p:grpSpPr>
+        <a:xfrm>
+          <a:off x="0" y="0"/>
+          <a:ext cx="0" cy="0"/>
+          <a:chOff x="0" y="0"/>
+          <a:chExt cx="0" cy="0"/>
+        </a:xfrm>
+      </p:grpSpPr>
+      <p:sp>
+        <p:nvSpPr>
+          <p:cNvPr id="4" name="Slide Number Placeholder 3"/>
+          <p:cNvSpPr>
+            <a:spLocks noGrp="1"/>
+          </p:cNvSpPr>
+          <p:nvPr>
+            <p:ph type="sldNum" sz="quarter" idx="10"/>
+          </p:nvPr>
+        </p:nvSpPr>
+        <p:spPr/>
+        <p:txBody>
+          <a:bodyPr/>
+          <a:lstStyle/>
+          <a:p>
+            <a:fld id="{7D8C2C35-2B8A-446E-BEC0-FD36716C29AC}" type="slidenum">
               <a:rPr lang="en-US" smtClean="0"/>
               <a:pPr/>
-              <a:t>11</a:t>
+              <a:t>12</a:t>
             </a:fld>
             <a:endParaRPr lang="en-US" dirty="0"/>
           </a:p>
@@ -4879,7 +5121,7 @@
         <p:spPr/>
         <p:txBody>
           <a:bodyPr>
-            <a:normAutofit fontScale="92500" lnSpcReduction="10000"/>
+            <a:normAutofit fontScale="85000" lnSpcReduction="10000"/>
           </a:bodyPr>
           <a:lstStyle/>
           <a:p>
@@ -4967,7 +5209,23 @@
             </a:pPr>
             <a:r>
               <a:rPr lang="en-US" sz="1800" dirty="0"/>
-              <a:t>Show the ordinal index &amp; ordered creation of pods when scaling</a:t>
+              <a:t>Show the </a:t>
+            </a:r>
+            <a:r>
+              <a:rPr lang="en-US" sz="1800" dirty="0" err="1"/>
+              <a:t>init</a:t>
+            </a:r>
+            <a:r>
+              <a:rPr lang="en-US" sz="1800" dirty="0"/>
+              <a:t>-container and explain that it will write the current hostname into the index.html page upon start. So whenever the pod gets deleted and restarted, the current hostname will appear in the index.html file. However, since it is a </a:t>
+            </a:r>
+            <a:r>
+              <a:rPr lang="en-US" sz="1800" dirty="0" err="1"/>
+              <a:t>Statefulset</a:t>
+            </a:r>
+            <a:r>
+              <a:rPr lang="en-US" sz="1800" dirty="0"/>
+              <a:t> it will remain stable.</a:t>
             </a:r>
           </a:p>
           <a:p>
@@ -4977,7 +5235,7 @@
             </a:pPr>
             <a:r>
               <a:rPr lang="en-US" sz="1800" dirty="0"/>
-              <a:t>Show the created PVCs</a:t>
+              <a:t>Show the ordinal index &amp; ordered creation of pods when scaling</a:t>
             </a:r>
           </a:p>
           <a:p>
@@ -4987,15 +5245,33 @@
             </a:pPr>
             <a:r>
               <a:rPr lang="en-US" sz="1800" dirty="0"/>
-              <a:t>Write content to storage &amp; check it (</a:t>
+              <a:t>Show the created PVCs</a:t>
+            </a:r>
+          </a:p>
+          <a:p>
+            <a:pPr marL="342900" indent="-342900">
+              <a:buFont typeface="Arial" panose="020B0604020202020204" pitchFamily="34" charset="0"/>
+              <a:buChar char="•"/>
+            </a:pPr>
+            <a:r>
+              <a:rPr lang="en-US" sz="1800" dirty="0"/>
+              <a:t>Run a </a:t>
             </a:r>
             <a:r>
               <a:rPr lang="en-US" sz="1800" dirty="0" err="1"/>
-              <a:t>wget</a:t>
+              <a:t>tmp</a:t>
             </a:r>
             <a:r>
               <a:rPr lang="en-US" sz="1800" dirty="0"/>
-              <a:t> localhost for index.html); adapt loop to number of replicas: </a:t>
+              <a:t> alpine pod and use it for some </a:t>
+            </a:r>
+            <a:r>
+              <a:rPr lang="en-US" sz="1800" dirty="0" err="1"/>
+              <a:t>nslookup</a:t>
+            </a:r>
+            <a:r>
+              <a:rPr lang="en-US" sz="1800" dirty="0"/>
+              <a:t> commands. Show the internal addresses and how to access them</a:t>
             </a:r>
           </a:p>
           <a:p>
@@ -5004,56 +5280,44 @@
               <a:buChar char="•"/>
             </a:pPr>
             <a:r>
-              <a:rPr lang="en-US" sz="1400" dirty="0"/>
-              <a:t>for </a:t>
-            </a:r>
-            <a:r>
-              <a:rPr lang="en-US" sz="1400" dirty="0" err="1"/>
+              <a:rPr lang="en-US" sz="1600" dirty="0" err="1"/>
+              <a:t>kubectl</a:t>
+            </a:r>
+            <a:r>
+              <a:rPr lang="en-US" sz="1600" dirty="0"/>
+              <a:t> run </a:t>
+            </a:r>
+            <a:r>
+              <a:rPr lang="en-US" sz="1600" dirty="0" err="1"/>
+              <a:t>dns</a:t>
+            </a:r>
+            <a:r>
+              <a:rPr lang="en-US" sz="1600" dirty="0"/>
+              <a:t>-test -</a:t>
+            </a:r>
+            <a:r>
+              <a:rPr lang="en-US" sz="1600" dirty="0" err="1"/>
               <a:t>i</a:t>
             </a:r>
             <a:r>
-              <a:rPr lang="en-US" sz="1400" dirty="0"/>
-              <a:t> in 0 1; do </a:t>
-            </a:r>
-            <a:r>
-              <a:rPr lang="en-US" sz="1400" dirty="0" err="1"/>
-              <a:t>kubectl</a:t>
-            </a:r>
-            <a:r>
-              <a:rPr lang="en-US" sz="1400" dirty="0"/>
-              <a:t> exec web-$</a:t>
-            </a:r>
-            <a:r>
-              <a:rPr lang="en-US" sz="1400" dirty="0" err="1"/>
-              <a:t>i</a:t>
-            </a:r>
-            <a:r>
-              <a:rPr lang="en-US" sz="1400" dirty="0"/>
-              <a:t> -- </a:t>
-            </a:r>
-            <a:r>
-              <a:rPr lang="en-US" sz="1400" dirty="0" err="1"/>
-              <a:t>sh</a:t>
-            </a:r>
-            <a:r>
-              <a:rPr lang="en-US" sz="1400" dirty="0"/>
-              <a:t> -c 'echo $(hostname) &gt; /</a:t>
-            </a:r>
-            <a:r>
-              <a:rPr lang="en-US" sz="1400" dirty="0" err="1"/>
-              <a:t>usr</a:t>
-            </a:r>
-            <a:r>
-              <a:rPr lang="en-US" sz="1400" dirty="0"/>
-              <a:t>/share/</a:t>
-            </a:r>
-            <a:r>
-              <a:rPr lang="en-US" sz="1400" dirty="0" err="1"/>
-              <a:t>nginx</a:t>
-            </a:r>
-            <a:r>
-              <a:rPr lang="en-US" sz="1400" dirty="0"/>
-              <a:t>/html/index.html'; done</a:t>
+              <a:rPr lang="en-US" sz="1600" dirty="0"/>
+              <a:t> --</a:t>
+            </a:r>
+            <a:r>
+              <a:rPr lang="en-US" sz="1600" dirty="0" err="1"/>
+              <a:t>tty</a:t>
+            </a:r>
+            <a:r>
+              <a:rPr lang="en-US" sz="1600" dirty="0"/>
+              <a:t> --</a:t>
+            </a:r>
+            <a:r>
+              <a:rPr lang="en-US" sz="1600" dirty="0" err="1"/>
+              <a:t>rm</a:t>
+            </a:r>
+            <a:r>
+              <a:rPr lang="en-US" sz="1600" dirty="0"/>
+              <a:t> --restart=Never --image alpine:3.8 </a:t>
             </a:r>
           </a:p>
           <a:p>
@@ -5062,74 +5326,12 @@
               <a:buChar char="•"/>
             </a:pPr>
             <a:r>
-              <a:rPr lang="en-US" sz="1400" dirty="0"/>
-              <a:t>for </a:t>
-            </a:r>
-            <a:r>
-              <a:rPr lang="en-US" sz="1400" dirty="0" err="1"/>
-              <a:t>i</a:t>
-            </a:r>
-            <a:r>
-              <a:rPr lang="en-US" sz="1400" dirty="0"/>
-              <a:t> in 0 1; do </a:t>
-            </a:r>
-            <a:r>
-              <a:rPr lang="en-US" sz="1400" dirty="0" err="1"/>
-              <a:t>kubectl</a:t>
-            </a:r>
-            <a:r>
-              <a:rPr lang="en-US" sz="1400" dirty="0"/>
-              <a:t> exec -it web-$</a:t>
-            </a:r>
-            <a:r>
-              <a:rPr lang="en-US" sz="1400" dirty="0" err="1"/>
-              <a:t>i</a:t>
-            </a:r>
-            <a:r>
-              <a:rPr lang="en-US" sz="1400" dirty="0"/>
-              <a:t> -- cat /</a:t>
-            </a:r>
-            <a:r>
-              <a:rPr lang="en-US" sz="1400" dirty="0" err="1"/>
-              <a:t>usr</a:t>
-            </a:r>
-            <a:r>
-              <a:rPr lang="en-US" sz="1400" dirty="0"/>
-              <a:t>/share/</a:t>
-            </a:r>
-            <a:r>
-              <a:rPr lang="en-US" sz="1400" dirty="0" err="1"/>
-              <a:t>nginx</a:t>
-            </a:r>
-            <a:r>
-              <a:rPr lang="en-US" sz="1400" dirty="0"/>
-              <a:t>/html/index.html; done</a:t>
-            </a:r>
-          </a:p>
-          <a:p>
-            <a:pPr marL="342900" indent="-342900">
-              <a:buFont typeface="Arial" panose="020B0604020202020204" pitchFamily="34" charset="0"/>
-              <a:buChar char="•"/>
-            </a:pPr>
-            <a:r>
-              <a:rPr lang="en-US" sz="1800" dirty="0"/>
-              <a:t>Run a </a:t>
-            </a:r>
-            <a:r>
-              <a:rPr lang="en-US" sz="1800" dirty="0" err="1"/>
-              <a:t>tmp</a:t>
-            </a:r>
-            <a:r>
-              <a:rPr lang="en-US" sz="1800" dirty="0"/>
-              <a:t> alpine pod and use it for some </a:t>
-            </a:r>
-            <a:r>
-              <a:rPr lang="en-US" sz="1800" dirty="0" err="1"/>
+              <a:rPr lang="en-US" sz="1600" dirty="0" err="1"/>
               <a:t>nslookup</a:t>
             </a:r>
             <a:r>
-              <a:rPr lang="en-US" sz="1800" dirty="0"/>
-              <a:t> commands. Show the internal addresses and how to access them</a:t>
+              <a:rPr lang="en-US" sz="1600" dirty="0"/>
+              <a:t> web-0.nginx</a:t>
             </a:r>
           </a:p>
           <a:p>
@@ -5139,43 +5341,11 @@
             </a:pPr>
             <a:r>
               <a:rPr lang="en-US" sz="1600" dirty="0" err="1"/>
-              <a:t>kubectl</a:t>
+              <a:t>nslookup</a:t>
             </a:r>
             <a:r>
               <a:rPr lang="en-US" sz="1600" dirty="0"/>
-              <a:t> run </a:t>
-            </a:r>
-            <a:r>
-              <a:rPr lang="en-US" sz="1600" dirty="0" err="1"/>
-              <a:t>dns</a:t>
-            </a:r>
-            <a:r>
-              <a:rPr lang="en-US" sz="1600" dirty="0"/>
-              <a:t>-test -</a:t>
-            </a:r>
-            <a:r>
-              <a:rPr lang="en-US" sz="1600" dirty="0" err="1"/>
-              <a:t>i</a:t>
-            </a:r>
-            <a:r>
-              <a:rPr lang="en-US" sz="1600" dirty="0"/>
-              <a:t> --</a:t>
-            </a:r>
-            <a:r>
-              <a:rPr lang="en-US" sz="1600" dirty="0" err="1"/>
-              <a:t>tty</a:t>
-            </a:r>
-            <a:r>
-              <a:rPr lang="en-US" sz="1600" dirty="0"/>
-              <a:t> --</a:t>
-            </a:r>
-            <a:r>
-              <a:rPr lang="en-US" sz="1600" dirty="0" err="1"/>
-              <a:t>rm</a:t>
-            </a:r>
-            <a:r>
-              <a:rPr lang="en-US" sz="1600" dirty="0"/>
-              <a:t> --restart=Never --image alpine:3.8 </a:t>
+              <a:t> web-1.nginx</a:t>
             </a:r>
           </a:p>
           <a:p>
@@ -5185,11 +5355,11 @@
             </a:pPr>
             <a:r>
               <a:rPr lang="en-US" sz="1600" dirty="0" err="1"/>
-              <a:t>nslookup</a:t>
+              <a:t>wget</a:t>
             </a:r>
             <a:r>
               <a:rPr lang="en-US" sz="1600" dirty="0"/>
-              <a:t> web-0.nginx</a:t>
+              <a:t> web-0.nginx , show the index page &amp; remove it from filesystem</a:t>
             </a:r>
           </a:p>
           <a:p>
@@ -5199,45 +5369,12 @@
             </a:pPr>
             <a:r>
               <a:rPr lang="en-US" sz="1600" dirty="0" err="1"/>
-              <a:t>nslookup</a:t>
+              <a:t>wget</a:t>
             </a:r>
             <a:r>
               <a:rPr lang="en-US" sz="1600" dirty="0"/>
-              <a:t> web-1.nginx</a:t>
-            </a:r>
-          </a:p>
-          <a:p>
-            <a:pPr marL="522864" lvl="1" indent="-342900">
-              <a:buFont typeface="Arial" panose="020B0604020202020204" pitchFamily="34" charset="0"/>
-              <a:buChar char="•"/>
-            </a:pPr>
-            <a:r>
-              <a:rPr lang="en-US" sz="1600" dirty="0" err="1"/>
-              <a:t>wget</a:t>
-            </a:r>
-            <a:r>
-              <a:rPr lang="en-US" sz="1600" dirty="0"/>
-              <a:t> web-0.nginx , show the index page &amp; remove it from filesystem</a:t>
-            </a:r>
-          </a:p>
-          <a:p>
-            <a:pPr marL="522864" lvl="1" indent="-342900">
-              <a:buFont typeface="Arial" panose="020B0604020202020204" pitchFamily="34" charset="0"/>
-              <a:buChar char="•"/>
-            </a:pPr>
-            <a:r>
-              <a:rPr lang="en-US" sz="1600" dirty="0" err="1"/>
-              <a:t>wget</a:t>
-            </a:r>
-            <a:r>
-              <a:rPr lang="en-US" sz="1600" dirty="0"/>
-              <a:t> web-1.nginx , show </a:t>
-            </a:r>
-            <a:r>
-              <a:rPr lang="en-US" sz="1600"/>
-              <a:t>the index page</a:t>
-            </a:r>
-            <a:endParaRPr lang="en-US" sz="1600" dirty="0"/>
+              <a:t> web-1.nginx , show the index page</a:t>
+            </a:r>
           </a:p>
           <a:p>
             <a:endParaRPr lang="en-US" dirty="0"/>
@@ -18738,6 +18875,1020 @@
           <p:cNvPr id="3" name="Title 2">
             <a:extLst>
               <a:ext uri="{FF2B5EF4-FFF2-40B4-BE49-F238E27FC236}">
+                <a16:creationId xmlns:a16="http://schemas.microsoft.com/office/drawing/2014/main" id="{64E6E8E5-1C48-4855-A104-25584C8DFEDC}"/>
+              </a:ext>
+            </a:extLst>
+          </p:cNvPr>
+          <p:cNvSpPr>
+            <a:spLocks noGrp="1"/>
+          </p:cNvSpPr>
+          <p:nvPr>
+            <p:ph type="title"/>
+          </p:nvPr>
+        </p:nvSpPr>
+        <p:spPr/>
+        <p:txBody>
+          <a:bodyPr/>
+          <a:lstStyle/>
+          <a:p>
+            <a:r>
+              <a:rPr lang="en-US" dirty="0" err="1"/>
+              <a:t>initContainer</a:t>
+            </a:r>
+            <a:endParaRPr lang="en-US" dirty="0"/>
+          </a:p>
+        </p:txBody>
+      </p:sp>
+      <p:grpSp>
+        <p:nvGrpSpPr>
+          <p:cNvPr id="12" name="Group 11">
+            <a:extLst>
+              <a:ext uri="{FF2B5EF4-FFF2-40B4-BE49-F238E27FC236}">
+                <a16:creationId xmlns:a16="http://schemas.microsoft.com/office/drawing/2014/main" id="{A7CAECFD-1242-4A7F-9ED8-D28B1E2933A6}"/>
+              </a:ext>
+            </a:extLst>
+          </p:cNvPr>
+          <p:cNvGrpSpPr/>
+          <p:nvPr/>
+        </p:nvGrpSpPr>
+        <p:grpSpPr>
+          <a:xfrm>
+            <a:off x="3495357" y="1797329"/>
+            <a:ext cx="5204460" cy="3263342"/>
+            <a:chOff x="3613785" y="1736369"/>
+            <a:chExt cx="5204460" cy="3263342"/>
+          </a:xfrm>
+        </p:grpSpPr>
+        <p:sp>
+          <p:nvSpPr>
+            <p:cNvPr id="4" name="Rectangle 3">
+              <a:extLst>
+                <a:ext uri="{FF2B5EF4-FFF2-40B4-BE49-F238E27FC236}">
+                  <a16:creationId xmlns:a16="http://schemas.microsoft.com/office/drawing/2014/main" id="{E6663467-237C-4A7D-A489-E4F4B6691B7F}"/>
+                </a:ext>
+              </a:extLst>
+            </p:cNvPr>
+            <p:cNvSpPr/>
+            <p:nvPr/>
+          </p:nvSpPr>
+          <p:spPr bwMode="gray">
+            <a:xfrm>
+              <a:off x="3785523" y="1858289"/>
+              <a:ext cx="5032722" cy="3141422"/>
+            </a:xfrm>
+            <a:prstGeom prst="rect">
+              <a:avLst/>
+            </a:prstGeom>
+            <a:ln>
+              <a:headEnd/>
+              <a:tailEnd/>
+            </a:ln>
+          </p:spPr>
+          <p:style>
+            <a:lnRef idx="2">
+              <a:schemeClr val="accent2">
+                <a:shade val="50000"/>
+              </a:schemeClr>
+            </a:lnRef>
+            <a:fillRef idx="1">
+              <a:schemeClr val="accent2"/>
+            </a:fillRef>
+            <a:effectRef idx="0">
+              <a:schemeClr val="accent2"/>
+            </a:effectRef>
+            <a:fontRef idx="minor">
+              <a:schemeClr val="lt1"/>
+            </a:fontRef>
+          </p:style>
+          <p:txBody>
+            <a:bodyPr lIns="90000" tIns="72000" rIns="90000" bIns="72000" rtlCol="0" anchor="t"/>
+            <a:lstStyle/>
+            <a:p>
+              <a:pPr marR="0" algn="ctr" defTabSz="914400" eaLnBrk="1" fontAlgn="base" latinLnBrk="0" hangingPunct="1">
+                <a:lnSpc>
+                  <a:spcPct val="100000"/>
+                </a:lnSpc>
+                <a:spcBef>
+                  <a:spcPct val="50000"/>
+                </a:spcBef>
+                <a:spcAft>
+                  <a:spcPct val="0"/>
+                </a:spcAft>
+                <a:buClr>
+                  <a:srgbClr val="F0AB00"/>
+                </a:buClr>
+                <a:buSzPct val="80000"/>
+                <a:tabLst/>
+              </a:pPr>
+              <a:r>
+                <a:rPr lang="de-DE" sz="1600" b="1" kern="0" dirty="0">
+                  <a:ea typeface="Arial Unicode MS" pitchFamily="34" charset="-128"/>
+                  <a:cs typeface="Arial Unicode MS" pitchFamily="34" charset="-128"/>
+                </a:rPr>
+                <a:t>w</a:t>
+              </a:r>
+              <a:r>
+                <a:rPr kumimoji="0" lang="de-DE" sz="1600" b="1" i="0" u="none" strike="noStrike" kern="0" cap="none" spc="0" normalizeH="0" baseline="0" dirty="0">
+                  <a:ln>
+                    <a:noFill/>
+                  </a:ln>
+                  <a:effectLst/>
+                  <a:uLnTx/>
+                  <a:uFillTx/>
+                  <a:ea typeface="Arial Unicode MS" pitchFamily="34" charset="-128"/>
+                  <a:cs typeface="Arial Unicode MS" pitchFamily="34" charset="-128"/>
+                </a:rPr>
+                <a:t>eb-0</a:t>
+              </a:r>
+              <a:endParaRPr kumimoji="0" lang="de-DE" sz="1600" b="1" i="0" u="none" strike="noStrike" kern="0" cap="none" spc="0" normalizeH="0" baseline="0" noProof="0" dirty="0">
+                <a:ln>
+                  <a:noFill/>
+                </a:ln>
+                <a:effectLst/>
+                <a:uLnTx/>
+                <a:uFillTx/>
+                <a:ea typeface="Arial Unicode MS" pitchFamily="34" charset="-128"/>
+                <a:cs typeface="Arial Unicode MS" pitchFamily="34" charset="-128"/>
+              </a:endParaRPr>
+            </a:p>
+          </p:txBody>
+        </p:sp>
+        <p:sp>
+          <p:nvSpPr>
+            <p:cNvPr id="5" name="Rectangle 4">
+              <a:extLst>
+                <a:ext uri="{FF2B5EF4-FFF2-40B4-BE49-F238E27FC236}">
+                  <a16:creationId xmlns:a16="http://schemas.microsoft.com/office/drawing/2014/main" id="{5F46FB49-1532-431B-AFF9-EC2720FC5472}"/>
+                </a:ext>
+              </a:extLst>
+            </p:cNvPr>
+            <p:cNvSpPr/>
+            <p:nvPr/>
+          </p:nvSpPr>
+          <p:spPr bwMode="gray">
+            <a:xfrm>
+              <a:off x="3613785" y="1736369"/>
+              <a:ext cx="1645920" cy="365760"/>
+            </a:xfrm>
+            <a:prstGeom prst="rect">
+              <a:avLst/>
+            </a:prstGeom>
+            <a:ln>
+              <a:headEnd/>
+              <a:tailEnd/>
+            </a:ln>
+          </p:spPr>
+          <p:style>
+            <a:lnRef idx="2">
+              <a:schemeClr val="accent2"/>
+            </a:lnRef>
+            <a:fillRef idx="1">
+              <a:schemeClr val="lt1"/>
+            </a:fillRef>
+            <a:effectRef idx="0">
+              <a:schemeClr val="accent2"/>
+            </a:effectRef>
+            <a:fontRef idx="minor">
+              <a:schemeClr val="dk1"/>
+            </a:fontRef>
+          </p:style>
+          <p:txBody>
+            <a:bodyPr lIns="90000" tIns="72000" rIns="90000" bIns="72000" rtlCol="0" anchor="ctr"/>
+            <a:lstStyle/>
+            <a:p>
+              <a:pPr marR="0" algn="ctr" defTabSz="914400" eaLnBrk="1" fontAlgn="base" latinLnBrk="0" hangingPunct="1">
+                <a:lnSpc>
+                  <a:spcPct val="100000"/>
+                </a:lnSpc>
+                <a:spcBef>
+                  <a:spcPct val="50000"/>
+                </a:spcBef>
+                <a:spcAft>
+                  <a:spcPct val="0"/>
+                </a:spcAft>
+                <a:buClr>
+                  <a:srgbClr val="F0AB00"/>
+                </a:buClr>
+                <a:buSzPct val="80000"/>
+                <a:tabLst/>
+              </a:pPr>
+              <a:r>
+                <a:rPr kumimoji="0" lang="de-DE" sz="1800" b="0" i="0" u="none" strike="noStrike" kern="0" cap="none" spc="0" normalizeH="0" baseline="0" noProof="0" dirty="0">
+                  <a:ln>
+                    <a:noFill/>
+                  </a:ln>
+                  <a:effectLst/>
+                  <a:uLnTx/>
+                  <a:uFillTx/>
+                  <a:ea typeface="Arial Unicode MS" pitchFamily="34" charset="-128"/>
+                  <a:cs typeface="Arial Unicode MS" pitchFamily="34" charset="-128"/>
+                </a:rPr>
+                <a:t>IP: 10.10.10.2</a:t>
+              </a:r>
+            </a:p>
+          </p:txBody>
+        </p:sp>
+        <p:sp>
+          <p:nvSpPr>
+            <p:cNvPr id="6" name="Rectangle 5">
+              <a:extLst>
+                <a:ext uri="{FF2B5EF4-FFF2-40B4-BE49-F238E27FC236}">
+                  <a16:creationId xmlns:a16="http://schemas.microsoft.com/office/drawing/2014/main" id="{019E7BD8-3EEF-4E16-9F80-23FD426B343F}"/>
+                </a:ext>
+              </a:extLst>
+            </p:cNvPr>
+            <p:cNvSpPr/>
+            <p:nvPr/>
+          </p:nvSpPr>
+          <p:spPr bwMode="gray">
+            <a:xfrm>
+              <a:off x="4174843" y="2450755"/>
+              <a:ext cx="1627931" cy="1156258"/>
+            </a:xfrm>
+            <a:prstGeom prst="rect">
+              <a:avLst/>
+            </a:prstGeom>
+            <a:ln>
+              <a:headEnd/>
+              <a:tailEnd/>
+            </a:ln>
+          </p:spPr>
+          <p:style>
+            <a:lnRef idx="2">
+              <a:schemeClr val="accent2"/>
+            </a:lnRef>
+            <a:fillRef idx="1">
+              <a:schemeClr val="lt1"/>
+            </a:fillRef>
+            <a:effectRef idx="0">
+              <a:schemeClr val="accent2"/>
+            </a:effectRef>
+            <a:fontRef idx="minor">
+              <a:schemeClr val="dk1"/>
+            </a:fontRef>
+          </p:style>
+          <p:txBody>
+            <a:bodyPr lIns="90000" tIns="72000" rIns="90000" bIns="72000" rtlCol="0" anchor="ctr"/>
+            <a:lstStyle/>
+            <a:p>
+              <a:pPr marR="0" algn="ctr" defTabSz="914400" eaLnBrk="1" fontAlgn="base" latinLnBrk="0" hangingPunct="1">
+                <a:lnSpc>
+                  <a:spcPct val="100000"/>
+                </a:lnSpc>
+                <a:spcBef>
+                  <a:spcPct val="50000"/>
+                </a:spcBef>
+                <a:spcAft>
+                  <a:spcPct val="0"/>
+                </a:spcAft>
+                <a:buClr>
+                  <a:srgbClr val="F0AB00"/>
+                </a:buClr>
+                <a:buSzPct val="80000"/>
+                <a:tabLst/>
+              </a:pPr>
+              <a:r>
+                <a:rPr lang="de-DE" sz="1800" kern="0" dirty="0" err="1">
+                  <a:ea typeface="Arial Unicode MS" pitchFamily="34" charset="-128"/>
+                  <a:cs typeface="Arial Unicode MS" pitchFamily="34" charset="-128"/>
+                </a:rPr>
+                <a:t>initC</a:t>
+              </a:r>
+              <a:r>
+                <a:rPr kumimoji="0" lang="de-DE" sz="1800" b="0" i="0" u="none" strike="noStrike" kern="0" cap="none" spc="0" normalizeH="0" baseline="0" noProof="0" dirty="0" err="1">
+                  <a:ln>
+                    <a:noFill/>
+                  </a:ln>
+                  <a:effectLst/>
+                  <a:uLnTx/>
+                  <a:uFillTx/>
+                  <a:ea typeface="Arial Unicode MS" pitchFamily="34" charset="-128"/>
+                  <a:cs typeface="Arial Unicode MS" pitchFamily="34" charset="-128"/>
+                </a:rPr>
+                <a:t>ontainer</a:t>
+              </a:r>
+              <a:endParaRPr kumimoji="0" lang="de-DE" sz="1800" b="0" i="0" u="none" strike="noStrike" kern="0" cap="none" spc="0" normalizeH="0" baseline="0" noProof="0" dirty="0">
+                <a:ln>
+                  <a:noFill/>
+                </a:ln>
+                <a:effectLst/>
+                <a:uLnTx/>
+                <a:uFillTx/>
+                <a:ea typeface="Arial Unicode MS" pitchFamily="34" charset="-128"/>
+                <a:cs typeface="Arial Unicode MS" pitchFamily="34" charset="-128"/>
+              </a:endParaRPr>
+            </a:p>
+            <a:p>
+              <a:pPr marR="0" algn="ctr" defTabSz="914400" eaLnBrk="1" fontAlgn="base" latinLnBrk="0" hangingPunct="1">
+                <a:lnSpc>
+                  <a:spcPct val="100000"/>
+                </a:lnSpc>
+                <a:spcBef>
+                  <a:spcPct val="50000"/>
+                </a:spcBef>
+                <a:spcAft>
+                  <a:spcPct val="0"/>
+                </a:spcAft>
+                <a:buClr>
+                  <a:srgbClr val="F0AB00"/>
+                </a:buClr>
+                <a:buSzPct val="80000"/>
+                <a:tabLst/>
+              </a:pPr>
+              <a:r>
+                <a:rPr lang="de-DE" sz="1800" kern="0" dirty="0" err="1">
+                  <a:ea typeface="Arial Unicode MS" pitchFamily="34" charset="-128"/>
+                  <a:cs typeface="Arial Unicode MS" pitchFamily="34" charset="-128"/>
+                </a:rPr>
+                <a:t>setup</a:t>
+              </a:r>
+              <a:endParaRPr kumimoji="0" lang="de-DE" sz="1800" b="0" i="0" u="none" strike="noStrike" kern="0" cap="none" spc="0" normalizeH="0" baseline="0" noProof="0" dirty="0">
+                <a:ln>
+                  <a:noFill/>
+                </a:ln>
+                <a:effectLst/>
+                <a:uLnTx/>
+                <a:uFillTx/>
+                <a:ea typeface="Arial Unicode MS" pitchFamily="34" charset="-128"/>
+                <a:cs typeface="Arial Unicode MS" pitchFamily="34" charset="-128"/>
+              </a:endParaRPr>
+            </a:p>
+          </p:txBody>
+        </p:sp>
+        <p:sp>
+          <p:nvSpPr>
+            <p:cNvPr id="7" name="Cylinder 6">
+              <a:extLst>
+                <a:ext uri="{FF2B5EF4-FFF2-40B4-BE49-F238E27FC236}">
+                  <a16:creationId xmlns:a16="http://schemas.microsoft.com/office/drawing/2014/main" id="{E51FA9CD-27E0-45A2-AA0F-D8A3C60FF295}"/>
+                </a:ext>
+              </a:extLst>
+            </p:cNvPr>
+            <p:cNvSpPr/>
+            <p:nvPr/>
+          </p:nvSpPr>
+          <p:spPr bwMode="gray">
+            <a:xfrm>
+              <a:off x="5802774" y="3931511"/>
+              <a:ext cx="998220" cy="1004248"/>
+            </a:xfrm>
+            <a:prstGeom prst="can">
+              <a:avLst/>
+            </a:prstGeom>
+            <a:ln>
+              <a:headEnd/>
+              <a:tailEnd/>
+            </a:ln>
+          </p:spPr>
+          <p:style>
+            <a:lnRef idx="2">
+              <a:schemeClr val="accent2"/>
+            </a:lnRef>
+            <a:fillRef idx="1">
+              <a:schemeClr val="lt1"/>
+            </a:fillRef>
+            <a:effectRef idx="0">
+              <a:schemeClr val="accent2"/>
+            </a:effectRef>
+            <a:fontRef idx="minor">
+              <a:schemeClr val="dk1"/>
+            </a:fontRef>
+          </p:style>
+          <p:txBody>
+            <a:bodyPr lIns="90000" tIns="72000" rIns="90000" bIns="72000" rtlCol="0" anchor="ctr"/>
+            <a:lstStyle/>
+            <a:p>
+              <a:pPr marR="0" algn="ctr" defTabSz="914400" eaLnBrk="1" fontAlgn="base" latinLnBrk="0" hangingPunct="1">
+                <a:lnSpc>
+                  <a:spcPct val="100000"/>
+                </a:lnSpc>
+                <a:spcBef>
+                  <a:spcPct val="50000"/>
+                </a:spcBef>
+                <a:spcAft>
+                  <a:spcPct val="0"/>
+                </a:spcAft>
+                <a:buClr>
+                  <a:srgbClr val="F0AB00"/>
+                </a:buClr>
+                <a:buSzPct val="80000"/>
+                <a:tabLst/>
+              </a:pPr>
+              <a:r>
+                <a:rPr kumimoji="0" lang="de-DE" sz="1800" b="0" i="0" u="none" strike="noStrike" kern="0" cap="none" spc="0" normalizeH="0" baseline="0" noProof="0" dirty="0" err="1">
+                  <a:ln>
+                    <a:noFill/>
+                  </a:ln>
+                  <a:effectLst/>
+                  <a:uLnTx/>
+                  <a:uFillTx/>
+                  <a:ea typeface="Arial Unicode MS" pitchFamily="34" charset="-128"/>
+                  <a:cs typeface="Arial Unicode MS" pitchFamily="34" charset="-128"/>
+                </a:rPr>
+                <a:t>volume</a:t>
+              </a:r>
+              <a:endParaRPr kumimoji="0" lang="de-DE" sz="1800" b="0" i="0" u="none" strike="noStrike" kern="0" cap="none" spc="0" normalizeH="0" baseline="0" noProof="0" dirty="0">
+                <a:ln>
+                  <a:noFill/>
+                </a:ln>
+                <a:effectLst/>
+                <a:uLnTx/>
+                <a:uFillTx/>
+                <a:ea typeface="Arial Unicode MS" pitchFamily="34" charset="-128"/>
+                <a:cs typeface="Arial Unicode MS" pitchFamily="34" charset="-128"/>
+              </a:endParaRPr>
+            </a:p>
+          </p:txBody>
+        </p:sp>
+        <p:sp>
+          <p:nvSpPr>
+            <p:cNvPr id="8" name="Rectangle 7">
+              <a:extLst>
+                <a:ext uri="{FF2B5EF4-FFF2-40B4-BE49-F238E27FC236}">
+                  <a16:creationId xmlns:a16="http://schemas.microsoft.com/office/drawing/2014/main" id="{05345D3E-AAFE-4265-A7DC-F8431E1E3971}"/>
+                </a:ext>
+              </a:extLst>
+            </p:cNvPr>
+            <p:cNvSpPr/>
+            <p:nvPr/>
+          </p:nvSpPr>
+          <p:spPr bwMode="gray">
+            <a:xfrm>
+              <a:off x="6800994" y="2450754"/>
+              <a:ext cx="1627931" cy="1156258"/>
+            </a:xfrm>
+            <a:prstGeom prst="rect">
+              <a:avLst/>
+            </a:prstGeom>
+            <a:ln>
+              <a:headEnd/>
+              <a:tailEnd/>
+            </a:ln>
+          </p:spPr>
+          <p:style>
+            <a:lnRef idx="2">
+              <a:schemeClr val="accent2"/>
+            </a:lnRef>
+            <a:fillRef idx="1">
+              <a:schemeClr val="lt1"/>
+            </a:fillRef>
+            <a:effectRef idx="0">
+              <a:schemeClr val="accent2"/>
+            </a:effectRef>
+            <a:fontRef idx="minor">
+              <a:schemeClr val="dk1"/>
+            </a:fontRef>
+          </p:style>
+          <p:txBody>
+            <a:bodyPr lIns="90000" tIns="72000" rIns="90000" bIns="72000" rtlCol="0" anchor="ctr"/>
+            <a:lstStyle/>
+            <a:p>
+              <a:pPr marR="0" algn="ctr" defTabSz="914400" eaLnBrk="1" fontAlgn="base" latinLnBrk="0" hangingPunct="1">
+                <a:lnSpc>
+                  <a:spcPct val="100000"/>
+                </a:lnSpc>
+                <a:spcBef>
+                  <a:spcPct val="50000"/>
+                </a:spcBef>
+                <a:spcAft>
+                  <a:spcPct val="0"/>
+                </a:spcAft>
+                <a:buClr>
+                  <a:srgbClr val="F0AB00"/>
+                </a:buClr>
+                <a:buSzPct val="80000"/>
+                <a:tabLst/>
+              </a:pPr>
+              <a:r>
+                <a:rPr lang="de-DE" sz="1800" kern="0" dirty="0">
+                  <a:ea typeface="Arial Unicode MS" pitchFamily="34" charset="-128"/>
+                  <a:cs typeface="Arial Unicode MS" pitchFamily="34" charset="-128"/>
+                </a:rPr>
+                <a:t>c</a:t>
+              </a:r>
+              <a:r>
+                <a:rPr kumimoji="0" lang="de-DE" sz="1800" b="0" i="0" u="none" strike="noStrike" kern="0" cap="none" spc="0" normalizeH="0" baseline="0" noProof="0" dirty="0" err="1">
+                  <a:ln>
+                    <a:noFill/>
+                  </a:ln>
+                  <a:effectLst/>
+                  <a:uLnTx/>
+                  <a:uFillTx/>
+                  <a:ea typeface="Arial Unicode MS" pitchFamily="34" charset="-128"/>
+                  <a:cs typeface="Arial Unicode MS" pitchFamily="34" charset="-128"/>
+                </a:rPr>
+                <a:t>ontainer</a:t>
+              </a:r>
+              <a:endParaRPr kumimoji="0" lang="de-DE" sz="1800" b="0" i="0" u="none" strike="noStrike" kern="0" cap="none" spc="0" normalizeH="0" baseline="0" noProof="0" dirty="0">
+                <a:ln>
+                  <a:noFill/>
+                </a:ln>
+                <a:effectLst/>
+                <a:uLnTx/>
+                <a:uFillTx/>
+                <a:ea typeface="Arial Unicode MS" pitchFamily="34" charset="-128"/>
+                <a:cs typeface="Arial Unicode MS" pitchFamily="34" charset="-128"/>
+              </a:endParaRPr>
+            </a:p>
+            <a:p>
+              <a:pPr marR="0" algn="ctr" defTabSz="914400" eaLnBrk="1" fontAlgn="base" latinLnBrk="0" hangingPunct="1">
+                <a:lnSpc>
+                  <a:spcPct val="100000"/>
+                </a:lnSpc>
+                <a:spcBef>
+                  <a:spcPct val="50000"/>
+                </a:spcBef>
+                <a:spcAft>
+                  <a:spcPct val="0"/>
+                </a:spcAft>
+                <a:buClr>
+                  <a:srgbClr val="F0AB00"/>
+                </a:buClr>
+                <a:buSzPct val="80000"/>
+                <a:tabLst/>
+              </a:pPr>
+              <a:r>
+                <a:rPr lang="de-DE" sz="1800" kern="0" dirty="0" err="1">
+                  <a:ea typeface="Arial Unicode MS" pitchFamily="34" charset="-128"/>
+                  <a:cs typeface="Arial Unicode MS" pitchFamily="34" charset="-128"/>
+                </a:rPr>
+                <a:t>nginx</a:t>
+              </a:r>
+              <a:endParaRPr kumimoji="0" lang="de-DE" sz="1800" b="0" i="0" u="none" strike="noStrike" kern="0" cap="none" spc="0" normalizeH="0" baseline="0" noProof="0" dirty="0">
+                <a:ln>
+                  <a:noFill/>
+                </a:ln>
+                <a:effectLst/>
+                <a:uLnTx/>
+                <a:uFillTx/>
+                <a:ea typeface="Arial Unicode MS" pitchFamily="34" charset="-128"/>
+                <a:cs typeface="Arial Unicode MS" pitchFamily="34" charset="-128"/>
+              </a:endParaRPr>
+            </a:p>
+          </p:txBody>
+        </p:sp>
+        <p:cxnSp>
+          <p:nvCxnSpPr>
+            <p:cNvPr id="9" name="Connector: Elbow 8">
+              <a:extLst>
+                <a:ext uri="{FF2B5EF4-FFF2-40B4-BE49-F238E27FC236}">
+                  <a16:creationId xmlns:a16="http://schemas.microsoft.com/office/drawing/2014/main" id="{C866647D-BB43-4350-B7DF-E8EE0587D3F8}"/>
+                </a:ext>
+              </a:extLst>
+            </p:cNvPr>
+            <p:cNvCxnSpPr>
+              <a:stCxn id="6" idx="2"/>
+              <a:endCxn id="7" idx="2"/>
+            </p:cNvCxnSpPr>
+            <p:nvPr/>
+          </p:nvCxnSpPr>
+          <p:spPr>
+            <a:xfrm rot="16200000" flipH="1">
+              <a:off x="4982480" y="3613341"/>
+              <a:ext cx="826622" cy="813965"/>
+            </a:xfrm>
+            <a:prstGeom prst="bentConnector2">
+              <a:avLst/>
+            </a:prstGeom>
+            <a:ln w="57150">
+              <a:solidFill>
+                <a:schemeClr val="tx1"/>
+              </a:solidFill>
+              <a:headEnd type="triangle"/>
+              <a:tailEnd type="triangle"/>
+            </a:ln>
+          </p:spPr>
+          <p:style>
+            <a:lnRef idx="1">
+              <a:schemeClr val="accent1"/>
+            </a:lnRef>
+            <a:fillRef idx="0">
+              <a:schemeClr val="accent1"/>
+            </a:fillRef>
+            <a:effectRef idx="0">
+              <a:schemeClr val="accent1"/>
+            </a:effectRef>
+            <a:fontRef idx="minor">
+              <a:schemeClr val="tx1"/>
+            </a:fontRef>
+          </p:style>
+        </p:cxnSp>
+        <p:cxnSp>
+          <p:nvCxnSpPr>
+            <p:cNvPr id="10" name="Connector: Elbow 9">
+              <a:extLst>
+                <a:ext uri="{FF2B5EF4-FFF2-40B4-BE49-F238E27FC236}">
+                  <a16:creationId xmlns:a16="http://schemas.microsoft.com/office/drawing/2014/main" id="{D3818A81-32F8-42F0-A868-D770CB0EC27C}"/>
+                </a:ext>
+              </a:extLst>
+            </p:cNvPr>
+            <p:cNvCxnSpPr>
+              <a:stCxn id="8" idx="2"/>
+              <a:endCxn id="7" idx="4"/>
+            </p:cNvCxnSpPr>
+            <p:nvPr/>
+          </p:nvCxnSpPr>
+          <p:spPr>
+            <a:xfrm rot="5400000">
+              <a:off x="6794666" y="3613340"/>
+              <a:ext cx="826623" cy="813966"/>
+            </a:xfrm>
+            <a:prstGeom prst="bentConnector2">
+              <a:avLst/>
+            </a:prstGeom>
+            <a:ln w="57150">
+              <a:solidFill>
+                <a:schemeClr val="tx1"/>
+              </a:solidFill>
+              <a:headEnd type="triangle"/>
+              <a:tailEnd type="triangle"/>
+            </a:ln>
+          </p:spPr>
+          <p:style>
+            <a:lnRef idx="1">
+              <a:schemeClr val="accent1"/>
+            </a:lnRef>
+            <a:fillRef idx="0">
+              <a:schemeClr val="accent1"/>
+            </a:fillRef>
+            <a:effectRef idx="0">
+              <a:schemeClr val="accent1"/>
+            </a:effectRef>
+            <a:fontRef idx="minor">
+              <a:schemeClr val="tx1"/>
+            </a:fontRef>
+          </p:style>
+        </p:cxnSp>
+        <p:cxnSp>
+          <p:nvCxnSpPr>
+            <p:cNvPr id="11" name="Connector: Elbow 10">
+              <a:extLst>
+                <a:ext uri="{FF2B5EF4-FFF2-40B4-BE49-F238E27FC236}">
+                  <a16:creationId xmlns:a16="http://schemas.microsoft.com/office/drawing/2014/main" id="{CBA2FEE2-FA07-41EA-B9AA-CEA8F366CA83}"/>
+                </a:ext>
+              </a:extLst>
+            </p:cNvPr>
+            <p:cNvCxnSpPr>
+              <a:stCxn id="8" idx="1"/>
+              <a:endCxn id="6" idx="3"/>
+            </p:cNvCxnSpPr>
+            <p:nvPr/>
+          </p:nvCxnSpPr>
+          <p:spPr>
+            <a:xfrm rot="10800000" flipV="1">
+              <a:off x="5802774" y="3028882"/>
+              <a:ext cx="998220" cy="1"/>
+            </a:xfrm>
+            <a:prstGeom prst="bentConnector3">
+              <a:avLst>
+                <a:gd name="adj1" fmla="val 50000"/>
+              </a:avLst>
+            </a:prstGeom>
+            <a:ln w="57150">
+              <a:solidFill>
+                <a:schemeClr val="tx1"/>
+              </a:solidFill>
+              <a:headEnd type="triangle"/>
+              <a:tailEnd type="triangle"/>
+            </a:ln>
+          </p:spPr>
+          <p:style>
+            <a:lnRef idx="1">
+              <a:schemeClr val="accent1"/>
+            </a:lnRef>
+            <a:fillRef idx="0">
+              <a:schemeClr val="accent1"/>
+            </a:fillRef>
+            <a:effectRef idx="0">
+              <a:schemeClr val="accent1"/>
+            </a:effectRef>
+            <a:fontRef idx="minor">
+              <a:schemeClr val="tx1"/>
+            </a:fontRef>
+          </p:style>
+        </p:cxnSp>
+      </p:grpSp>
+      <p:sp>
+        <p:nvSpPr>
+          <p:cNvPr id="13" name="Speech Bubble: Rectangle 12">
+            <a:extLst>
+              <a:ext uri="{FF2B5EF4-FFF2-40B4-BE49-F238E27FC236}">
+                <a16:creationId xmlns:a16="http://schemas.microsoft.com/office/drawing/2014/main" id="{3EBC6A52-7DBF-4639-8579-E2B6FF4F73C2}"/>
+              </a:ext>
+            </a:extLst>
+          </p:cNvPr>
+          <p:cNvSpPr/>
+          <p:nvPr/>
+        </p:nvSpPr>
+        <p:spPr bwMode="gray">
+          <a:xfrm>
+            <a:off x="7588740" y="995252"/>
+            <a:ext cx="4101737" cy="469551"/>
+          </a:xfrm>
+          <a:prstGeom prst="wedgeRectCallout">
+            <a:avLst>
+              <a:gd name="adj1" fmla="val -42508"/>
+              <a:gd name="adj2" fmla="val 242751"/>
+            </a:avLst>
+          </a:prstGeom>
+          <a:ln>
+            <a:headEnd/>
+            <a:tailEnd/>
+          </a:ln>
+        </p:spPr>
+        <p:style>
+          <a:lnRef idx="2">
+            <a:schemeClr val="accent5"/>
+          </a:lnRef>
+          <a:fillRef idx="1">
+            <a:schemeClr val="lt1"/>
+          </a:fillRef>
+          <a:effectRef idx="0">
+            <a:schemeClr val="accent5"/>
+          </a:effectRef>
+          <a:fontRef idx="minor">
+            <a:schemeClr val="dk1"/>
+          </a:fontRef>
+        </p:style>
+        <p:txBody>
+          <a:bodyPr lIns="90000" tIns="72000" rIns="90000" bIns="72000" rtlCol="0" anchor="ctr"/>
+          <a:lstStyle/>
+          <a:p>
+            <a:pPr marR="0" algn="ctr" defTabSz="914400" eaLnBrk="1" fontAlgn="base" latinLnBrk="0" hangingPunct="1">
+              <a:lnSpc>
+                <a:spcPct val="100000"/>
+              </a:lnSpc>
+              <a:spcBef>
+                <a:spcPct val="50000"/>
+              </a:spcBef>
+              <a:spcAft>
+                <a:spcPct val="0"/>
+              </a:spcAft>
+              <a:buClr>
+                <a:srgbClr val="F0AB00"/>
+              </a:buClr>
+              <a:buSzPct val="80000"/>
+              <a:tabLst/>
+            </a:pPr>
+            <a:r>
+              <a:rPr kumimoji="0" lang="en-US" sz="1800" b="0" i="0" u="none" strike="noStrike" kern="0" cap="none" spc="0" normalizeH="0" baseline="0" dirty="0">
+                <a:ln>
+                  <a:noFill/>
+                </a:ln>
+                <a:effectLst/>
+                <a:uLnTx/>
+                <a:uFillTx/>
+                <a:ea typeface="Arial Unicode MS" pitchFamily="34" charset="-128"/>
+                <a:cs typeface="Arial Unicode MS" pitchFamily="34" charset="-128"/>
+              </a:rPr>
+              <a:t>“regular” container in </a:t>
+            </a:r>
+            <a:r>
+              <a:rPr kumimoji="0" lang="en-US" sz="1800" b="0" i="0" u="none" strike="noStrike" kern="0" cap="none" spc="0" normalizeH="0" baseline="0" dirty="0" err="1">
+                <a:ln>
+                  <a:noFill/>
+                </a:ln>
+                <a:effectLst/>
+                <a:uLnTx/>
+                <a:uFillTx/>
+                <a:ea typeface="Arial Unicode MS" pitchFamily="34" charset="-128"/>
+                <a:cs typeface="Arial Unicode MS" pitchFamily="34" charset="-128"/>
+              </a:rPr>
+              <a:t>podSpec</a:t>
+            </a:r>
+            <a:endParaRPr kumimoji="0" lang="en-US" sz="1800" b="0" i="0" u="none" strike="noStrike" kern="0" cap="none" spc="0" normalizeH="0" baseline="0" noProof="0" dirty="0">
+              <a:ln>
+                <a:noFill/>
+              </a:ln>
+              <a:effectLst/>
+              <a:uLnTx/>
+              <a:uFillTx/>
+              <a:ea typeface="Arial Unicode MS" pitchFamily="34" charset="-128"/>
+              <a:cs typeface="Arial Unicode MS" pitchFamily="34" charset="-128"/>
+            </a:endParaRPr>
+          </a:p>
+        </p:txBody>
+      </p:sp>
+      <p:sp>
+        <p:nvSpPr>
+          <p:cNvPr id="14" name="Speech Bubble: Rectangle 13">
+            <a:extLst>
+              <a:ext uri="{FF2B5EF4-FFF2-40B4-BE49-F238E27FC236}">
+                <a16:creationId xmlns:a16="http://schemas.microsoft.com/office/drawing/2014/main" id="{3A3D0204-1565-4E7C-A2B7-0AC123CB68BB}"/>
+              </a:ext>
+            </a:extLst>
+          </p:cNvPr>
+          <p:cNvSpPr/>
+          <p:nvPr/>
+        </p:nvSpPr>
+        <p:spPr bwMode="gray">
+          <a:xfrm>
+            <a:off x="419805" y="3089841"/>
+            <a:ext cx="3034967" cy="903960"/>
+          </a:xfrm>
+          <a:prstGeom prst="wedgeRectCallout">
+            <a:avLst>
+              <a:gd name="adj1" fmla="val 78933"/>
+              <a:gd name="adj2" fmla="val -40154"/>
+            </a:avLst>
+          </a:prstGeom>
+          <a:ln>
+            <a:headEnd/>
+            <a:tailEnd/>
+          </a:ln>
+        </p:spPr>
+        <p:style>
+          <a:lnRef idx="2">
+            <a:schemeClr val="accent5"/>
+          </a:lnRef>
+          <a:fillRef idx="1">
+            <a:schemeClr val="lt1"/>
+          </a:fillRef>
+          <a:effectRef idx="0">
+            <a:schemeClr val="accent5"/>
+          </a:effectRef>
+          <a:fontRef idx="minor">
+            <a:schemeClr val="dk1"/>
+          </a:fontRef>
+        </p:style>
+        <p:txBody>
+          <a:bodyPr lIns="90000" tIns="72000" rIns="90000" bIns="72000" rtlCol="0" anchor="ctr"/>
+          <a:lstStyle/>
+          <a:p>
+            <a:pPr marR="0" algn="ctr" defTabSz="914400" eaLnBrk="1" fontAlgn="base" latinLnBrk="0" hangingPunct="1">
+              <a:lnSpc>
+                <a:spcPct val="100000"/>
+              </a:lnSpc>
+              <a:spcBef>
+                <a:spcPct val="50000"/>
+              </a:spcBef>
+              <a:spcAft>
+                <a:spcPct val="0"/>
+              </a:spcAft>
+              <a:buClr>
+                <a:srgbClr val="F0AB00"/>
+              </a:buClr>
+              <a:buSzPct val="80000"/>
+              <a:tabLst/>
+            </a:pPr>
+            <a:r>
+              <a:rPr lang="en-US" sz="1800" kern="0" noProof="0" dirty="0" err="1">
+                <a:ea typeface="Arial Unicode MS" pitchFamily="34" charset="-128"/>
+                <a:cs typeface="Arial Unicode MS" pitchFamily="34" charset="-128"/>
+              </a:rPr>
+              <a:t>initContainer</a:t>
+            </a:r>
+            <a:r>
+              <a:rPr lang="en-US" sz="1800" kern="0" noProof="0" dirty="0">
+                <a:ea typeface="Arial Unicode MS" pitchFamily="34" charset="-128"/>
+                <a:cs typeface="Arial Unicode MS" pitchFamily="34" charset="-128"/>
+              </a:rPr>
+              <a:t>(s) run prior to an</a:t>
+            </a:r>
+            <a:r>
+              <a:rPr lang="en-US" sz="1800" kern="0" dirty="0">
+                <a:ea typeface="Arial Unicode MS" pitchFamily="34" charset="-128"/>
+                <a:cs typeface="Arial Unicode MS" pitchFamily="34" charset="-128"/>
+              </a:rPr>
+              <a:t>y other container</a:t>
+            </a:r>
+            <a:endParaRPr kumimoji="0" lang="en-US" sz="1800" b="0" i="0" u="none" strike="noStrike" kern="0" cap="none" spc="0" normalizeH="0" baseline="0" noProof="0" dirty="0">
+              <a:ln>
+                <a:noFill/>
+              </a:ln>
+              <a:effectLst/>
+              <a:uLnTx/>
+              <a:uFillTx/>
+              <a:ea typeface="Arial Unicode MS" pitchFamily="34" charset="-128"/>
+              <a:cs typeface="Arial Unicode MS" pitchFamily="34" charset="-128"/>
+            </a:endParaRPr>
+          </a:p>
+        </p:txBody>
+      </p:sp>
+      <p:sp>
+        <p:nvSpPr>
+          <p:cNvPr id="15" name="Speech Bubble: Rectangle 14">
+            <a:extLst>
+              <a:ext uri="{FF2B5EF4-FFF2-40B4-BE49-F238E27FC236}">
+                <a16:creationId xmlns:a16="http://schemas.microsoft.com/office/drawing/2014/main" id="{A33B7A87-4FB9-4CCC-93E8-0EDA54748258}"/>
+              </a:ext>
+            </a:extLst>
+          </p:cNvPr>
+          <p:cNvSpPr/>
+          <p:nvPr/>
+        </p:nvSpPr>
+        <p:spPr bwMode="gray">
+          <a:xfrm>
+            <a:off x="1937288" y="5387948"/>
+            <a:ext cx="3034967" cy="903960"/>
+          </a:xfrm>
+          <a:prstGeom prst="wedgeRectCallout">
+            <a:avLst>
+              <a:gd name="adj1" fmla="val 70145"/>
+              <a:gd name="adj2" fmla="val -114966"/>
+            </a:avLst>
+          </a:prstGeom>
+          <a:ln>
+            <a:headEnd/>
+            <a:tailEnd/>
+          </a:ln>
+        </p:spPr>
+        <p:style>
+          <a:lnRef idx="2">
+            <a:schemeClr val="accent5"/>
+          </a:lnRef>
+          <a:fillRef idx="1">
+            <a:schemeClr val="lt1"/>
+          </a:fillRef>
+          <a:effectRef idx="0">
+            <a:schemeClr val="accent5"/>
+          </a:effectRef>
+          <a:fontRef idx="minor">
+            <a:schemeClr val="dk1"/>
+          </a:fontRef>
+        </p:style>
+        <p:txBody>
+          <a:bodyPr lIns="90000" tIns="72000" rIns="90000" bIns="72000" rtlCol="0" anchor="ctr"/>
+          <a:lstStyle/>
+          <a:p>
+            <a:pPr marR="0" algn="ctr" defTabSz="914400" eaLnBrk="1" fontAlgn="base" latinLnBrk="0" hangingPunct="1">
+              <a:lnSpc>
+                <a:spcPct val="100000"/>
+              </a:lnSpc>
+              <a:spcBef>
+                <a:spcPct val="50000"/>
+              </a:spcBef>
+              <a:spcAft>
+                <a:spcPct val="0"/>
+              </a:spcAft>
+              <a:buClr>
+                <a:srgbClr val="F0AB00"/>
+              </a:buClr>
+              <a:buSzPct val="80000"/>
+              <a:tabLst/>
+            </a:pPr>
+            <a:r>
+              <a:rPr lang="en-US" sz="1800" kern="0" noProof="0" dirty="0">
+                <a:ea typeface="Arial Unicode MS" pitchFamily="34" charset="-128"/>
+                <a:cs typeface="Arial Unicode MS" pitchFamily="34" charset="-128"/>
+              </a:rPr>
+              <a:t>Any volume defined in the pod is also available to the </a:t>
+            </a:r>
+            <a:r>
+              <a:rPr lang="en-US" sz="1800" kern="0" noProof="0" dirty="0" err="1">
+                <a:ea typeface="Arial Unicode MS" pitchFamily="34" charset="-128"/>
+                <a:cs typeface="Arial Unicode MS" pitchFamily="34" charset="-128"/>
+              </a:rPr>
+              <a:t>initContainer</a:t>
+            </a:r>
+            <a:endParaRPr kumimoji="0" lang="en-US" sz="1800" b="0" i="0" u="none" strike="noStrike" kern="0" cap="none" spc="0" normalizeH="0" baseline="0" noProof="0" dirty="0">
+              <a:ln>
+                <a:noFill/>
+              </a:ln>
+              <a:effectLst/>
+              <a:uLnTx/>
+              <a:uFillTx/>
+              <a:ea typeface="Arial Unicode MS" pitchFamily="34" charset="-128"/>
+              <a:cs typeface="Arial Unicode MS" pitchFamily="34" charset="-128"/>
+            </a:endParaRPr>
+          </a:p>
+        </p:txBody>
+      </p:sp>
+    </p:spTree>
+    <p:extLst>
+      <p:ext uri="{BB962C8B-B14F-4D97-AF65-F5344CB8AC3E}">
+        <p14:creationId xmlns:p14="http://schemas.microsoft.com/office/powerpoint/2010/main" val="454862674"/>
+      </p:ext>
+    </p:extLst>
+  </p:cSld>
+  <p:clrMapOvr>
+    <a:masterClrMapping/>
+  </p:clrMapOvr>
+</p:sld>
+</file>
+
+<file path=ppt/slides/slide11.xml><?xml version="1.0" encoding="utf-8"?>
+<p:sld xmlns:a="http://schemas.openxmlformats.org/drawingml/2006/main" xmlns:r="http://schemas.openxmlformats.org/officeDocument/2006/relationships" xmlns:p="http://schemas.openxmlformats.org/presentationml/2006/main">
+  <p:cSld>
+    <p:spTree>
+      <p:nvGrpSpPr>
+        <p:cNvPr id="1" name=""/>
+        <p:cNvGrpSpPr/>
+        <p:nvPr/>
+      </p:nvGrpSpPr>
+      <p:grpSpPr>
+        <a:xfrm>
+          <a:off x="0" y="0"/>
+          <a:ext cx="0" cy="0"/>
+          <a:chOff x="0" y="0"/>
+          <a:chExt cx="0" cy="0"/>
+        </a:xfrm>
+      </p:grpSpPr>
+      <p:sp>
+        <p:nvSpPr>
+          <p:cNvPr id="3" name="Title 2">
+            <a:extLst>
+              <a:ext uri="{FF2B5EF4-FFF2-40B4-BE49-F238E27FC236}">
                 <a16:creationId xmlns:a16="http://schemas.microsoft.com/office/drawing/2014/main" id="{B4B6938A-7A0C-4712-A9B8-41F25B66C8A4}"/>
               </a:ext>
             </a:extLst>
@@ -18804,7 +19955,7 @@
 </p:sld>
 </file>
 
-<file path=ppt/slides/slide11.xml><?xml version="1.0" encoding="utf-8"?>
+<file path=ppt/slides/slide12.xml><?xml version="1.0" encoding="utf-8"?>
 <p:sld xmlns:a="http://schemas.openxmlformats.org/drawingml/2006/main" xmlns:r="http://schemas.openxmlformats.org/officeDocument/2006/relationships" xmlns:p="http://schemas.openxmlformats.org/presentationml/2006/main" show="0">
   <p:cSld>
     <p:spTree>

</xml_diff>

<commit_message>
fix typo in statefulset description
</commit_message>
<xml_diff>
--- a/kubernetes/10_statefulset.pptx
+++ b/kubernetes/10_statefulset.pptx
@@ -23556,7 +23556,33 @@
                 <a:ea typeface="Arial Unicode MS" pitchFamily="34" charset="-128"/>
                 <a:cs typeface="Arial Unicode MS" pitchFamily="34" charset="-128"/>
               </a:rPr>
-              <a:t>Scaling creates instances that ace like new tenants</a:t>
+              <a:t>Scaling creates instances </a:t>
+            </a:r>
+            <a:r>
+              <a:rPr kumimoji="0" lang="en-US" sz="1800" b="0" i="0" u="none" strike="noStrike" kern="0" cap="none" spc="0" normalizeH="0" baseline="0" noProof="0">
+                <a:ln>
+                  <a:noFill/>
+                </a:ln>
+                <a:effectLst/>
+                <a:uLnTx/>
+                <a:uFillTx/>
+                <a:ea typeface="Arial Unicode MS" pitchFamily="34" charset="-128"/>
+                <a:cs typeface="Arial Unicode MS" pitchFamily="34" charset="-128"/>
+              </a:rPr>
+              <a:t>that act </a:t>
+            </a:r>
+            <a:r>
+              <a:rPr kumimoji="0" lang="en-US" sz="1800" b="0" i="0" u="none" strike="noStrike" kern="0" cap="none" spc="0" normalizeH="0" baseline="0" noProof="0" dirty="0">
+                <a:ln>
+                  <a:noFill/>
+                </a:ln>
+                <a:effectLst/>
+                <a:uLnTx/>
+                <a:uFillTx/>
+                <a:ea typeface="Arial Unicode MS" pitchFamily="34" charset="-128"/>
+                <a:cs typeface="Arial Unicode MS" pitchFamily="34" charset="-128"/>
+              </a:rPr>
+              <a:t>like new tenants</a:t>
             </a:r>
           </a:p>
         </p:txBody>

</xml_diff>